<commit_message>
Increased master font size.
</commit_message>
<xml_diff>
--- a/presentation/presentation_powerpoint.pptx
+++ b/presentation/presentation_powerpoint.pptx
@@ -125,6 +125,14 @@
       </a:defRPr>
     </a:lvl9pPr>
   </p:defaultTextStyle>
+  <p:extLst>
+    <p:ext uri="{EFAFB233-063F-42B5-8137-9DF3F51BA10A}">
+      <p15:sldGuideLst xmlns:p15="http://schemas.microsoft.com/office/powerpoint/2012/main"/>
+    </p:ext>
+    <p:ext uri="{2D200454-40CA-4A62-9FC3-DE9A4176ACB9}">
+      <p15:notesGuideLst xmlns:p15="http://schemas.microsoft.com/office/powerpoint/2012/main"/>
+    </p:ext>
+  </p:extLst>
 </p:presentation>
 </file>
 
@@ -1115,6 +1123,13 @@
         </dgm:presLayoutVars>
       </dgm:prSet>
       <dgm:spPr/>
+      <dgm:t>
+        <a:bodyPr/>
+        <a:lstStyle/>
+        <a:p>
+          <a:endParaRPr lang="en-US"/>
+        </a:p>
+      </dgm:t>
     </dgm:pt>
     <dgm:pt modelId="{2ADB5704-6A5A-438B-B1DB-4B61B9D6AA65}" type="pres">
       <dgm:prSet presAssocID="{1B1D3356-6ABD-4E48-A25A-0E8E0A3F1491}" presName="node" presStyleLbl="node1" presStyleIdx="0" presStyleCnt="4">
@@ -1138,6 +1153,13 @@
     <dgm:pt modelId="{4CE6E65A-5512-4AF0-A073-557E6EEBF746}" type="pres">
       <dgm:prSet presAssocID="{69FD04A5-3D52-4902-9181-7781B8DEA5B6}" presName="sibTrans" presStyleLbl="sibTrans1D1" presStyleIdx="0" presStyleCnt="4"/>
       <dgm:spPr/>
+      <dgm:t>
+        <a:bodyPr/>
+        <a:lstStyle/>
+        <a:p>
+          <a:endParaRPr lang="en-US"/>
+        </a:p>
+      </dgm:t>
     </dgm:pt>
     <dgm:pt modelId="{5C028559-FCD5-4417-90B5-E639583E040E}" type="pres">
       <dgm:prSet presAssocID="{E25B351D-F36A-4D54-89A7-03087740D5AC}" presName="node" presStyleLbl="node1" presStyleIdx="1" presStyleCnt="4">
@@ -1146,6 +1168,13 @@
         </dgm:presLayoutVars>
       </dgm:prSet>
       <dgm:spPr/>
+      <dgm:t>
+        <a:bodyPr/>
+        <a:lstStyle/>
+        <a:p>
+          <a:endParaRPr lang="en-US"/>
+        </a:p>
+      </dgm:t>
     </dgm:pt>
     <dgm:pt modelId="{FAFCBAFF-6446-4C5A-B658-C46697FCB622}" type="pres">
       <dgm:prSet presAssocID="{E25B351D-F36A-4D54-89A7-03087740D5AC}" presName="spNode" presStyleCnt="0"/>
@@ -1154,6 +1183,13 @@
     <dgm:pt modelId="{90461CCA-B978-45E5-96D7-BA4CD79F20F6}" type="pres">
       <dgm:prSet presAssocID="{BB954FE9-105C-4267-8F5D-D6DBBBDA661A}" presName="sibTrans" presStyleLbl="sibTrans1D1" presStyleIdx="1" presStyleCnt="4"/>
       <dgm:spPr/>
+      <dgm:t>
+        <a:bodyPr/>
+        <a:lstStyle/>
+        <a:p>
+          <a:endParaRPr lang="en-US"/>
+        </a:p>
+      </dgm:t>
     </dgm:pt>
     <dgm:pt modelId="{396CA0A4-2AA2-4A01-BA16-8F6F79A0654D}" type="pres">
       <dgm:prSet presAssocID="{28AD7127-CF8B-451C-9C7A-6BD065EA50CF}" presName="node" presStyleLbl="node1" presStyleIdx="2" presStyleCnt="4">
@@ -1162,6 +1198,13 @@
         </dgm:presLayoutVars>
       </dgm:prSet>
       <dgm:spPr/>
+      <dgm:t>
+        <a:bodyPr/>
+        <a:lstStyle/>
+        <a:p>
+          <a:endParaRPr lang="en-US"/>
+        </a:p>
+      </dgm:t>
     </dgm:pt>
     <dgm:pt modelId="{B9A50CEF-3A81-4F80-AD30-3859DEE1E9B1}" type="pres">
       <dgm:prSet presAssocID="{28AD7127-CF8B-451C-9C7A-6BD065EA50CF}" presName="spNode" presStyleCnt="0"/>
@@ -1170,6 +1213,13 @@
     <dgm:pt modelId="{3229B6D1-CF3B-4799-B435-8CB83CDC7658}" type="pres">
       <dgm:prSet presAssocID="{4814C9D3-9EEB-4A85-A719-E82728E969E9}" presName="sibTrans" presStyleLbl="sibTrans1D1" presStyleIdx="2" presStyleCnt="4"/>
       <dgm:spPr/>
+      <dgm:t>
+        <a:bodyPr/>
+        <a:lstStyle/>
+        <a:p>
+          <a:endParaRPr lang="en-US"/>
+        </a:p>
+      </dgm:t>
     </dgm:pt>
     <dgm:pt modelId="{D431CE01-E033-4709-BBF7-9C0625086705}" type="pres">
       <dgm:prSet presAssocID="{E82F1DAF-E6C2-4B1A-8356-2B1B7A5D47DA}" presName="node" presStyleLbl="node1" presStyleIdx="3" presStyleCnt="4">
@@ -1178,6 +1228,13 @@
         </dgm:presLayoutVars>
       </dgm:prSet>
       <dgm:spPr/>
+      <dgm:t>
+        <a:bodyPr/>
+        <a:lstStyle/>
+        <a:p>
+          <a:endParaRPr lang="en-US"/>
+        </a:p>
+      </dgm:t>
     </dgm:pt>
     <dgm:pt modelId="{79DAE315-36D4-4909-AD34-477F8EE5CC50}" type="pres">
       <dgm:prSet presAssocID="{E82F1DAF-E6C2-4B1A-8356-2B1B7A5D47DA}" presName="spNode" presStyleCnt="0"/>
@@ -1186,22 +1243,29 @@
     <dgm:pt modelId="{5A518FB6-2A33-472E-8AA1-7D582B29EE25}" type="pres">
       <dgm:prSet presAssocID="{F2836597-648F-4C7F-9677-E93BE7C405DB}" presName="sibTrans" presStyleLbl="sibTrans1D1" presStyleIdx="3" presStyleCnt="4"/>
       <dgm:spPr/>
+      <dgm:t>
+        <a:bodyPr/>
+        <a:lstStyle/>
+        <a:p>
+          <a:endParaRPr lang="en-US"/>
+        </a:p>
+      </dgm:t>
     </dgm:pt>
   </dgm:ptLst>
   <dgm:cxnLst>
+    <dgm:cxn modelId="{A2A33BAA-5235-4E81-9578-D9FEDCFD2C8C}" type="presOf" srcId="{E25B351D-F36A-4D54-89A7-03087740D5AC}" destId="{5C028559-FCD5-4417-90B5-E639583E040E}" srcOrd="0" destOrd="0" presId="urn:microsoft.com/office/officeart/2005/8/layout/cycle5"/>
+    <dgm:cxn modelId="{8854D58C-EB4B-45DC-BDEE-8D0100F398D0}" type="presOf" srcId="{F5A6626C-B137-4CA7-849B-931DE6A20677}" destId="{2D16992C-AB34-4752-B4DC-8AAE13514820}" srcOrd="0" destOrd="0" presId="urn:microsoft.com/office/officeart/2005/8/layout/cycle5"/>
+    <dgm:cxn modelId="{DA833310-7197-4710-9E79-5CE0E19509D0}" srcId="{F5A6626C-B137-4CA7-849B-931DE6A20677}" destId="{E25B351D-F36A-4D54-89A7-03087740D5AC}" srcOrd="1" destOrd="0" parTransId="{6A03E7FF-0FB7-45FA-B14F-0F3D86FEA2E4}" sibTransId="{BB954FE9-105C-4267-8F5D-D6DBBBDA661A}"/>
+    <dgm:cxn modelId="{17E73D00-708F-47A5-8E0B-B94AC634B4EF}" type="presOf" srcId="{1B1D3356-6ABD-4E48-A25A-0E8E0A3F1491}" destId="{2ADB5704-6A5A-438B-B1DB-4B61B9D6AA65}" srcOrd="0" destOrd="0" presId="urn:microsoft.com/office/officeart/2005/8/layout/cycle5"/>
+    <dgm:cxn modelId="{7E8C0091-70FF-4723-A4C7-D33097E00D4B}" type="presOf" srcId="{28AD7127-CF8B-451C-9C7A-6BD065EA50CF}" destId="{396CA0A4-2AA2-4A01-BA16-8F6F79A0654D}" srcOrd="0" destOrd="0" presId="urn:microsoft.com/office/officeart/2005/8/layout/cycle5"/>
+    <dgm:cxn modelId="{0B341463-F7DC-400D-8E39-FDD5DB01B386}" srcId="{F5A6626C-B137-4CA7-849B-931DE6A20677}" destId="{28AD7127-CF8B-451C-9C7A-6BD065EA50CF}" srcOrd="2" destOrd="0" parTransId="{2740A5E7-490D-4E60-9C7B-F0127D587D3E}" sibTransId="{4814C9D3-9EEB-4A85-A719-E82728E969E9}"/>
+    <dgm:cxn modelId="{723ABE7D-C7E6-45CD-A6DB-A468CFAE0406}" type="presOf" srcId="{F2836597-648F-4C7F-9677-E93BE7C405DB}" destId="{5A518FB6-2A33-472E-8AA1-7D582B29EE25}" srcOrd="0" destOrd="0" presId="urn:microsoft.com/office/officeart/2005/8/layout/cycle5"/>
+    <dgm:cxn modelId="{11532FF9-155C-4701-9916-ED219A11DB8E}" srcId="{F5A6626C-B137-4CA7-849B-931DE6A20677}" destId="{E82F1DAF-E6C2-4B1A-8356-2B1B7A5D47DA}" srcOrd="3" destOrd="0" parTransId="{25F9A4F8-8D71-47BC-BB50-861E7FBD9DB1}" sibTransId="{F2836597-648F-4C7F-9677-E93BE7C405DB}"/>
+    <dgm:cxn modelId="{0DFABE5D-AD1B-4BDF-A794-CEB721D2E695}" srcId="{F5A6626C-B137-4CA7-849B-931DE6A20677}" destId="{1B1D3356-6ABD-4E48-A25A-0E8E0A3F1491}" srcOrd="0" destOrd="0" parTransId="{4AD99B64-82B3-4BFB-9228-B6AC7D7B099F}" sibTransId="{69FD04A5-3D52-4902-9181-7781B8DEA5B6}"/>
+    <dgm:cxn modelId="{AF975550-56C4-4528-8E04-1A32E536DBCB}" type="presOf" srcId="{E82F1DAF-E6C2-4B1A-8356-2B1B7A5D47DA}" destId="{D431CE01-E033-4709-BBF7-9C0625086705}" srcOrd="0" destOrd="0" presId="urn:microsoft.com/office/officeart/2005/8/layout/cycle5"/>
     <dgm:cxn modelId="{7A7C4E22-BA98-4B8A-AF58-1FA5FAF3AC18}" type="presOf" srcId="{BB954FE9-105C-4267-8F5D-D6DBBBDA661A}" destId="{90461CCA-B978-45E5-96D7-BA4CD79F20F6}" srcOrd="0" destOrd="0" presId="urn:microsoft.com/office/officeart/2005/8/layout/cycle5"/>
-    <dgm:cxn modelId="{0B341463-F7DC-400D-8E39-FDD5DB01B386}" srcId="{F5A6626C-B137-4CA7-849B-931DE6A20677}" destId="{28AD7127-CF8B-451C-9C7A-6BD065EA50CF}" srcOrd="2" destOrd="0" parTransId="{2740A5E7-490D-4E60-9C7B-F0127D587D3E}" sibTransId="{4814C9D3-9EEB-4A85-A719-E82728E969E9}"/>
-    <dgm:cxn modelId="{0DFABE5D-AD1B-4BDF-A794-CEB721D2E695}" srcId="{F5A6626C-B137-4CA7-849B-931DE6A20677}" destId="{1B1D3356-6ABD-4E48-A25A-0E8E0A3F1491}" srcOrd="0" destOrd="0" parTransId="{4AD99B64-82B3-4BFB-9228-B6AC7D7B099F}" sibTransId="{69FD04A5-3D52-4902-9181-7781B8DEA5B6}"/>
-    <dgm:cxn modelId="{11532FF9-155C-4701-9916-ED219A11DB8E}" srcId="{F5A6626C-B137-4CA7-849B-931DE6A20677}" destId="{E82F1DAF-E6C2-4B1A-8356-2B1B7A5D47DA}" srcOrd="3" destOrd="0" parTransId="{25F9A4F8-8D71-47BC-BB50-861E7FBD9DB1}" sibTransId="{F2836597-648F-4C7F-9677-E93BE7C405DB}"/>
-    <dgm:cxn modelId="{A2A33BAA-5235-4E81-9578-D9FEDCFD2C8C}" type="presOf" srcId="{E25B351D-F36A-4D54-89A7-03087740D5AC}" destId="{5C028559-FCD5-4417-90B5-E639583E040E}" srcOrd="0" destOrd="0" presId="urn:microsoft.com/office/officeart/2005/8/layout/cycle5"/>
-    <dgm:cxn modelId="{723ABE7D-C7E6-45CD-A6DB-A468CFAE0406}" type="presOf" srcId="{F2836597-648F-4C7F-9677-E93BE7C405DB}" destId="{5A518FB6-2A33-472E-8AA1-7D582B29EE25}" srcOrd="0" destOrd="0" presId="urn:microsoft.com/office/officeart/2005/8/layout/cycle5"/>
-    <dgm:cxn modelId="{17E73D00-708F-47A5-8E0B-B94AC634B4EF}" type="presOf" srcId="{1B1D3356-6ABD-4E48-A25A-0E8E0A3F1491}" destId="{2ADB5704-6A5A-438B-B1DB-4B61B9D6AA65}" srcOrd="0" destOrd="0" presId="urn:microsoft.com/office/officeart/2005/8/layout/cycle5"/>
-    <dgm:cxn modelId="{AF975550-56C4-4528-8E04-1A32E536DBCB}" type="presOf" srcId="{E82F1DAF-E6C2-4B1A-8356-2B1B7A5D47DA}" destId="{D431CE01-E033-4709-BBF7-9C0625086705}" srcOrd="0" destOrd="0" presId="urn:microsoft.com/office/officeart/2005/8/layout/cycle5"/>
-    <dgm:cxn modelId="{DA833310-7197-4710-9E79-5CE0E19509D0}" srcId="{F5A6626C-B137-4CA7-849B-931DE6A20677}" destId="{E25B351D-F36A-4D54-89A7-03087740D5AC}" srcOrd="1" destOrd="0" parTransId="{6A03E7FF-0FB7-45FA-B14F-0F3D86FEA2E4}" sibTransId="{BB954FE9-105C-4267-8F5D-D6DBBBDA661A}"/>
+    <dgm:cxn modelId="{97FB24E7-1E48-45C1-A2AE-CB5C4942A41B}" type="presOf" srcId="{4814C9D3-9EEB-4A85-A719-E82728E969E9}" destId="{3229B6D1-CF3B-4799-B435-8CB83CDC7658}" srcOrd="0" destOrd="0" presId="urn:microsoft.com/office/officeart/2005/8/layout/cycle5"/>
     <dgm:cxn modelId="{63741D7A-3DB0-46BE-9EBB-976255CF7356}" type="presOf" srcId="{69FD04A5-3D52-4902-9181-7781B8DEA5B6}" destId="{4CE6E65A-5512-4AF0-A073-557E6EEBF746}" srcOrd="0" destOrd="0" presId="urn:microsoft.com/office/officeart/2005/8/layout/cycle5"/>
-    <dgm:cxn modelId="{8854D58C-EB4B-45DC-BDEE-8D0100F398D0}" type="presOf" srcId="{F5A6626C-B137-4CA7-849B-931DE6A20677}" destId="{2D16992C-AB34-4752-B4DC-8AAE13514820}" srcOrd="0" destOrd="0" presId="urn:microsoft.com/office/officeart/2005/8/layout/cycle5"/>
-    <dgm:cxn modelId="{7E8C0091-70FF-4723-A4C7-D33097E00D4B}" type="presOf" srcId="{28AD7127-CF8B-451C-9C7A-6BD065EA50CF}" destId="{396CA0A4-2AA2-4A01-BA16-8F6F79A0654D}" srcOrd="0" destOrd="0" presId="urn:microsoft.com/office/officeart/2005/8/layout/cycle5"/>
-    <dgm:cxn modelId="{97FB24E7-1E48-45C1-A2AE-CB5C4942A41B}" type="presOf" srcId="{4814C9D3-9EEB-4A85-A719-E82728E969E9}" destId="{3229B6D1-CF3B-4799-B435-8CB83CDC7658}" srcOrd="0" destOrd="0" presId="urn:microsoft.com/office/officeart/2005/8/layout/cycle5"/>
     <dgm:cxn modelId="{BA1B5B56-7AC0-4652-84C3-9FC47E5E2A02}" type="presParOf" srcId="{2D16992C-AB34-4752-B4DC-8AAE13514820}" destId="{2ADB5704-6A5A-438B-B1DB-4B61B9D6AA65}" srcOrd="0" destOrd="0" presId="urn:microsoft.com/office/officeart/2005/8/layout/cycle5"/>
     <dgm:cxn modelId="{9F8EB41D-49FE-4BF3-82B7-49787E3DBE16}" type="presParOf" srcId="{2D16992C-AB34-4752-B4DC-8AAE13514820}" destId="{4D075AD3-82C0-4B09-81A5-C133030C5B6C}" srcOrd="1" destOrd="0" presId="urn:microsoft.com/office/officeart/2005/8/layout/cycle5"/>
     <dgm:cxn modelId="{60278026-2053-4D27-ADF5-5182C5C75DA6}" type="presParOf" srcId="{2D16992C-AB34-4752-B4DC-8AAE13514820}" destId="{4CE6E65A-5512-4AF0-A073-557E6EEBF746}" srcOrd="2" destOrd="0" presId="urn:microsoft.com/office/officeart/2005/8/layout/cycle5"/>
@@ -3660,92 +3724,31 @@
             <p:ph type="sldImg"/>
           </p:nvPr>
         </p:nvSpPr>
+        <p:spPr>
+          <a:xfrm>
+            <a:off x="1106488" y="812800"/>
+            <a:ext cx="5345112" cy="4008438"/>
+          </a:xfrm>
+        </p:spPr>
+      </p:sp>
+      <p:sp>
+        <p:nvSpPr>
+          <p:cNvPr id="3" name="Notes Placeholder 2"/>
+          <p:cNvSpPr>
+            <a:spLocks noGrp="1"/>
+          </p:cNvSpPr>
+          <p:nvPr>
+            <p:ph type="body" idx="1"/>
+          </p:nvPr>
+        </p:nvSpPr>
         <p:spPr/>
-      </p:sp>
-      <p:sp>
-        <p:nvSpPr>
-          <p:cNvPr id="3" name="Notes Placeholder 2"/>
-          <p:cNvSpPr>
-            <a:spLocks noGrp="1"/>
-          </p:cNvSpPr>
-          <p:nvPr>
-            <p:ph type="body" idx="1"/>
-          </p:nvPr>
-        </p:nvSpPr>
-        <p:spPr/>
         <p:txBody>
           <a:bodyPr/>
           <a:lstStyle/>
           <a:p>
             <a:r>
-              <a:rPr lang="sv-SE" dirty="0" smtClean="0"/>
-              <a:t>Omvänd polsk notation, eller RPN för ’</a:t>
-            </a:r>
-            <a:r>
-              <a:rPr lang="sv-SE" dirty="0" err="1" smtClean="0"/>
-              <a:t>reverse</a:t>
-            </a:r>
-            <a:r>
-              <a:rPr lang="sv-SE" dirty="0" smtClean="0"/>
-              <a:t> polish notation’ är nämligen notationen som används när grafräknaren ges input. Att evaluera traditionella </a:t>
-            </a:r>
-            <a:r>
-              <a:rPr lang="sv-SE" dirty="0" err="1" smtClean="0"/>
-              <a:t>mattematiska</a:t>
-            </a:r>
-            <a:r>
-              <a:rPr lang="sv-SE" dirty="0" smtClean="0"/>
-              <a:t> uttryck kräver generellt både </a:t>
-            </a:r>
-            <a:r>
-              <a:rPr lang="sv-SE" dirty="0" err="1" smtClean="0"/>
-              <a:t>rekursion</a:t>
-            </a:r>
-            <a:r>
-              <a:rPr lang="sv-SE" dirty="0" smtClean="0"/>
-              <a:t>, vilket vi saknar support för, och</a:t>
-            </a:r>
-            <a:r>
-              <a:rPr lang="sv-SE" baseline="0" dirty="0" smtClean="0"/>
-              <a:t> </a:t>
-            </a:r>
-            <a:r>
-              <a:rPr lang="sv-SE" dirty="0" smtClean="0"/>
-              <a:t>mycket arbete.</a:t>
-            </a:r>
-          </a:p>
-          <a:p>
-            <a:endParaRPr lang="sv-SE" dirty="0" smtClean="0"/>
-          </a:p>
-          <a:p>
-            <a:r>
-              <a:rPr lang="sv-SE" dirty="0" smtClean="0"/>
-              <a:t>RPN tillåter användaren att skriva vilket uttryck som helst, men kan fortfarande enkelt evalueras iterativt med hjälp av en stack.</a:t>
-            </a:r>
-          </a:p>
-          <a:p>
-            <a:endParaRPr lang="sv-SE" dirty="0" smtClean="0"/>
-          </a:p>
-          <a:p>
-            <a:r>
-              <a:rPr lang="sv-SE" dirty="0" smtClean="0"/>
-              <a:t>I konsolen, som vi senare demonstrerar, så skrivs uttryck så här, med tokens separerade av mellanslag. </a:t>
-            </a:r>
-            <a:r>
-              <a:rPr lang="sv-SE" dirty="0" err="1" smtClean="0"/>
-              <a:t>Enter</a:t>
-            </a:r>
-            <a:r>
-              <a:rPr lang="sv-SE" dirty="0" smtClean="0"/>
-              <a:t> för att säga åt maskinen att evaluera uttrycket. Då minustecknet är reserverat för dess operator, så används 'N' för att göra </a:t>
-            </a:r>
-            <a:r>
-              <a:rPr lang="sv-SE" dirty="0" err="1" smtClean="0"/>
-              <a:t>operander</a:t>
-            </a:r>
-            <a:r>
-              <a:rPr lang="sv-SE" dirty="0" smtClean="0"/>
-              <a:t> negativa.</a:t>
+              <a:rPr lang="en-US" dirty="0" smtClean="0"/>
+              <a:t>Hannes</a:t>
             </a:r>
             <a:endParaRPr lang="en-US" dirty="0"/>
           </a:p>
@@ -3769,7 +3772,7 @@
             <a:pPr lvl="0"/>
             <a:fld id="{D0FC86B6-5EBF-43A2-AF19-9B4C147144EF}" type="slidenum">
               <a:rPr lang="en-US" smtClean="0"/>
-              <a:t>5</a:t>
+              <a:t>1</a:t>
             </a:fld>
             <a:endParaRPr lang="en-US"/>
           </a:p>
@@ -3778,7 +3781,813 @@
     </p:spTree>
     <p:extLst>
       <p:ext uri="{BB962C8B-B14F-4D97-AF65-F5344CB8AC3E}">
-        <p14:creationId xmlns:p14="http://schemas.microsoft.com/office/powerpoint/2010/main" val="1602485305"/>
+        <p14:creationId xmlns:p14="http://schemas.microsoft.com/office/powerpoint/2010/main" val="2115384786"/>
+      </p:ext>
+    </p:extLst>
+  </p:cSld>
+  <p:clrMapOvr>
+    <a:masterClrMapping/>
+  </p:clrMapOvr>
+</p:notes>
+</file>
+
+<file path=ppt/notesSlides/notesSlide10.xml><?xml version="1.0" encoding="utf-8"?>
+<p:notes xmlns:a="http://schemas.openxmlformats.org/drawingml/2006/main" xmlns:r="http://schemas.openxmlformats.org/officeDocument/2006/relationships" xmlns:p="http://schemas.openxmlformats.org/presentationml/2006/main">
+  <p:cSld>
+    <p:spTree>
+      <p:nvGrpSpPr>
+        <p:cNvPr id="1" name=""/>
+        <p:cNvGrpSpPr/>
+        <p:nvPr/>
+      </p:nvGrpSpPr>
+      <p:grpSpPr>
+        <a:xfrm>
+          <a:off x="0" y="0"/>
+          <a:ext cx="0" cy="0"/>
+          <a:chOff x="0" y="0"/>
+          <a:chExt cx="0" cy="0"/>
+        </a:xfrm>
+      </p:grpSpPr>
+      <p:sp>
+        <p:nvSpPr>
+          <p:cNvPr id="2" name="Slide Image Placeholder 1"/>
+          <p:cNvSpPr>
+            <a:spLocks noGrp="1" noRot="1" noChangeAspect="1"/>
+          </p:cNvSpPr>
+          <p:nvPr>
+            <p:ph type="sldImg"/>
+          </p:nvPr>
+        </p:nvSpPr>
+        <p:spPr>
+          <a:xfrm>
+            <a:off x="1106488" y="812800"/>
+            <a:ext cx="5345112" cy="4008438"/>
+          </a:xfrm>
+        </p:spPr>
+      </p:sp>
+      <p:sp>
+        <p:nvSpPr>
+          <p:cNvPr id="3" name="Notes Placeholder 2"/>
+          <p:cNvSpPr>
+            <a:spLocks noGrp="1"/>
+          </p:cNvSpPr>
+          <p:nvPr>
+            <p:ph type="body" idx="1"/>
+          </p:nvPr>
+        </p:nvSpPr>
+        <p:spPr/>
+        <p:txBody>
+          <a:bodyPr/>
+          <a:lstStyle/>
+          <a:p>
+            <a:r>
+              <a:rPr lang="en-US" dirty="0" smtClean="0"/>
+              <a:t>Silas</a:t>
+            </a:r>
+            <a:endParaRPr lang="en-US" dirty="0"/>
+          </a:p>
+        </p:txBody>
+      </p:sp>
+      <p:sp>
+        <p:nvSpPr>
+          <p:cNvPr id="4" name="Slide Number Placeholder 3"/>
+          <p:cNvSpPr>
+            <a:spLocks noGrp="1"/>
+          </p:cNvSpPr>
+          <p:nvPr>
+            <p:ph type="sldNum" sz="quarter" idx="10"/>
+          </p:nvPr>
+        </p:nvSpPr>
+        <p:spPr/>
+        <p:txBody>
+          <a:bodyPr/>
+          <a:lstStyle/>
+          <a:p>
+            <a:pPr lvl="0"/>
+            <a:fld id="{D0FC86B6-5EBF-43A2-AF19-9B4C147144EF}" type="slidenum">
+              <a:rPr lang="en-US" smtClean="0"/>
+              <a:t>10</a:t>
+            </a:fld>
+            <a:endParaRPr lang="en-US"/>
+          </a:p>
+        </p:txBody>
+      </p:sp>
+    </p:spTree>
+    <p:extLst>
+      <p:ext uri="{BB962C8B-B14F-4D97-AF65-F5344CB8AC3E}">
+        <p14:creationId xmlns:p14="http://schemas.microsoft.com/office/powerpoint/2010/main" val="195960024"/>
+      </p:ext>
+    </p:extLst>
+  </p:cSld>
+  <p:clrMapOvr>
+    <a:masterClrMapping/>
+  </p:clrMapOvr>
+</p:notes>
+</file>
+
+<file path=ppt/notesSlides/notesSlide11.xml><?xml version="1.0" encoding="utf-8"?>
+<p:notes xmlns:a="http://schemas.openxmlformats.org/drawingml/2006/main" xmlns:r="http://schemas.openxmlformats.org/officeDocument/2006/relationships" xmlns:p="http://schemas.openxmlformats.org/presentationml/2006/main">
+  <p:cSld>
+    <p:spTree>
+      <p:nvGrpSpPr>
+        <p:cNvPr id="1" name=""/>
+        <p:cNvGrpSpPr/>
+        <p:nvPr/>
+      </p:nvGrpSpPr>
+      <p:grpSpPr>
+        <a:xfrm>
+          <a:off x="0" y="0"/>
+          <a:ext cx="0" cy="0"/>
+          <a:chOff x="0" y="0"/>
+          <a:chExt cx="0" cy="0"/>
+        </a:xfrm>
+      </p:grpSpPr>
+      <p:sp>
+        <p:nvSpPr>
+          <p:cNvPr id="2" name="Slide Image Placeholder 1"/>
+          <p:cNvSpPr>
+            <a:spLocks noGrp="1" noRot="1" noChangeAspect="1"/>
+          </p:cNvSpPr>
+          <p:nvPr>
+            <p:ph type="sldImg"/>
+          </p:nvPr>
+        </p:nvSpPr>
+        <p:spPr>
+          <a:xfrm>
+            <a:off x="1106488" y="812800"/>
+            <a:ext cx="5345112" cy="4008438"/>
+          </a:xfrm>
+        </p:spPr>
+      </p:sp>
+      <p:sp>
+        <p:nvSpPr>
+          <p:cNvPr id="3" name="Notes Placeholder 2"/>
+          <p:cNvSpPr>
+            <a:spLocks noGrp="1"/>
+          </p:cNvSpPr>
+          <p:nvPr>
+            <p:ph type="body" idx="1"/>
+          </p:nvPr>
+        </p:nvSpPr>
+        <p:spPr/>
+        <p:txBody>
+          <a:bodyPr/>
+          <a:lstStyle/>
+          <a:p>
+            <a:r>
+              <a:rPr lang="en-US" dirty="0" smtClean="0"/>
+              <a:t>Silas</a:t>
+            </a:r>
+            <a:endParaRPr lang="en-US" dirty="0"/>
+          </a:p>
+        </p:txBody>
+      </p:sp>
+      <p:sp>
+        <p:nvSpPr>
+          <p:cNvPr id="4" name="Slide Number Placeholder 3"/>
+          <p:cNvSpPr>
+            <a:spLocks noGrp="1"/>
+          </p:cNvSpPr>
+          <p:nvPr>
+            <p:ph type="sldNum" sz="quarter" idx="10"/>
+          </p:nvPr>
+        </p:nvSpPr>
+        <p:spPr/>
+        <p:txBody>
+          <a:bodyPr/>
+          <a:lstStyle/>
+          <a:p>
+            <a:pPr lvl="0"/>
+            <a:fld id="{D0FC86B6-5EBF-43A2-AF19-9B4C147144EF}" type="slidenum">
+              <a:rPr lang="en-US" smtClean="0"/>
+              <a:t>11</a:t>
+            </a:fld>
+            <a:endParaRPr lang="en-US"/>
+          </a:p>
+        </p:txBody>
+      </p:sp>
+    </p:spTree>
+    <p:extLst>
+      <p:ext uri="{BB962C8B-B14F-4D97-AF65-F5344CB8AC3E}">
+        <p14:creationId xmlns:p14="http://schemas.microsoft.com/office/powerpoint/2010/main" val="1407692517"/>
+      </p:ext>
+    </p:extLst>
+  </p:cSld>
+  <p:clrMapOvr>
+    <a:masterClrMapping/>
+  </p:clrMapOvr>
+</p:notes>
+</file>
+
+<file path=ppt/notesSlides/notesSlide12.xml><?xml version="1.0" encoding="utf-8"?>
+<p:notes xmlns:a="http://schemas.openxmlformats.org/drawingml/2006/main" xmlns:r="http://schemas.openxmlformats.org/officeDocument/2006/relationships" xmlns:p="http://schemas.openxmlformats.org/presentationml/2006/main">
+  <p:cSld>
+    <p:spTree>
+      <p:nvGrpSpPr>
+        <p:cNvPr id="1" name=""/>
+        <p:cNvGrpSpPr/>
+        <p:nvPr/>
+      </p:nvGrpSpPr>
+      <p:grpSpPr>
+        <a:xfrm>
+          <a:off x="0" y="0"/>
+          <a:ext cx="0" cy="0"/>
+          <a:chOff x="0" y="0"/>
+          <a:chExt cx="0" cy="0"/>
+        </a:xfrm>
+      </p:grpSpPr>
+      <p:sp>
+        <p:nvSpPr>
+          <p:cNvPr id="2" name="Slide Image Placeholder 1"/>
+          <p:cNvSpPr>
+            <a:spLocks noGrp="1" noRot="1" noChangeAspect="1"/>
+          </p:cNvSpPr>
+          <p:nvPr>
+            <p:ph type="sldImg"/>
+          </p:nvPr>
+        </p:nvSpPr>
+        <p:spPr>
+          <a:xfrm>
+            <a:off x="1106488" y="812800"/>
+            <a:ext cx="5345112" cy="4008438"/>
+          </a:xfrm>
+        </p:spPr>
+      </p:sp>
+      <p:sp>
+        <p:nvSpPr>
+          <p:cNvPr id="3" name="Notes Placeholder 2"/>
+          <p:cNvSpPr>
+            <a:spLocks noGrp="1"/>
+          </p:cNvSpPr>
+          <p:nvPr>
+            <p:ph type="body" idx="1"/>
+          </p:nvPr>
+        </p:nvSpPr>
+        <p:spPr/>
+        <p:txBody>
+          <a:bodyPr/>
+          <a:lstStyle/>
+          <a:p>
+            <a:r>
+              <a:rPr lang="en-US" dirty="0" smtClean="0"/>
+              <a:t>Silas</a:t>
+            </a:r>
+            <a:endParaRPr lang="en-US" dirty="0"/>
+          </a:p>
+        </p:txBody>
+      </p:sp>
+      <p:sp>
+        <p:nvSpPr>
+          <p:cNvPr id="4" name="Slide Number Placeholder 3"/>
+          <p:cNvSpPr>
+            <a:spLocks noGrp="1"/>
+          </p:cNvSpPr>
+          <p:nvPr>
+            <p:ph type="sldNum" sz="quarter" idx="10"/>
+          </p:nvPr>
+        </p:nvSpPr>
+        <p:spPr/>
+        <p:txBody>
+          <a:bodyPr/>
+          <a:lstStyle/>
+          <a:p>
+            <a:pPr lvl="0"/>
+            <a:fld id="{D0FC86B6-5EBF-43A2-AF19-9B4C147144EF}" type="slidenum">
+              <a:rPr lang="en-US" smtClean="0"/>
+              <a:t>12</a:t>
+            </a:fld>
+            <a:endParaRPr lang="en-US"/>
+          </a:p>
+        </p:txBody>
+      </p:sp>
+    </p:spTree>
+    <p:extLst>
+      <p:ext uri="{BB962C8B-B14F-4D97-AF65-F5344CB8AC3E}">
+        <p14:creationId xmlns:p14="http://schemas.microsoft.com/office/powerpoint/2010/main" val="260794220"/>
+      </p:ext>
+    </p:extLst>
+  </p:cSld>
+  <p:clrMapOvr>
+    <a:masterClrMapping/>
+  </p:clrMapOvr>
+</p:notes>
+</file>
+
+<file path=ppt/notesSlides/notesSlide13.xml><?xml version="1.0" encoding="utf-8"?>
+<p:notes xmlns:a="http://schemas.openxmlformats.org/drawingml/2006/main" xmlns:r="http://schemas.openxmlformats.org/officeDocument/2006/relationships" xmlns:p="http://schemas.openxmlformats.org/presentationml/2006/main">
+  <p:cSld>
+    <p:spTree>
+      <p:nvGrpSpPr>
+        <p:cNvPr id="1" name=""/>
+        <p:cNvGrpSpPr/>
+        <p:nvPr/>
+      </p:nvGrpSpPr>
+      <p:grpSpPr>
+        <a:xfrm>
+          <a:off x="0" y="0"/>
+          <a:ext cx="0" cy="0"/>
+          <a:chOff x="0" y="0"/>
+          <a:chExt cx="0" cy="0"/>
+        </a:xfrm>
+      </p:grpSpPr>
+      <p:sp>
+        <p:nvSpPr>
+          <p:cNvPr id="2" name="Slide Image Placeholder 1"/>
+          <p:cNvSpPr>
+            <a:spLocks noGrp="1" noRot="1" noChangeAspect="1"/>
+          </p:cNvSpPr>
+          <p:nvPr>
+            <p:ph type="sldImg"/>
+          </p:nvPr>
+        </p:nvSpPr>
+        <p:spPr>
+          <a:xfrm>
+            <a:off x="1106488" y="812800"/>
+            <a:ext cx="5345112" cy="4008438"/>
+          </a:xfrm>
+        </p:spPr>
+      </p:sp>
+      <p:sp>
+        <p:nvSpPr>
+          <p:cNvPr id="3" name="Notes Placeholder 2"/>
+          <p:cNvSpPr>
+            <a:spLocks noGrp="1"/>
+          </p:cNvSpPr>
+          <p:nvPr>
+            <p:ph type="body" idx="1"/>
+          </p:nvPr>
+        </p:nvSpPr>
+        <p:spPr/>
+        <p:txBody>
+          <a:bodyPr/>
+          <a:lstStyle/>
+          <a:p>
+            <a:r>
+              <a:rPr lang="sv-SE" dirty="0" smtClean="0"/>
+              <a:t>Tangentbordsmotorn</a:t>
+            </a:r>
+            <a:r>
+              <a:rPr lang="sv-SE" baseline="0" dirty="0" smtClean="0"/>
+              <a:t> är i stort baserad på den vi använde tidigare i denna kurs, men med vissa förändringar specifikt för det här projektet.</a:t>
+            </a:r>
+          </a:p>
+          <a:p>
+            <a:endParaRPr lang="sv-SE" baseline="0" dirty="0" smtClean="0"/>
+          </a:p>
+          <a:p>
+            <a:r>
+              <a:rPr lang="sv-SE" baseline="0" dirty="0" smtClean="0"/>
+              <a:t>Den skriver inte någon data direkt till något minne, utan lägger helt enkelt </a:t>
+            </a:r>
+            <a:r>
+              <a:rPr lang="sv-SE" baseline="0" dirty="0" err="1" smtClean="0"/>
+              <a:t>tilekoderna</a:t>
+            </a:r>
+            <a:r>
+              <a:rPr lang="sv-SE" baseline="0" dirty="0" smtClean="0"/>
+              <a:t> för nedtryckta tangenter på datautgången, som kan läggas på bussen med RC-instruktionen</a:t>
+            </a:r>
+          </a:p>
+          <a:p>
+            <a:endParaRPr lang="sv-SE" baseline="0" dirty="0" smtClean="0"/>
+          </a:p>
+          <a:p>
+            <a:r>
+              <a:rPr lang="sv-SE" baseline="0" dirty="0" smtClean="0"/>
+              <a:t>Tangentbordsmotorn har inte heller någon cursorlogik, utan allt det sköts på </a:t>
+            </a:r>
+            <a:r>
+              <a:rPr lang="sv-SE" baseline="0" dirty="0" err="1" smtClean="0"/>
+              <a:t>assemblynivån</a:t>
+            </a:r>
+            <a:r>
+              <a:rPr lang="sv-SE" baseline="0" dirty="0" smtClean="0"/>
+              <a:t>. </a:t>
+            </a:r>
+          </a:p>
+          <a:p>
+            <a:endParaRPr lang="sv-SE" baseline="0" dirty="0" smtClean="0"/>
+          </a:p>
+          <a:p>
+            <a:r>
+              <a:rPr lang="sv-SE" baseline="0" dirty="0" smtClean="0"/>
+              <a:t>Allt detta motiveras av att en och samma tangent kan ha olika betydelser beroende på sammanhanget, t.ex. kan en siffra tolkas som en del av ett matematiskt uttryck, eller som en skalningsparameter.</a:t>
+            </a:r>
+          </a:p>
+          <a:p>
+            <a:endParaRPr lang="sv-SE" baseline="0" dirty="0" smtClean="0"/>
+          </a:p>
+          <a:p>
+            <a:r>
+              <a:rPr lang="sv-SE" baseline="0" dirty="0" smtClean="0"/>
+              <a:t>Tangentbordsmotorn är därför mycket fokuserad på en enda uppgift: att hålla den senaste nedtrycka tangenten tillgänglig för processorn.</a:t>
+            </a:r>
+          </a:p>
+          <a:p>
+            <a:endParaRPr lang="sv-SE" baseline="0" dirty="0" smtClean="0"/>
+          </a:p>
+          <a:p>
+            <a:r>
+              <a:rPr lang="sv-SE" baseline="0" dirty="0" smtClean="0"/>
+              <a:t>Och den håller det värdet tills en av två saker sker: att processorn läser av värdet och då skickar en </a:t>
+            </a:r>
+            <a:r>
+              <a:rPr lang="sv-SE" baseline="0" dirty="0" err="1" smtClean="0"/>
+              <a:t>read_confirm</a:t>
+            </a:r>
+            <a:r>
+              <a:rPr lang="sv-SE" baseline="0" dirty="0" smtClean="0"/>
+              <a:t> – signal, eller en ny tangent ersätter den föregående. </a:t>
+            </a:r>
+          </a:p>
+        </p:txBody>
+      </p:sp>
+      <p:sp>
+        <p:nvSpPr>
+          <p:cNvPr id="4" name="Slide Number Placeholder 3"/>
+          <p:cNvSpPr>
+            <a:spLocks noGrp="1"/>
+          </p:cNvSpPr>
+          <p:nvPr>
+            <p:ph type="sldNum" sz="quarter" idx="10"/>
+          </p:nvPr>
+        </p:nvSpPr>
+        <p:spPr/>
+        <p:txBody>
+          <a:bodyPr/>
+          <a:lstStyle/>
+          <a:p>
+            <a:pPr lvl="0"/>
+            <a:fld id="{D0FC86B6-5EBF-43A2-AF19-9B4C147144EF}" type="slidenum">
+              <a:rPr lang="en-US" smtClean="0"/>
+              <a:t>13</a:t>
+            </a:fld>
+            <a:endParaRPr lang="en-US"/>
+          </a:p>
+        </p:txBody>
+      </p:sp>
+    </p:spTree>
+    <p:extLst>
+      <p:ext uri="{BB962C8B-B14F-4D97-AF65-F5344CB8AC3E}">
+        <p14:creationId xmlns:p14="http://schemas.microsoft.com/office/powerpoint/2010/main" val="532189939"/>
+      </p:ext>
+    </p:extLst>
+  </p:cSld>
+  <p:clrMapOvr>
+    <a:masterClrMapping/>
+  </p:clrMapOvr>
+</p:notes>
+</file>
+
+<file path=ppt/notesSlides/notesSlide14.xml><?xml version="1.0" encoding="utf-8"?>
+<p:notes xmlns:a="http://schemas.openxmlformats.org/drawingml/2006/main" xmlns:r="http://schemas.openxmlformats.org/officeDocument/2006/relationships" xmlns:p="http://schemas.openxmlformats.org/presentationml/2006/main">
+  <p:cSld>
+    <p:spTree>
+      <p:nvGrpSpPr>
+        <p:cNvPr id="1" name=""/>
+        <p:cNvGrpSpPr/>
+        <p:nvPr/>
+      </p:nvGrpSpPr>
+      <p:grpSpPr>
+        <a:xfrm>
+          <a:off x="0" y="0"/>
+          <a:ext cx="0" cy="0"/>
+          <a:chOff x="0" y="0"/>
+          <a:chExt cx="0" cy="0"/>
+        </a:xfrm>
+      </p:grpSpPr>
+      <p:sp>
+        <p:nvSpPr>
+          <p:cNvPr id="2" name="Slide Image Placeholder 1"/>
+          <p:cNvSpPr>
+            <a:spLocks noGrp="1" noRot="1" noChangeAspect="1"/>
+          </p:cNvSpPr>
+          <p:nvPr>
+            <p:ph type="sldImg"/>
+          </p:nvPr>
+        </p:nvSpPr>
+        <p:spPr>
+          <a:xfrm>
+            <a:off x="1106488" y="812800"/>
+            <a:ext cx="5345112" cy="4008438"/>
+          </a:xfrm>
+        </p:spPr>
+      </p:sp>
+      <p:sp>
+        <p:nvSpPr>
+          <p:cNvPr id="3" name="Notes Placeholder 2"/>
+          <p:cNvSpPr>
+            <a:spLocks noGrp="1"/>
+          </p:cNvSpPr>
+          <p:nvPr>
+            <p:ph type="body" idx="1"/>
+          </p:nvPr>
+        </p:nvSpPr>
+        <p:spPr/>
+        <p:txBody>
+          <a:bodyPr/>
+          <a:lstStyle/>
+          <a:p>
+            <a:r>
+              <a:rPr lang="sv-SE" dirty="0" smtClean="0"/>
+              <a:t>Med detta kan vi nu avslutningsvis sammanfatta det</a:t>
+            </a:r>
+            <a:r>
+              <a:rPr lang="sv-SE" baseline="0" dirty="0" smtClean="0"/>
+              <a:t> faktiska programflödet:</a:t>
+            </a:r>
+          </a:p>
+          <a:p>
+            <a:endParaRPr lang="sv-SE" baseline="0" dirty="0" smtClean="0"/>
+          </a:p>
+          <a:p>
+            <a:r>
+              <a:rPr lang="sv-SE" baseline="0" dirty="0" smtClean="0"/>
+              <a:t>Processorn står i en loop som hela tiden läser av värdet från tangentsbordmotorn med RC, och när en tangent äntligen registreras läser processorn av det värdet (alltså </a:t>
+            </a:r>
+            <a:r>
+              <a:rPr lang="sv-SE" baseline="0" dirty="0" err="1" smtClean="0"/>
+              <a:t>tilekoden</a:t>
+            </a:r>
+            <a:r>
+              <a:rPr lang="sv-SE" baseline="0" dirty="0" smtClean="0"/>
+              <a:t>), och går vidare med programlogiken.</a:t>
+            </a:r>
+          </a:p>
+          <a:p>
+            <a:endParaRPr lang="sv-SE" baseline="0" dirty="0" smtClean="0"/>
+          </a:p>
+          <a:p>
+            <a:r>
+              <a:rPr lang="sv-SE" baseline="0" dirty="0" smtClean="0"/>
+              <a:t>Vi bestämmer, beroende på sammanhanget vilken typ av input det rör sig: heltal, decimaltal, parameter, operator, osv.</a:t>
+            </a:r>
+          </a:p>
+          <a:p>
+            <a:endParaRPr lang="sv-SE" baseline="0" dirty="0" smtClean="0"/>
+          </a:p>
+          <a:p>
+            <a:r>
+              <a:rPr lang="sv-SE" baseline="0" dirty="0" smtClean="0"/>
+              <a:t>Sedan bestäms det vilken typ av handling som ska utföras på det inmatade värdet. Om det är en operator eller </a:t>
+            </a:r>
+            <a:r>
+              <a:rPr lang="sv-SE" baseline="0" dirty="0" err="1" smtClean="0"/>
+              <a:t>operand</a:t>
+            </a:r>
+            <a:r>
+              <a:rPr lang="sv-SE" baseline="0" dirty="0" smtClean="0"/>
+              <a:t> ska det läggas på evalueringsstacken, kanske ska det vara en modifierare på kommande inmatningar såsom ’N’ eller ’P’, eller om det är </a:t>
+            </a:r>
+            <a:r>
+              <a:rPr lang="sv-SE" baseline="0" dirty="0" err="1" smtClean="0"/>
+              <a:t>enter</a:t>
+            </a:r>
+            <a:r>
+              <a:rPr lang="sv-SE" baseline="0" dirty="0" smtClean="0"/>
+              <a:t> ska vi antingen evaluera uttrycket eller plotta funktionen.</a:t>
+            </a:r>
+          </a:p>
+          <a:p>
+            <a:endParaRPr lang="sv-SE" baseline="0" dirty="0" smtClean="0"/>
+          </a:p>
+          <a:p>
+            <a:r>
+              <a:rPr lang="sv-SE" baseline="0" dirty="0" smtClean="0"/>
+              <a:t>När det är klart väntar vi återigen på en ny inmatning och cykeln börjar om.</a:t>
+            </a:r>
+          </a:p>
+          <a:p>
+            <a:endParaRPr lang="sv-SE" baseline="0" dirty="0" smtClean="0"/>
+          </a:p>
+          <a:p>
+            <a:r>
+              <a:rPr lang="sv-SE" baseline="0" dirty="0" smtClean="0"/>
+              <a:t>Dessa övergripande steg innefattar alla koncept och komponenter som den här presentationen tagit upp, och bygger tillsammans upp en fullt fungerande hård-och mjukvaruplattform för en grafräknare.</a:t>
+            </a:r>
+          </a:p>
+        </p:txBody>
+      </p:sp>
+      <p:sp>
+        <p:nvSpPr>
+          <p:cNvPr id="4" name="Slide Number Placeholder 3"/>
+          <p:cNvSpPr>
+            <a:spLocks noGrp="1"/>
+          </p:cNvSpPr>
+          <p:nvPr>
+            <p:ph type="sldNum" sz="quarter" idx="10"/>
+          </p:nvPr>
+        </p:nvSpPr>
+        <p:spPr/>
+        <p:txBody>
+          <a:bodyPr/>
+          <a:lstStyle/>
+          <a:p>
+            <a:pPr lvl="0"/>
+            <a:fld id="{D0FC86B6-5EBF-43A2-AF19-9B4C147144EF}" type="slidenum">
+              <a:rPr lang="en-US" smtClean="0"/>
+              <a:t>14</a:t>
+            </a:fld>
+            <a:endParaRPr lang="en-US"/>
+          </a:p>
+        </p:txBody>
+      </p:sp>
+    </p:spTree>
+    <p:extLst>
+      <p:ext uri="{BB962C8B-B14F-4D97-AF65-F5344CB8AC3E}">
+        <p14:creationId xmlns:p14="http://schemas.microsoft.com/office/powerpoint/2010/main" val="1130169636"/>
+      </p:ext>
+    </p:extLst>
+  </p:cSld>
+  <p:clrMapOvr>
+    <a:masterClrMapping/>
+  </p:clrMapOvr>
+</p:notes>
+</file>
+
+<file path=ppt/notesSlides/notesSlide15.xml><?xml version="1.0" encoding="utf-8"?>
+<p:notes xmlns:a="http://schemas.openxmlformats.org/drawingml/2006/main" xmlns:r="http://schemas.openxmlformats.org/officeDocument/2006/relationships" xmlns:p="http://schemas.openxmlformats.org/presentationml/2006/main">
+  <p:cSld>
+    <p:spTree>
+      <p:nvGrpSpPr>
+        <p:cNvPr id="1" name=""/>
+        <p:cNvGrpSpPr/>
+        <p:nvPr/>
+      </p:nvGrpSpPr>
+      <p:grpSpPr>
+        <a:xfrm>
+          <a:off x="0" y="0"/>
+          <a:ext cx="0" cy="0"/>
+          <a:chOff x="0" y="0"/>
+          <a:chExt cx="0" cy="0"/>
+        </a:xfrm>
+      </p:grpSpPr>
+      <p:sp>
+        <p:nvSpPr>
+          <p:cNvPr id="2" name="Slide Image Placeholder 1"/>
+          <p:cNvSpPr>
+            <a:spLocks noGrp="1" noRot="1" noChangeAspect="1"/>
+          </p:cNvSpPr>
+          <p:nvPr>
+            <p:ph type="sldImg"/>
+          </p:nvPr>
+        </p:nvSpPr>
+        <p:spPr>
+          <a:xfrm>
+            <a:off x="1106488" y="812800"/>
+            <a:ext cx="5345112" cy="4008438"/>
+          </a:xfrm>
+        </p:spPr>
+      </p:sp>
+      <p:sp>
+        <p:nvSpPr>
+          <p:cNvPr id="3" name="Notes Placeholder 2"/>
+          <p:cNvSpPr>
+            <a:spLocks noGrp="1"/>
+          </p:cNvSpPr>
+          <p:nvPr>
+            <p:ph type="body" idx="1"/>
+          </p:nvPr>
+        </p:nvSpPr>
+        <p:spPr/>
+        <p:txBody>
+          <a:bodyPr/>
+          <a:lstStyle/>
+          <a:p>
+            <a:endParaRPr lang="en-US" dirty="0"/>
+          </a:p>
+        </p:txBody>
+      </p:sp>
+      <p:sp>
+        <p:nvSpPr>
+          <p:cNvPr id="4" name="Slide Number Placeholder 3"/>
+          <p:cNvSpPr>
+            <a:spLocks noGrp="1"/>
+          </p:cNvSpPr>
+          <p:nvPr>
+            <p:ph type="sldNum" sz="quarter" idx="10"/>
+          </p:nvPr>
+        </p:nvSpPr>
+        <p:spPr/>
+        <p:txBody>
+          <a:bodyPr/>
+          <a:lstStyle/>
+          <a:p>
+            <a:pPr lvl="0"/>
+            <a:fld id="{D0FC86B6-5EBF-43A2-AF19-9B4C147144EF}" type="slidenum">
+              <a:rPr lang="en-US" smtClean="0"/>
+              <a:t>15</a:t>
+            </a:fld>
+            <a:endParaRPr lang="en-US"/>
+          </a:p>
+        </p:txBody>
+      </p:sp>
+    </p:spTree>
+    <p:extLst>
+      <p:ext uri="{BB962C8B-B14F-4D97-AF65-F5344CB8AC3E}">
+        <p14:creationId xmlns:p14="http://schemas.microsoft.com/office/powerpoint/2010/main" val="3343875108"/>
+      </p:ext>
+    </p:extLst>
+  </p:cSld>
+  <p:clrMapOvr>
+    <a:masterClrMapping/>
+  </p:clrMapOvr>
+</p:notes>
+</file>
+
+<file path=ppt/notesSlides/notesSlide16.xml><?xml version="1.0" encoding="utf-8"?>
+<p:notes xmlns:a="http://schemas.openxmlformats.org/drawingml/2006/main" xmlns:r="http://schemas.openxmlformats.org/officeDocument/2006/relationships" xmlns:p="http://schemas.openxmlformats.org/presentationml/2006/main">
+  <p:cSld>
+    <p:spTree>
+      <p:nvGrpSpPr>
+        <p:cNvPr id="1" name=""/>
+        <p:cNvGrpSpPr/>
+        <p:nvPr/>
+      </p:nvGrpSpPr>
+      <p:grpSpPr>
+        <a:xfrm>
+          <a:off x="0" y="0"/>
+          <a:ext cx="0" cy="0"/>
+          <a:chOff x="0" y="0"/>
+          <a:chExt cx="0" cy="0"/>
+        </a:xfrm>
+      </p:grpSpPr>
+      <p:sp>
+        <p:nvSpPr>
+          <p:cNvPr id="2" name="Slide Image Placeholder 1"/>
+          <p:cNvSpPr>
+            <a:spLocks noGrp="1" noRot="1" noChangeAspect="1"/>
+          </p:cNvSpPr>
+          <p:nvPr>
+            <p:ph type="sldImg"/>
+          </p:nvPr>
+        </p:nvSpPr>
+        <p:spPr>
+          <a:xfrm>
+            <a:off x="1106488" y="812800"/>
+            <a:ext cx="5345112" cy="4008438"/>
+          </a:xfrm>
+        </p:spPr>
+      </p:sp>
+      <p:sp>
+        <p:nvSpPr>
+          <p:cNvPr id="3" name="Notes Placeholder 2"/>
+          <p:cNvSpPr>
+            <a:spLocks noGrp="1"/>
+          </p:cNvSpPr>
+          <p:nvPr>
+            <p:ph type="body" idx="1"/>
+          </p:nvPr>
+        </p:nvSpPr>
+        <p:spPr/>
+        <p:txBody>
+          <a:bodyPr/>
+          <a:lstStyle/>
+          <a:p>
+            <a:r>
+              <a:rPr lang="sv-SE" dirty="0" smtClean="0"/>
+              <a:t>Tack för</a:t>
+            </a:r>
+            <a:r>
+              <a:rPr lang="sv-SE" baseline="0" dirty="0" smtClean="0"/>
+              <a:t> er tid, och o</a:t>
+            </a:r>
+            <a:r>
+              <a:rPr lang="sv-SE" dirty="0" smtClean="0"/>
+              <a:t>m ni nu haft några funderingar under presentationen skulle vi vilja använda den kvarvarande tiden till en frågestund. Någon?</a:t>
+            </a:r>
+            <a:endParaRPr lang="en-US" dirty="0"/>
+          </a:p>
+        </p:txBody>
+      </p:sp>
+      <p:sp>
+        <p:nvSpPr>
+          <p:cNvPr id="4" name="Slide Number Placeholder 3"/>
+          <p:cNvSpPr>
+            <a:spLocks noGrp="1"/>
+          </p:cNvSpPr>
+          <p:nvPr>
+            <p:ph type="sldNum" sz="quarter" idx="10"/>
+          </p:nvPr>
+        </p:nvSpPr>
+        <p:spPr/>
+        <p:txBody>
+          <a:bodyPr/>
+          <a:lstStyle/>
+          <a:p>
+            <a:pPr lvl="0"/>
+            <a:fld id="{D0FC86B6-5EBF-43A2-AF19-9B4C147144EF}" type="slidenum">
+              <a:rPr lang="en-US" smtClean="0"/>
+              <a:t>16</a:t>
+            </a:fld>
+            <a:endParaRPr lang="en-US"/>
+          </a:p>
+        </p:txBody>
+      </p:sp>
+    </p:spTree>
+    <p:extLst>
+      <p:ext uri="{BB962C8B-B14F-4D97-AF65-F5344CB8AC3E}">
+        <p14:creationId xmlns:p14="http://schemas.microsoft.com/office/powerpoint/2010/main" val="249875799"/>
       </p:ext>
     </p:extLst>
   </p:cSld>
@@ -3838,51 +4647,8 @@
           <a:lstStyle/>
           <a:p>
             <a:r>
-              <a:rPr lang="sv-SE" dirty="0" smtClean="0"/>
-              <a:t>Förutom att beräkna resultatet av uttryck kan vår räknare också rita ut funktioner.</a:t>
-            </a:r>
-          </a:p>
-          <a:p>
-            <a:endParaRPr lang="sv-SE" dirty="0" smtClean="0"/>
-          </a:p>
-          <a:p>
-            <a:r>
-              <a:rPr lang="sv-SE" dirty="0" smtClean="0"/>
-              <a:t>Om du har med ett "X" som en </a:t>
-            </a:r>
-            <a:r>
-              <a:rPr lang="sv-SE" dirty="0" err="1" smtClean="0"/>
-              <a:t>operand</a:t>
-            </a:r>
-            <a:r>
-              <a:rPr lang="sv-SE" dirty="0" smtClean="0"/>
-              <a:t> kommer uttrycket att tolkas som en funktion, och dess tillhörande graf kommer ritas upp på </a:t>
-            </a:r>
-            <a:r>
-              <a:rPr lang="sv-SE" dirty="0" err="1" smtClean="0"/>
-              <a:t>vänsta</a:t>
-            </a:r>
-            <a:r>
-              <a:rPr lang="sv-SE" dirty="0" smtClean="0"/>
-              <a:t> delen av skärmen vid evaluering.</a:t>
-            </a:r>
-          </a:p>
-          <a:p>
-            <a:endParaRPr lang="sv-SE" dirty="0" smtClean="0"/>
-          </a:p>
-          <a:p>
-            <a:r>
-              <a:rPr lang="sv-SE" dirty="0" smtClean="0"/>
-              <a:t>Detta görs genom att byta X:et mot varje pixels reella X-värde i tur och ordning, ta lite hänsyn till skalning, och sedan rita in motsvarande pixel.</a:t>
-            </a:r>
-          </a:p>
-          <a:p>
-            <a:endParaRPr lang="sv-SE" dirty="0" smtClean="0"/>
-          </a:p>
-          <a:p>
-            <a:r>
-              <a:rPr lang="sv-SE" dirty="0" smtClean="0"/>
-              <a:t>Naturligtvis kan ni skala om grafen. Detta görs genom att slå knappen p följt av gränser i x-led och y-led, respektive. Detta ger resultat då nästa funktion ritas ut.</a:t>
+              <a:rPr lang="en-US" dirty="0" smtClean="0"/>
+              <a:t>Hannes</a:t>
             </a:r>
             <a:endParaRPr lang="en-US" dirty="0"/>
           </a:p>
@@ -3906,7 +4672,7 @@
             <a:pPr lvl="0"/>
             <a:fld id="{D0FC86B6-5EBF-43A2-AF19-9B4C147144EF}" type="slidenum">
               <a:rPr lang="en-US" smtClean="0"/>
-              <a:t>6</a:t>
+              <a:t>2</a:t>
             </a:fld>
             <a:endParaRPr lang="en-US"/>
           </a:p>
@@ -3915,7 +4681,7 @@
     </p:spTree>
     <p:extLst>
       <p:ext uri="{BB962C8B-B14F-4D97-AF65-F5344CB8AC3E}">
-        <p14:creationId xmlns:p14="http://schemas.microsoft.com/office/powerpoint/2010/main" val="1207151148"/>
+        <p14:creationId xmlns:p14="http://schemas.microsoft.com/office/powerpoint/2010/main" val="1680322217"/>
       </p:ext>
     </p:extLst>
   </p:cSld>
@@ -3952,81 +4718,31 @@
             <p:ph type="sldImg"/>
           </p:nvPr>
         </p:nvSpPr>
+        <p:spPr>
+          <a:xfrm>
+            <a:off x="1106488" y="812800"/>
+            <a:ext cx="5345112" cy="4008438"/>
+          </a:xfrm>
+        </p:spPr>
+      </p:sp>
+      <p:sp>
+        <p:nvSpPr>
+          <p:cNvPr id="3" name="Notes Placeholder 2"/>
+          <p:cNvSpPr>
+            <a:spLocks noGrp="1"/>
+          </p:cNvSpPr>
+          <p:nvPr>
+            <p:ph type="body" idx="1"/>
+          </p:nvPr>
+        </p:nvSpPr>
         <p:spPr/>
-      </p:sp>
-      <p:sp>
-        <p:nvSpPr>
-          <p:cNvPr id="3" name="Notes Placeholder 2"/>
-          <p:cNvSpPr>
-            <a:spLocks noGrp="1"/>
-          </p:cNvSpPr>
-          <p:nvPr>
-            <p:ph type="body" idx="1"/>
-          </p:nvPr>
-        </p:nvSpPr>
-        <p:spPr/>
         <p:txBody>
           <a:bodyPr/>
           <a:lstStyle/>
           <a:p>
             <a:r>
-              <a:rPr lang="sv-SE" dirty="0" smtClean="0"/>
-              <a:t>All denna programkod körs på en generell dator vi byggt från grunden.</a:t>
-            </a:r>
-          </a:p>
-          <a:p>
-            <a:endParaRPr lang="sv-SE" dirty="0" smtClean="0"/>
-          </a:p>
-          <a:p>
-            <a:r>
-              <a:rPr lang="sv-SE" dirty="0" smtClean="0"/>
-              <a:t>Vi kan bryta ner hårdvaran i tre distinkta moduler. En CPU, en tangentbordsmotor, och en VGA-motor. Som förväntat så sköter </a:t>
-            </a:r>
-            <a:r>
-              <a:rPr lang="sv-SE" dirty="0" err="1" smtClean="0"/>
-              <a:t>CPU:n</a:t>
-            </a:r>
-            <a:r>
-              <a:rPr lang="sv-SE" dirty="0" smtClean="0"/>
-              <a:t> </a:t>
-            </a:r>
-            <a:r>
-              <a:rPr lang="sv-SE" dirty="0" err="1" smtClean="0"/>
-              <a:t>parsning</a:t>
-            </a:r>
-            <a:r>
-              <a:rPr lang="sv-SE" dirty="0" smtClean="0"/>
-              <a:t> av maskinkod och beräkningar, tangentbordsmotorn läser tecken via USB, och VGA-motorn kan ge oss skärmutmatning baserat på givet minne.</a:t>
-            </a:r>
-          </a:p>
-          <a:p>
-            <a:endParaRPr lang="sv-SE" dirty="0" smtClean="0"/>
-          </a:p>
-          <a:p>
-            <a:r>
-              <a:rPr lang="sv-SE" dirty="0" err="1" smtClean="0"/>
-              <a:t>CPU:n</a:t>
-            </a:r>
-            <a:r>
-              <a:rPr lang="sv-SE" dirty="0" smtClean="0"/>
-              <a:t> sitter i "mitten", som ni ser på bilden, läser från tangentbordsmotorn, och skriver till VGA-motorn. Dessa två kommunicerar i sin tur med extern hårdvara: tangentbord och skärm.</a:t>
-            </a:r>
-          </a:p>
-          <a:p>
-            <a:endParaRPr lang="sv-SE" dirty="0" smtClean="0"/>
-          </a:p>
-          <a:p>
-            <a:r>
-              <a:rPr lang="sv-SE" dirty="0" smtClean="0"/>
-              <a:t>Vi redovisar dessa moduler i tur och ordning, med </a:t>
-            </a:r>
-            <a:r>
-              <a:rPr lang="sv-SE" dirty="0" err="1" smtClean="0"/>
-              <a:t>CPU:n</a:t>
-            </a:r>
-            <a:r>
-              <a:rPr lang="sv-SE" dirty="0" smtClean="0"/>
-              <a:t> först.</a:t>
+              <a:rPr lang="en-US" dirty="0" smtClean="0"/>
+              <a:t>Hannes</a:t>
             </a:r>
             <a:endParaRPr lang="en-US" dirty="0"/>
           </a:p>
@@ -4050,7 +4766,7 @@
             <a:pPr lvl="0"/>
             <a:fld id="{D0FC86B6-5EBF-43A2-AF19-9B4C147144EF}" type="slidenum">
               <a:rPr lang="en-US" smtClean="0"/>
-              <a:t>7</a:t>
+              <a:t>3</a:t>
             </a:fld>
             <a:endParaRPr lang="en-US"/>
           </a:p>
@@ -4059,7 +4775,7 @@
     </p:spTree>
     <p:extLst>
       <p:ext uri="{BB962C8B-B14F-4D97-AF65-F5344CB8AC3E}">
-        <p14:creationId xmlns:p14="http://schemas.microsoft.com/office/powerpoint/2010/main" val="2329279041"/>
+        <p14:creationId xmlns:p14="http://schemas.microsoft.com/office/powerpoint/2010/main" val="1765543069"/>
       </p:ext>
     </p:extLst>
   </p:cSld>
@@ -4096,100 +4812,33 @@
             <p:ph type="sldImg"/>
           </p:nvPr>
         </p:nvSpPr>
+        <p:spPr>
+          <a:xfrm>
+            <a:off x="1106488" y="812800"/>
+            <a:ext cx="5345112" cy="4008438"/>
+          </a:xfrm>
+        </p:spPr>
+      </p:sp>
+      <p:sp>
+        <p:nvSpPr>
+          <p:cNvPr id="3" name="Notes Placeholder 2"/>
+          <p:cNvSpPr>
+            <a:spLocks noGrp="1"/>
+          </p:cNvSpPr>
+          <p:nvPr>
+            <p:ph type="body" idx="1"/>
+          </p:nvPr>
+        </p:nvSpPr>
         <p:spPr/>
-      </p:sp>
-      <p:sp>
-        <p:nvSpPr>
-          <p:cNvPr id="3" name="Notes Placeholder 2"/>
-          <p:cNvSpPr>
-            <a:spLocks noGrp="1"/>
-          </p:cNvSpPr>
-          <p:nvPr>
-            <p:ph type="body" idx="1"/>
-          </p:nvPr>
-        </p:nvSpPr>
-        <p:spPr/>
         <p:txBody>
           <a:bodyPr/>
           <a:lstStyle/>
           <a:p>
             <a:r>
-              <a:rPr lang="sv-SE" dirty="0" smtClean="0"/>
-              <a:t>Tangentbordsmotorn</a:t>
-            </a:r>
-            <a:r>
-              <a:rPr lang="sv-SE" baseline="0" dirty="0" smtClean="0"/>
-              <a:t> är i stort baserad på den vi använde tidigare i denna kurs, men med vissa förändringar specifikt för det här projektet.</a:t>
-            </a:r>
-          </a:p>
-          <a:p>
-            <a:endParaRPr lang="sv-SE" baseline="0" dirty="0" smtClean="0"/>
-          </a:p>
-          <a:p>
-            <a:r>
-              <a:rPr lang="sv-SE" baseline="0" dirty="0" smtClean="0"/>
-              <a:t>Den skriver inte någon data direkt till något minne, utan lägger helt enkelt </a:t>
-            </a:r>
-            <a:r>
-              <a:rPr lang="sv-SE" baseline="0" dirty="0" err="1" smtClean="0"/>
-              <a:t>tilekoderna</a:t>
-            </a:r>
-            <a:r>
-              <a:rPr lang="sv-SE" baseline="0" dirty="0" smtClean="0"/>
-              <a:t> för nedtryckta tangenter på datautgången, som kan läggas på bussen med RC-instruktionen</a:t>
-            </a:r>
-          </a:p>
-          <a:p>
-            <a:endParaRPr lang="sv-SE" baseline="0" dirty="0" smtClean="0"/>
-          </a:p>
-          <a:p>
-            <a:r>
-              <a:rPr lang="sv-SE" baseline="0" dirty="0" smtClean="0"/>
-              <a:t>Tangentbordsmotorn har inte heller någon cursorlogik, utan allt det sköts på </a:t>
-            </a:r>
-            <a:r>
-              <a:rPr lang="sv-SE" baseline="0" dirty="0" err="1" smtClean="0"/>
-              <a:t>assemblynivån</a:t>
-            </a:r>
-            <a:r>
-              <a:rPr lang="sv-SE" baseline="0" dirty="0" smtClean="0"/>
-              <a:t>. </a:t>
-            </a:r>
-          </a:p>
-          <a:p>
-            <a:endParaRPr lang="sv-SE" baseline="0" dirty="0" smtClean="0"/>
-          </a:p>
-          <a:p>
-            <a:r>
-              <a:rPr lang="sv-SE" baseline="0" dirty="0" smtClean="0"/>
-              <a:t>Allt detta motiveras av att en och samma tangent kan ha olika betydelser beroende på sammanhanget, t.ex. kan en siffra tolkas som en del av ett matematiskt uttryck, eller som en skalningsparameter.</a:t>
-            </a:r>
-          </a:p>
-          <a:p>
-            <a:endParaRPr lang="sv-SE" baseline="0" dirty="0" smtClean="0"/>
-          </a:p>
-          <a:p>
-            <a:r>
-              <a:rPr lang="sv-SE" baseline="0" dirty="0" smtClean="0"/>
-              <a:t>Tangentbordsmotorn är därför mycket fokuserad på en enda uppgift: att hålla den senaste nedtrycka tangenten tillgänglig för processorn.</a:t>
-            </a:r>
-          </a:p>
-          <a:p>
-            <a:endParaRPr lang="sv-SE" baseline="0" dirty="0" smtClean="0"/>
-          </a:p>
-          <a:p>
-            <a:r>
-              <a:rPr lang="sv-SE" baseline="0" dirty="0" smtClean="0"/>
-              <a:t>Och den håller det värdet tills en av två saker sker: att processorn läser av värdet och då skickar en </a:t>
-            </a:r>
-            <a:r>
-              <a:rPr lang="sv-SE" baseline="0" dirty="0" err="1" smtClean="0"/>
-              <a:t>read_confirm</a:t>
-            </a:r>
-            <a:r>
-              <a:rPr lang="sv-SE" baseline="0" dirty="0" smtClean="0"/>
-              <a:t> – signal, eller en ny tangent ersätter den föregående. </a:t>
-            </a:r>
+              <a:rPr lang="en-US" dirty="0" smtClean="0"/>
+              <a:t>Hannes</a:t>
+            </a:r>
+            <a:endParaRPr lang="en-US" dirty="0"/>
           </a:p>
         </p:txBody>
       </p:sp>
@@ -4211,7 +4860,7 @@
             <a:pPr lvl="0"/>
             <a:fld id="{D0FC86B6-5EBF-43A2-AF19-9B4C147144EF}" type="slidenum">
               <a:rPr lang="en-US" smtClean="0"/>
-              <a:t>13</a:t>
+              <a:t>4</a:t>
             </a:fld>
             <a:endParaRPr lang="en-US"/>
           </a:p>
@@ -4220,7 +4869,7 @@
     </p:spTree>
     <p:extLst>
       <p:ext uri="{BB962C8B-B14F-4D97-AF65-F5344CB8AC3E}">
-        <p14:creationId xmlns:p14="http://schemas.microsoft.com/office/powerpoint/2010/main" val="532189939"/>
+        <p14:creationId xmlns:p14="http://schemas.microsoft.com/office/powerpoint/2010/main" val="1102478435"/>
       </p:ext>
     </p:extLst>
   </p:cSld>
@@ -4257,100 +4906,99 @@
             <p:ph type="sldImg"/>
           </p:nvPr>
         </p:nvSpPr>
+        <p:spPr>
+          <a:xfrm>
+            <a:off x="1106488" y="812800"/>
+            <a:ext cx="5345112" cy="4008438"/>
+          </a:xfrm>
+        </p:spPr>
+      </p:sp>
+      <p:sp>
+        <p:nvSpPr>
+          <p:cNvPr id="3" name="Notes Placeholder 2"/>
+          <p:cNvSpPr>
+            <a:spLocks noGrp="1"/>
+          </p:cNvSpPr>
+          <p:nvPr>
+            <p:ph type="body" idx="1"/>
+          </p:nvPr>
+        </p:nvSpPr>
         <p:spPr/>
-      </p:sp>
-      <p:sp>
-        <p:nvSpPr>
-          <p:cNvPr id="3" name="Notes Placeholder 2"/>
-          <p:cNvSpPr>
-            <a:spLocks noGrp="1"/>
-          </p:cNvSpPr>
-          <p:nvPr>
-            <p:ph type="body" idx="1"/>
-          </p:nvPr>
-        </p:nvSpPr>
-        <p:spPr/>
         <p:txBody>
           <a:bodyPr/>
           <a:lstStyle/>
           <a:p>
             <a:r>
               <a:rPr lang="sv-SE" dirty="0" smtClean="0"/>
-              <a:t>Med detta kan vi nu avslutningsvis sammanfatta det</a:t>
+              <a:t>Omvänd polsk notation, eller RPN för ’</a:t>
+            </a:r>
+            <a:r>
+              <a:rPr lang="sv-SE" dirty="0" err="1" smtClean="0"/>
+              <a:t>reverse</a:t>
+            </a:r>
+            <a:r>
+              <a:rPr lang="sv-SE" dirty="0" smtClean="0"/>
+              <a:t> polish notation’ är nämligen notationen som används när grafräknaren ges input. Att evaluera traditionella </a:t>
+            </a:r>
+            <a:r>
+              <a:rPr lang="sv-SE" dirty="0" err="1" smtClean="0"/>
+              <a:t>mattematiska</a:t>
+            </a:r>
+            <a:r>
+              <a:rPr lang="sv-SE" dirty="0" smtClean="0"/>
+              <a:t> uttryck kräver generellt både </a:t>
+            </a:r>
+            <a:r>
+              <a:rPr lang="sv-SE" dirty="0" err="1" smtClean="0"/>
+              <a:t>rekursion</a:t>
+            </a:r>
+            <a:r>
+              <a:rPr lang="sv-SE" dirty="0" smtClean="0"/>
+              <a:t>, vilket vi saknar support för, och</a:t>
             </a:r>
             <a:r>
               <a:rPr lang="sv-SE" baseline="0" dirty="0" smtClean="0"/>
-              <a:t> faktiska programflödet:</a:t>
-            </a:r>
-          </a:p>
-          <a:p>
-            <a:endParaRPr lang="sv-SE" baseline="0" dirty="0" smtClean="0"/>
-          </a:p>
-          <a:p>
-            <a:r>
-              <a:rPr lang="sv-SE" baseline="0" dirty="0" smtClean="0"/>
-              <a:t>Processorn står i en loop som hela tiden läser av värdet från tangentsbordmotorn med RC, och när en tangent äntligen registreras läser processorn av det värdet (alltså </a:t>
-            </a:r>
-            <a:r>
-              <a:rPr lang="sv-SE" baseline="0" dirty="0" err="1" smtClean="0"/>
-              <a:t>tilekoden</a:t>
-            </a:r>
-            <a:r>
-              <a:rPr lang="sv-SE" baseline="0" dirty="0" smtClean="0"/>
-              <a:t>), och går vidare med programlogiken.</a:t>
-            </a:r>
-          </a:p>
-          <a:p>
-            <a:endParaRPr lang="sv-SE" baseline="0" dirty="0" smtClean="0"/>
-          </a:p>
-          <a:p>
-            <a:r>
-              <a:rPr lang="sv-SE" baseline="0" dirty="0" smtClean="0"/>
-              <a:t>Vi bestämmer, beroende på sammanhanget vilken typ av input det rör sig: heltal, decimaltal, parameter, operator, osv.</a:t>
-            </a:r>
-          </a:p>
-          <a:p>
-            <a:endParaRPr lang="sv-SE" baseline="0" dirty="0" smtClean="0"/>
-          </a:p>
-          <a:p>
-            <a:r>
-              <a:rPr lang="sv-SE" baseline="0" dirty="0" smtClean="0"/>
-              <a:t>Sedan bestäms det vilken typ av handling som ska utföras på det inmatade värdet. Om det är en operator eller </a:t>
-            </a:r>
-            <a:r>
-              <a:rPr lang="sv-SE" baseline="0" dirty="0" err="1" smtClean="0"/>
-              <a:t>operand</a:t>
-            </a:r>
-            <a:r>
-              <a:rPr lang="sv-SE" baseline="0" dirty="0" smtClean="0"/>
-              <a:t> ska det läggas på evalueringsstacken, kanske ska det vara en modifierare på kommande inmatningar såsom ’N’ eller ’P’, eller om det är </a:t>
-            </a:r>
-            <a:r>
-              <a:rPr lang="sv-SE" baseline="0" dirty="0" err="1" smtClean="0"/>
-              <a:t>enter</a:t>
-            </a:r>
-            <a:r>
-              <a:rPr lang="sv-SE" baseline="0" dirty="0" smtClean="0"/>
-              <a:t> ska vi antingen evaluera uttrycket eller plotta funktionen.</a:t>
-            </a:r>
-          </a:p>
-          <a:p>
-            <a:endParaRPr lang="sv-SE" baseline="0" dirty="0" smtClean="0"/>
-          </a:p>
-          <a:p>
-            <a:r>
-              <a:rPr lang="sv-SE" baseline="0" dirty="0" smtClean="0"/>
-              <a:t>När det är klart väntar vi återigen på en ny inmatning och cykeln börjar om.</a:t>
-            </a:r>
-          </a:p>
-          <a:p>
-            <a:endParaRPr lang="sv-SE" baseline="0" dirty="0" smtClean="0"/>
-          </a:p>
-          <a:p>
-            <a:r>
-              <a:rPr lang="sv-SE" baseline="0" dirty="0" smtClean="0"/>
-              <a:t>Dessa övergripande steg innefattar alla koncept och komponenter som den här presentationen tagit upp, och bygger tillsammans upp en fullt fungerande hård-och mjukvaruplattform för en grafräknare.</a:t>
-            </a:r>
+              <a:t> </a:t>
+            </a:r>
+            <a:r>
+              <a:rPr lang="sv-SE" dirty="0" smtClean="0"/>
+              <a:t>mycket arbete.</a:t>
+            </a:r>
+          </a:p>
+          <a:p>
+            <a:endParaRPr lang="sv-SE" dirty="0" smtClean="0"/>
+          </a:p>
+          <a:p>
+            <a:r>
+              <a:rPr lang="sv-SE" dirty="0" smtClean="0"/>
+              <a:t>RPN tillåter användaren att skriva vilket uttryck som helst, men kan fortfarande enkelt evalueras iterativt med hjälp av en stack.</a:t>
+            </a:r>
+          </a:p>
+          <a:p>
+            <a:endParaRPr lang="sv-SE" dirty="0" smtClean="0"/>
+          </a:p>
+          <a:p>
+            <a:r>
+              <a:rPr lang="sv-SE" dirty="0" smtClean="0"/>
+              <a:t>I konsolen, som vi senare demonstrerar, så skrivs uttryck så här, med tokens separerade av mellanslag. </a:t>
+            </a:r>
+            <a:r>
+              <a:rPr lang="sv-SE" dirty="0" err="1" smtClean="0"/>
+              <a:t>Enter</a:t>
+            </a:r>
+            <a:r>
+              <a:rPr lang="sv-SE" dirty="0" smtClean="0"/>
+              <a:t> för att säga åt maskinen att evaluera uttrycket. Då minustecknet är reserverat för dess operator, så används 'N' för att göra </a:t>
+            </a:r>
+            <a:r>
+              <a:rPr lang="sv-SE" dirty="0" err="1" smtClean="0"/>
+              <a:t>operander</a:t>
+            </a:r>
+            <a:r>
+              <a:rPr lang="sv-SE" dirty="0" smtClean="0"/>
+              <a:t> negativa.</a:t>
+            </a:r>
+            <a:endParaRPr lang="en-US" dirty="0"/>
           </a:p>
         </p:txBody>
       </p:sp>
@@ -4372,7 +5020,7 @@
             <a:pPr lvl="0"/>
             <a:fld id="{D0FC86B6-5EBF-43A2-AF19-9B4C147144EF}" type="slidenum">
               <a:rPr lang="en-US" smtClean="0"/>
-              <a:t>14</a:t>
+              <a:t>5</a:t>
             </a:fld>
             <a:endParaRPr lang="en-US"/>
           </a:p>
@@ -4381,7 +5029,7 @@
     </p:spTree>
     <p:extLst>
       <p:ext uri="{BB962C8B-B14F-4D97-AF65-F5344CB8AC3E}">
-        <p14:creationId xmlns:p14="http://schemas.microsoft.com/office/powerpoint/2010/main" val="1130169636"/>
+        <p14:creationId xmlns:p14="http://schemas.microsoft.com/office/powerpoint/2010/main" val="1602485305"/>
       </p:ext>
     </p:extLst>
   </p:cSld>
@@ -4418,23 +5066,75 @@
             <p:ph type="sldImg"/>
           </p:nvPr>
         </p:nvSpPr>
+        <p:spPr>
+          <a:xfrm>
+            <a:off x="1106488" y="812800"/>
+            <a:ext cx="5345112" cy="4008438"/>
+          </a:xfrm>
+        </p:spPr>
+      </p:sp>
+      <p:sp>
+        <p:nvSpPr>
+          <p:cNvPr id="3" name="Notes Placeholder 2"/>
+          <p:cNvSpPr>
+            <a:spLocks noGrp="1"/>
+          </p:cNvSpPr>
+          <p:nvPr>
+            <p:ph type="body" idx="1"/>
+          </p:nvPr>
+        </p:nvSpPr>
         <p:spPr/>
-      </p:sp>
-      <p:sp>
-        <p:nvSpPr>
-          <p:cNvPr id="3" name="Notes Placeholder 2"/>
-          <p:cNvSpPr>
-            <a:spLocks noGrp="1"/>
-          </p:cNvSpPr>
-          <p:nvPr>
-            <p:ph type="body" idx="1"/>
-          </p:nvPr>
-        </p:nvSpPr>
-        <p:spPr/>
         <p:txBody>
           <a:bodyPr/>
           <a:lstStyle/>
           <a:p>
+            <a:r>
+              <a:rPr lang="sv-SE" dirty="0" smtClean="0"/>
+              <a:t>Förutom att beräkna resultatet av uttryck kan vår räknare också rita ut funktioner.</a:t>
+            </a:r>
+          </a:p>
+          <a:p>
+            <a:endParaRPr lang="sv-SE" dirty="0" smtClean="0"/>
+          </a:p>
+          <a:p>
+            <a:r>
+              <a:rPr lang="sv-SE" dirty="0" smtClean="0"/>
+              <a:t>Om du har med ett "X" som en </a:t>
+            </a:r>
+            <a:r>
+              <a:rPr lang="sv-SE" dirty="0" err="1" smtClean="0"/>
+              <a:t>operand</a:t>
+            </a:r>
+            <a:r>
+              <a:rPr lang="sv-SE" dirty="0" smtClean="0"/>
+              <a:t> kommer uttrycket att tolkas som en funktion, och dess tillhörande graf kommer ritas upp på </a:t>
+            </a:r>
+            <a:r>
+              <a:rPr lang="sv-SE" dirty="0" err="1" smtClean="0"/>
+              <a:t>vänsta</a:t>
+            </a:r>
+            <a:r>
+              <a:rPr lang="sv-SE" dirty="0" smtClean="0"/>
+              <a:t> delen av skärmen vid evaluering.</a:t>
+            </a:r>
+          </a:p>
+          <a:p>
+            <a:endParaRPr lang="sv-SE" dirty="0" smtClean="0"/>
+          </a:p>
+          <a:p>
+            <a:r>
+              <a:rPr lang="sv-SE" dirty="0" smtClean="0"/>
+              <a:t>Detta görs genom att byta X:et mot varje pixels reella X-värde i tur och ordning, ta lite hänsyn till skalning, och sedan rita in motsvarande pixel.</a:t>
+            </a:r>
+          </a:p>
+          <a:p>
+            <a:endParaRPr lang="sv-SE" dirty="0" smtClean="0"/>
+          </a:p>
+          <a:p>
+            <a:r>
+              <a:rPr lang="sv-SE" dirty="0" smtClean="0"/>
+              <a:t>Naturligtvis kan ni skala om grafen. Detta görs genom att slå knappen p följt av gränser i x-led och y-led, respektive. Detta ger resultat då nästa funktion ritas ut.</a:t>
+            </a:r>
             <a:endParaRPr lang="en-US" dirty="0"/>
           </a:p>
         </p:txBody>
@@ -4457,7 +5157,7 @@
             <a:pPr lvl="0"/>
             <a:fld id="{D0FC86B6-5EBF-43A2-AF19-9B4C147144EF}" type="slidenum">
               <a:rPr lang="en-US" smtClean="0"/>
-              <a:t>15</a:t>
+              <a:t>6</a:t>
             </a:fld>
             <a:endParaRPr lang="en-US"/>
           </a:p>
@@ -4466,7 +5166,7 @@
     </p:spTree>
     <p:extLst>
       <p:ext uri="{BB962C8B-B14F-4D97-AF65-F5344CB8AC3E}">
-        <p14:creationId xmlns:p14="http://schemas.microsoft.com/office/powerpoint/2010/main" val="3343875108"/>
+        <p14:creationId xmlns:p14="http://schemas.microsoft.com/office/powerpoint/2010/main" val="1207151148"/>
       </p:ext>
     </p:extLst>
   </p:cSld>
@@ -4503,34 +5203,86 @@
             <p:ph type="sldImg"/>
           </p:nvPr>
         </p:nvSpPr>
+        <p:spPr>
+          <a:xfrm>
+            <a:off x="1106488" y="812800"/>
+            <a:ext cx="5345112" cy="4008438"/>
+          </a:xfrm>
+        </p:spPr>
+      </p:sp>
+      <p:sp>
+        <p:nvSpPr>
+          <p:cNvPr id="3" name="Notes Placeholder 2"/>
+          <p:cNvSpPr>
+            <a:spLocks noGrp="1"/>
+          </p:cNvSpPr>
+          <p:nvPr>
+            <p:ph type="body" idx="1"/>
+          </p:nvPr>
+        </p:nvSpPr>
         <p:spPr/>
-      </p:sp>
-      <p:sp>
-        <p:nvSpPr>
-          <p:cNvPr id="3" name="Notes Placeholder 2"/>
-          <p:cNvSpPr>
-            <a:spLocks noGrp="1"/>
-          </p:cNvSpPr>
-          <p:nvPr>
-            <p:ph type="body" idx="1"/>
-          </p:nvPr>
-        </p:nvSpPr>
-        <p:spPr/>
         <p:txBody>
           <a:bodyPr/>
           <a:lstStyle/>
           <a:p>
             <a:r>
               <a:rPr lang="sv-SE" dirty="0" smtClean="0"/>
-              <a:t>Tack för</a:t>
-            </a:r>
-            <a:r>
-              <a:rPr lang="sv-SE" baseline="0" dirty="0" smtClean="0"/>
-              <a:t> er tid, och o</a:t>
-            </a:r>
+              <a:t>All denna programkod körs på en generell dator vi byggt från grunden.</a:t>
+            </a:r>
+          </a:p>
+          <a:p>
+            <a:endParaRPr lang="sv-SE" dirty="0" smtClean="0"/>
+          </a:p>
+          <a:p>
             <a:r>
               <a:rPr lang="sv-SE" dirty="0" smtClean="0"/>
-              <a:t>m ni nu haft några funderingar under presentationen skulle vi vilja använda den kvarvarande tiden till en frågestund. Någon?</a:t>
+              <a:t>Vi kan bryta ner hårdvaran i tre distinkta moduler. En CPU, en tangentbordsmotor, och en VGA-motor. Som förväntat så sköter </a:t>
+            </a:r>
+            <a:r>
+              <a:rPr lang="sv-SE" dirty="0" err="1" smtClean="0"/>
+              <a:t>CPU:n</a:t>
+            </a:r>
+            <a:r>
+              <a:rPr lang="sv-SE" dirty="0" smtClean="0"/>
+              <a:t> </a:t>
+            </a:r>
+            <a:r>
+              <a:rPr lang="sv-SE" dirty="0" err="1" smtClean="0"/>
+              <a:t>parsning</a:t>
+            </a:r>
+            <a:r>
+              <a:rPr lang="sv-SE" dirty="0" smtClean="0"/>
+              <a:t> av maskinkod och beräkningar, tangentbordsmotorn läser tecken via USB, och VGA-motorn kan ge oss skärmutmatning baserat på givet minne.</a:t>
+            </a:r>
+          </a:p>
+          <a:p>
+            <a:endParaRPr lang="sv-SE" dirty="0" smtClean="0"/>
+          </a:p>
+          <a:p>
+            <a:r>
+              <a:rPr lang="sv-SE" dirty="0" err="1" smtClean="0"/>
+              <a:t>CPU:n</a:t>
+            </a:r>
+            <a:r>
+              <a:rPr lang="sv-SE" dirty="0" smtClean="0"/>
+              <a:t> sitter i "mitten", som ni ser på bilden, läser från tangentbordsmotorn, och skriver till VGA-motorn. Dessa två kommunicerar i sin tur med extern hårdvara: tangentbord och skärm.</a:t>
+            </a:r>
+          </a:p>
+          <a:p>
+            <a:endParaRPr lang="sv-SE" dirty="0" smtClean="0"/>
+          </a:p>
+          <a:p>
+            <a:r>
+              <a:rPr lang="sv-SE" dirty="0" smtClean="0"/>
+              <a:t>Vi redovisar dessa moduler i tur och ordning, med </a:t>
+            </a:r>
+            <a:r>
+              <a:rPr lang="sv-SE" dirty="0" err="1" smtClean="0"/>
+              <a:t>CPU:n</a:t>
+            </a:r>
+            <a:r>
+              <a:rPr lang="sv-SE" dirty="0" smtClean="0"/>
+              <a:t> först.</a:t>
             </a:r>
             <a:endParaRPr lang="en-US" dirty="0"/>
           </a:p>
@@ -4554,7 +5306,7 @@
             <a:pPr lvl="0"/>
             <a:fld id="{D0FC86B6-5EBF-43A2-AF19-9B4C147144EF}" type="slidenum">
               <a:rPr lang="en-US" smtClean="0"/>
-              <a:t>16</a:t>
+              <a:t>7</a:t>
             </a:fld>
             <a:endParaRPr lang="en-US"/>
           </a:p>
@@ -4563,7 +5315,195 @@
     </p:spTree>
     <p:extLst>
       <p:ext uri="{BB962C8B-B14F-4D97-AF65-F5344CB8AC3E}">
-        <p14:creationId xmlns:p14="http://schemas.microsoft.com/office/powerpoint/2010/main" val="249875799"/>
+        <p14:creationId xmlns:p14="http://schemas.microsoft.com/office/powerpoint/2010/main" val="2329279041"/>
+      </p:ext>
+    </p:extLst>
+  </p:cSld>
+  <p:clrMapOvr>
+    <a:masterClrMapping/>
+  </p:clrMapOvr>
+</p:notes>
+</file>
+
+<file path=ppt/notesSlides/notesSlide8.xml><?xml version="1.0" encoding="utf-8"?>
+<p:notes xmlns:a="http://schemas.openxmlformats.org/drawingml/2006/main" xmlns:r="http://schemas.openxmlformats.org/officeDocument/2006/relationships" xmlns:p="http://schemas.openxmlformats.org/presentationml/2006/main">
+  <p:cSld>
+    <p:spTree>
+      <p:nvGrpSpPr>
+        <p:cNvPr id="1" name=""/>
+        <p:cNvGrpSpPr/>
+        <p:nvPr/>
+      </p:nvGrpSpPr>
+      <p:grpSpPr>
+        <a:xfrm>
+          <a:off x="0" y="0"/>
+          <a:ext cx="0" cy="0"/>
+          <a:chOff x="0" y="0"/>
+          <a:chExt cx="0" cy="0"/>
+        </a:xfrm>
+      </p:grpSpPr>
+      <p:sp>
+        <p:nvSpPr>
+          <p:cNvPr id="2" name="Slide Image Placeholder 1"/>
+          <p:cNvSpPr>
+            <a:spLocks noGrp="1" noRot="1" noChangeAspect="1"/>
+          </p:cNvSpPr>
+          <p:nvPr>
+            <p:ph type="sldImg"/>
+          </p:nvPr>
+        </p:nvSpPr>
+        <p:spPr>
+          <a:xfrm>
+            <a:off x="1106488" y="812800"/>
+            <a:ext cx="5345112" cy="4008438"/>
+          </a:xfrm>
+        </p:spPr>
+      </p:sp>
+      <p:sp>
+        <p:nvSpPr>
+          <p:cNvPr id="3" name="Notes Placeholder 2"/>
+          <p:cNvSpPr>
+            <a:spLocks noGrp="1"/>
+          </p:cNvSpPr>
+          <p:nvPr>
+            <p:ph type="body" idx="1"/>
+          </p:nvPr>
+        </p:nvSpPr>
+        <p:spPr/>
+        <p:txBody>
+          <a:bodyPr/>
+          <a:lstStyle/>
+          <a:p>
+            <a:r>
+              <a:rPr lang="en-US" dirty="0" smtClean="0"/>
+              <a:t>Hannes</a:t>
+            </a:r>
+            <a:endParaRPr lang="en-US" dirty="0"/>
+          </a:p>
+        </p:txBody>
+      </p:sp>
+      <p:sp>
+        <p:nvSpPr>
+          <p:cNvPr id="4" name="Slide Number Placeholder 3"/>
+          <p:cNvSpPr>
+            <a:spLocks noGrp="1"/>
+          </p:cNvSpPr>
+          <p:nvPr>
+            <p:ph type="sldNum" sz="quarter" idx="10"/>
+          </p:nvPr>
+        </p:nvSpPr>
+        <p:spPr/>
+        <p:txBody>
+          <a:bodyPr/>
+          <a:lstStyle/>
+          <a:p>
+            <a:pPr lvl="0"/>
+            <a:fld id="{D0FC86B6-5EBF-43A2-AF19-9B4C147144EF}" type="slidenum">
+              <a:rPr lang="en-US" smtClean="0"/>
+              <a:t>8</a:t>
+            </a:fld>
+            <a:endParaRPr lang="en-US"/>
+          </a:p>
+        </p:txBody>
+      </p:sp>
+    </p:spTree>
+    <p:extLst>
+      <p:ext uri="{BB962C8B-B14F-4D97-AF65-F5344CB8AC3E}">
+        <p14:creationId xmlns:p14="http://schemas.microsoft.com/office/powerpoint/2010/main" val="866150729"/>
+      </p:ext>
+    </p:extLst>
+  </p:cSld>
+  <p:clrMapOvr>
+    <a:masterClrMapping/>
+  </p:clrMapOvr>
+</p:notes>
+</file>
+
+<file path=ppt/notesSlides/notesSlide9.xml><?xml version="1.0" encoding="utf-8"?>
+<p:notes xmlns:a="http://schemas.openxmlformats.org/drawingml/2006/main" xmlns:r="http://schemas.openxmlformats.org/officeDocument/2006/relationships" xmlns:p="http://schemas.openxmlformats.org/presentationml/2006/main">
+  <p:cSld>
+    <p:spTree>
+      <p:nvGrpSpPr>
+        <p:cNvPr id="1" name=""/>
+        <p:cNvGrpSpPr/>
+        <p:nvPr/>
+      </p:nvGrpSpPr>
+      <p:grpSpPr>
+        <a:xfrm>
+          <a:off x="0" y="0"/>
+          <a:ext cx="0" cy="0"/>
+          <a:chOff x="0" y="0"/>
+          <a:chExt cx="0" cy="0"/>
+        </a:xfrm>
+      </p:grpSpPr>
+      <p:sp>
+        <p:nvSpPr>
+          <p:cNvPr id="2" name="Slide Image Placeholder 1"/>
+          <p:cNvSpPr>
+            <a:spLocks noGrp="1" noRot="1" noChangeAspect="1"/>
+          </p:cNvSpPr>
+          <p:nvPr>
+            <p:ph type="sldImg"/>
+          </p:nvPr>
+        </p:nvSpPr>
+        <p:spPr>
+          <a:xfrm>
+            <a:off x="1106488" y="812800"/>
+            <a:ext cx="5345112" cy="4008438"/>
+          </a:xfrm>
+        </p:spPr>
+      </p:sp>
+      <p:sp>
+        <p:nvSpPr>
+          <p:cNvPr id="3" name="Notes Placeholder 2"/>
+          <p:cNvSpPr>
+            <a:spLocks noGrp="1"/>
+          </p:cNvSpPr>
+          <p:nvPr>
+            <p:ph type="body" idx="1"/>
+          </p:nvPr>
+        </p:nvSpPr>
+        <p:spPr/>
+        <p:txBody>
+          <a:bodyPr/>
+          <a:lstStyle/>
+          <a:p>
+            <a:r>
+              <a:rPr lang="en-US" dirty="0" smtClean="0"/>
+              <a:t>Silas</a:t>
+            </a:r>
+            <a:endParaRPr lang="en-US" dirty="0"/>
+          </a:p>
+        </p:txBody>
+      </p:sp>
+      <p:sp>
+        <p:nvSpPr>
+          <p:cNvPr id="4" name="Slide Number Placeholder 3"/>
+          <p:cNvSpPr>
+            <a:spLocks noGrp="1"/>
+          </p:cNvSpPr>
+          <p:nvPr>
+            <p:ph type="sldNum" sz="quarter" idx="10"/>
+          </p:nvPr>
+        </p:nvSpPr>
+        <p:spPr/>
+        <p:txBody>
+          <a:bodyPr/>
+          <a:lstStyle/>
+          <a:p>
+            <a:pPr lvl="0"/>
+            <a:fld id="{D0FC86B6-5EBF-43A2-AF19-9B4C147144EF}" type="slidenum">
+              <a:rPr lang="en-US" smtClean="0"/>
+              <a:t>9</a:t>
+            </a:fld>
+            <a:endParaRPr lang="en-US"/>
+          </a:p>
+        </p:txBody>
+      </p:sp>
+    </p:spTree>
+    <p:extLst>
+      <p:ext uri="{BB962C8B-B14F-4D97-AF65-F5344CB8AC3E}">
+        <p14:creationId xmlns:p14="http://schemas.microsoft.com/office/powerpoint/2010/main" val="1751142937"/>
       </p:ext>
     </p:extLst>
   </p:cSld>
@@ -6966,38 +7906,38 @@
           <a:p>
             <a:pPr lvl="0"/>
             <a:r>
-              <a:rPr lang="en-US" smtClean="0"/>
+              <a:rPr lang="en-US" dirty="0" smtClean="0"/>
               <a:t>Click to edit Master text styles</a:t>
             </a:r>
           </a:p>
           <a:p>
             <a:pPr lvl="1"/>
             <a:r>
-              <a:rPr lang="en-US" smtClean="0"/>
+              <a:rPr lang="en-US" dirty="0" smtClean="0"/>
               <a:t>Second level</a:t>
             </a:r>
           </a:p>
           <a:p>
             <a:pPr lvl="2"/>
             <a:r>
-              <a:rPr lang="en-US" smtClean="0"/>
+              <a:rPr lang="en-US" dirty="0" smtClean="0"/>
               <a:t>Third level</a:t>
             </a:r>
           </a:p>
           <a:p>
             <a:pPr lvl="3"/>
             <a:r>
-              <a:rPr lang="en-US" smtClean="0"/>
+              <a:rPr lang="en-US" dirty="0" smtClean="0"/>
               <a:t>Fourth level</a:t>
             </a:r>
           </a:p>
           <a:p>
             <a:pPr lvl="4"/>
             <a:r>
-              <a:rPr lang="en-US" smtClean="0"/>
+              <a:rPr lang="en-US" dirty="0" smtClean="0"/>
               <a:t>Fifth level</a:t>
             </a:r>
-            <a:endParaRPr lang="en-US"/>
+            <a:endParaRPr lang="en-US" dirty="0"/>
           </a:p>
         </p:txBody>
       </p:sp>
@@ -7177,7 +8117,7 @@
         </a:spcBef>
         <a:buFont typeface="Arial" panose="020B0604020202020204" pitchFamily="34" charset="0"/>
         <a:buChar char="•"/>
-        <a:defRPr sz="2315" kern="1200">
+        <a:defRPr sz="2800" kern="1200">
           <a:solidFill>
             <a:schemeClr val="tx1"/>
           </a:solidFill>
@@ -7195,7 +8135,7 @@
         </a:spcBef>
         <a:buFont typeface="Arial" panose="020B0604020202020204" pitchFamily="34" charset="0"/>
         <a:buChar char="•"/>
-        <a:defRPr sz="1984" kern="1200">
+        <a:defRPr sz="2400" kern="1200">
           <a:solidFill>
             <a:schemeClr val="tx1"/>
           </a:solidFill>
@@ -7213,7 +8153,7 @@
         </a:spcBef>
         <a:buFont typeface="Arial" panose="020B0604020202020204" pitchFamily="34" charset="0"/>
         <a:buChar char="•"/>
-        <a:defRPr sz="1654" kern="1200">
+        <a:defRPr sz="2000" kern="1200">
           <a:solidFill>
             <a:schemeClr val="tx1"/>
           </a:solidFill>
@@ -7586,26 +8526,28 @@
         </p:nvSpPr>
         <p:spPr/>
         <p:txBody>
-          <a:bodyPr/>
+          <a:bodyPr>
+            <a:normAutofit/>
+          </a:bodyPr>
           <a:lstStyle/>
           <a:p>
             <a:pPr marL="0" indent="0">
               <a:buNone/>
             </a:pPr>
-            <a:endParaRPr lang="sv-SE" dirty="0" smtClean="0"/>
-          </a:p>
-          <a:p>
-            <a:endParaRPr lang="sv-SE" dirty="0"/>
-          </a:p>
-          <a:p>
-            <a:endParaRPr lang="sv-SE" dirty="0" smtClean="0"/>
+            <a:endParaRPr lang="sv-SE" sz="2400" dirty="0" smtClean="0"/>
+          </a:p>
+          <a:p>
+            <a:endParaRPr lang="sv-SE" sz="2400" dirty="0"/>
+          </a:p>
+          <a:p>
+            <a:endParaRPr lang="sv-SE" sz="2400" dirty="0" smtClean="0"/>
           </a:p>
           <a:p>
             <a:pPr marL="0" indent="0">
               <a:buNone/>
             </a:pPr>
             <a:r>
-              <a:rPr lang="sv-SE" dirty="0" smtClean="0">
+              <a:rPr lang="sv-SE" sz="2400" dirty="0" smtClean="0">
                 <a:solidFill>
                   <a:srgbClr val="FF0000"/>
                 </a:solidFill>
@@ -7613,11 +8555,11 @@
               <a:t>OP </a:t>
             </a:r>
             <a:r>
-              <a:rPr lang="sv-SE" dirty="0" smtClean="0"/>
+              <a:rPr lang="sv-SE" sz="2400" dirty="0" smtClean="0"/>
               <a:t>                 </a:t>
             </a:r>
             <a:r>
-              <a:rPr lang="sv-SE" dirty="0" err="1" smtClean="0">
+              <a:rPr lang="sv-SE" sz="2400" dirty="0" err="1" smtClean="0">
                 <a:solidFill>
                   <a:schemeClr val="accent5"/>
                 </a:solidFill>
@@ -7625,11 +8567,11 @@
               <a:t>GRx</a:t>
             </a:r>
             <a:r>
-              <a:rPr lang="sv-SE" dirty="0" smtClean="0"/>
+              <a:rPr lang="sv-SE" sz="2400" dirty="0" smtClean="0"/>
               <a:t>         </a:t>
             </a:r>
             <a:r>
-              <a:rPr lang="sv-SE" dirty="0" smtClean="0">
+              <a:rPr lang="sv-SE" sz="2400" dirty="0" smtClean="0">
                 <a:solidFill>
                   <a:schemeClr val="accent4"/>
                 </a:solidFill>
@@ -7637,11 +8579,11 @@
               <a:t>MM</a:t>
             </a:r>
             <a:r>
-              <a:rPr lang="sv-SE" dirty="0" smtClean="0"/>
+              <a:rPr lang="sv-SE" sz="2400" dirty="0" smtClean="0"/>
               <a:t>      </a:t>
             </a:r>
             <a:r>
-              <a:rPr lang="sv-SE" dirty="0" smtClean="0">
+              <a:rPr lang="sv-SE" sz="2400" dirty="0" smtClean="0">
                 <a:solidFill>
                   <a:schemeClr val="accent6"/>
                 </a:solidFill>
@@ -7654,7 +8596,7 @@
               <a:buNone/>
             </a:pPr>
             <a:r>
-              <a:rPr lang="sv-SE" dirty="0" smtClean="0">
+              <a:rPr lang="sv-SE" sz="2400" dirty="0" smtClean="0">
                 <a:solidFill>
                   <a:srgbClr val="FF0000"/>
                 </a:solidFill>
@@ -7662,7 +8604,7 @@
               <a:t>_ _ _ _ _        </a:t>
             </a:r>
             <a:r>
-              <a:rPr lang="sv-SE" dirty="0" smtClean="0">
+              <a:rPr lang="sv-SE" sz="2400" dirty="0" smtClean="0">
                 <a:solidFill>
                   <a:schemeClr val="accent5"/>
                 </a:solidFill>
@@ -7670,7 +8612,7 @@
               <a:t>_ _ _        </a:t>
             </a:r>
             <a:r>
-              <a:rPr lang="sv-SE" dirty="0" smtClean="0">
+              <a:rPr lang="sv-SE" sz="2400" dirty="0" smtClean="0">
                 <a:solidFill>
                   <a:schemeClr val="accent4"/>
                 </a:solidFill>
@@ -7678,7 +8620,7 @@
               <a:t>_ _        </a:t>
             </a:r>
             <a:r>
-              <a:rPr lang="sv-SE" dirty="0" smtClean="0">
+              <a:rPr lang="sv-SE" sz="2400" dirty="0" smtClean="0">
                 <a:solidFill>
                   <a:schemeClr val="accent6"/>
                 </a:solidFill>
@@ -7691,7 +8633,7 @@
               <a:buNone/>
             </a:pPr>
             <a:r>
-              <a:rPr lang="sv-SE" dirty="0" smtClean="0">
+              <a:rPr lang="sv-SE" sz="2400" dirty="0" smtClean="0">
                 <a:solidFill>
                   <a:srgbClr val="FF0000"/>
                 </a:solidFill>
@@ -7699,11 +8641,11 @@
               <a:t>5</a:t>
             </a:r>
             <a:r>
-              <a:rPr lang="sv-SE" dirty="0" smtClean="0"/>
+              <a:rPr lang="sv-SE" sz="2400" dirty="0" smtClean="0"/>
               <a:t>                     </a:t>
             </a:r>
             <a:r>
-              <a:rPr lang="sv-SE" dirty="0" smtClean="0">
+              <a:rPr lang="sv-SE" sz="2400" dirty="0" smtClean="0">
                 <a:solidFill>
                   <a:schemeClr val="accent5"/>
                 </a:solidFill>
@@ -7711,11 +8653,11 @@
               <a:t>3</a:t>
             </a:r>
             <a:r>
-              <a:rPr lang="sv-SE" dirty="0" smtClean="0"/>
+              <a:rPr lang="sv-SE" sz="2400" dirty="0" smtClean="0"/>
               <a:t>              </a:t>
             </a:r>
             <a:r>
-              <a:rPr lang="sv-SE" dirty="0" smtClean="0">
+              <a:rPr lang="sv-SE" sz="2400" dirty="0" smtClean="0">
                 <a:solidFill>
                   <a:schemeClr val="accent4"/>
                 </a:solidFill>
@@ -7723,18 +8665,18 @@
               <a:t>2 </a:t>
             </a:r>
             <a:r>
-              <a:rPr lang="sv-SE" dirty="0" smtClean="0"/>
+              <a:rPr lang="sv-SE" sz="2400" dirty="0" smtClean="0"/>
               <a:t>           </a:t>
             </a:r>
             <a:r>
-              <a:rPr lang="sv-SE" dirty="0" smtClean="0">
+              <a:rPr lang="sv-SE" sz="2400" dirty="0" smtClean="0">
                 <a:solidFill>
                   <a:schemeClr val="accent6"/>
                 </a:solidFill>
               </a:rPr>
               <a:t>22</a:t>
             </a:r>
-            <a:endParaRPr lang="en-US" dirty="0">
+            <a:endParaRPr lang="en-US" sz="2400" dirty="0">
               <a:solidFill>
                 <a:schemeClr val="accent6"/>
               </a:solidFill>
@@ -8529,7 +9471,7 @@
           </p:nvPr>
         </p:nvPicPr>
         <p:blipFill>
-          <a:blip r:embed="rId2" cstate="print">
+          <a:blip r:embed="rId3" cstate="print">
             <a:extLst>
               <a:ext uri="{28A0092B-C50C-407E-A947-70E740481C1C}">
                 <a14:useLocalDpi xmlns:a14="http://schemas.microsoft.com/office/drawing/2010/main" val="0"/>
@@ -8624,7 +9566,11 @@
           <a:p>
             <a:r>
               <a:rPr lang="sv-SE" dirty="0" smtClean="0"/>
-              <a:t>1200+ rader maskinkod</a:t>
+              <a:t>1100</a:t>
+            </a:r>
+            <a:r>
+              <a:rPr lang="sv-SE" dirty="0" smtClean="0"/>
+              <a:t>+ rader maskinkod</a:t>
             </a:r>
           </a:p>
           <a:p>
@@ -9356,7 +10302,7 @@
           </p:nvPr>
         </p:nvPicPr>
         <p:blipFill>
-          <a:blip r:embed="rId2">
+          <a:blip r:embed="rId3">
             <a:extLst>
               <a:ext uri="{28A0092B-C50C-407E-A947-70E740481C1C}">
                 <a14:useLocalDpi xmlns:a14="http://schemas.microsoft.com/office/drawing/2010/main" val="0"/>
@@ -9410,7 +10356,7 @@
           </p:nvPr>
         </p:nvPicPr>
         <p:blipFill>
-          <a:blip r:embed="rId3">
+          <a:blip r:embed="rId4">
             <a:extLst>
               <a:ext uri="{28A0092B-C50C-407E-A947-70E740481C1C}">
                 <a14:useLocalDpi xmlns:a14="http://schemas.microsoft.com/office/drawing/2010/main" val="0"/>

</xml_diff>

<commit_message>
Add notes to slide 9-12
</commit_message>
<xml_diff>
--- a/presentation/presentation_powerpoint.pptx
+++ b/presentation/presentation_powerpoint.pptx
@@ -3857,6 +3857,198 @@
 </p:notes>
 </file>
 
+<file path=ppt/notesSlides/notesSlide10.xml><?xml version="1.0" encoding="utf-8"?>
+<p:notes xmlns:a="http://schemas.openxmlformats.org/drawingml/2006/main" xmlns:r="http://schemas.openxmlformats.org/officeDocument/2006/relationships" xmlns:p="http://schemas.openxmlformats.org/presentationml/2006/main">
+  <p:cSld>
+    <p:spTree>
+      <p:nvGrpSpPr>
+        <p:cNvPr id="1" name=""/>
+        <p:cNvGrpSpPr/>
+        <p:nvPr/>
+      </p:nvGrpSpPr>
+      <p:grpSpPr>
+        <a:xfrm>
+          <a:off x="0" y="0"/>
+          <a:ext cx="0" cy="0"/>
+          <a:chOff x="0" y="0"/>
+          <a:chExt cx="0" cy="0"/>
+        </a:xfrm>
+      </p:grpSpPr>
+      <p:sp>
+        <p:nvSpPr>
+          <p:cNvPr id="2" name="Slide Image Placeholder 1"/>
+          <p:cNvSpPr>
+            <a:spLocks noGrp="1" noRot="1" noChangeAspect="1"/>
+          </p:cNvSpPr>
+          <p:nvPr>
+            <p:ph type="sldImg"/>
+          </p:nvPr>
+        </p:nvSpPr>
+        <p:spPr>
+          <a:xfrm>
+            <a:off x="1106488" y="812800"/>
+            <a:ext cx="5345112" cy="4008438"/>
+          </a:xfrm>
+        </p:spPr>
+      </p:sp>
+      <p:sp>
+        <p:nvSpPr>
+          <p:cNvPr id="3" name="Notes Placeholder 2"/>
+          <p:cNvSpPr>
+            <a:spLocks noGrp="1"/>
+          </p:cNvSpPr>
+          <p:nvPr>
+            <p:ph type="body" idx="1"/>
+          </p:nvPr>
+        </p:nvSpPr>
+        <p:spPr/>
+        <p:txBody>
+          <a:bodyPr/>
+          <a:lstStyle/>
+          <a:p>
+            <a:endParaRPr lang="en-US" dirty="0"/>
+          </a:p>
+        </p:txBody>
+      </p:sp>
+      <p:sp>
+        <p:nvSpPr>
+          <p:cNvPr id="4" name="Slide Number Placeholder 3"/>
+          <p:cNvSpPr>
+            <a:spLocks noGrp="1"/>
+          </p:cNvSpPr>
+          <p:nvPr>
+            <p:ph type="sldNum" sz="quarter" idx="10"/>
+          </p:nvPr>
+        </p:nvSpPr>
+        <p:spPr/>
+        <p:txBody>
+          <a:bodyPr/>
+          <a:lstStyle/>
+          <a:p>
+            <a:pPr lvl="0"/>
+            <a:fld id="{D0FC86B6-5EBF-43A2-AF19-9B4C147144EF}" type="slidenum">
+              <a:rPr lang="en-US" smtClean="0"/>
+              <a:t>15</a:t>
+            </a:fld>
+            <a:endParaRPr lang="en-US"/>
+          </a:p>
+        </p:txBody>
+      </p:sp>
+    </p:spTree>
+    <p:extLst>
+      <p:ext uri="{BB962C8B-B14F-4D97-AF65-F5344CB8AC3E}">
+        <p14:creationId xmlns:p14="http://schemas.microsoft.com/office/powerpoint/2010/main" val="3343875108"/>
+      </p:ext>
+    </p:extLst>
+  </p:cSld>
+  <p:clrMapOvr>
+    <a:masterClrMapping/>
+  </p:clrMapOvr>
+</p:notes>
+</file>
+
+<file path=ppt/notesSlides/notesSlide11.xml><?xml version="1.0" encoding="utf-8"?>
+<p:notes xmlns:a="http://schemas.openxmlformats.org/drawingml/2006/main" xmlns:r="http://schemas.openxmlformats.org/officeDocument/2006/relationships" xmlns:p="http://schemas.openxmlformats.org/presentationml/2006/main">
+  <p:cSld>
+    <p:spTree>
+      <p:nvGrpSpPr>
+        <p:cNvPr id="1" name=""/>
+        <p:cNvGrpSpPr/>
+        <p:nvPr/>
+      </p:nvGrpSpPr>
+      <p:grpSpPr>
+        <a:xfrm>
+          <a:off x="0" y="0"/>
+          <a:ext cx="0" cy="0"/>
+          <a:chOff x="0" y="0"/>
+          <a:chExt cx="0" cy="0"/>
+        </a:xfrm>
+      </p:grpSpPr>
+      <p:sp>
+        <p:nvSpPr>
+          <p:cNvPr id="2" name="Slide Image Placeholder 1"/>
+          <p:cNvSpPr>
+            <a:spLocks noGrp="1" noRot="1" noChangeAspect="1"/>
+          </p:cNvSpPr>
+          <p:nvPr>
+            <p:ph type="sldImg"/>
+          </p:nvPr>
+        </p:nvSpPr>
+        <p:spPr>
+          <a:xfrm>
+            <a:off x="1106488" y="812800"/>
+            <a:ext cx="5345112" cy="4008438"/>
+          </a:xfrm>
+        </p:spPr>
+      </p:sp>
+      <p:sp>
+        <p:nvSpPr>
+          <p:cNvPr id="3" name="Notes Placeholder 2"/>
+          <p:cNvSpPr>
+            <a:spLocks noGrp="1"/>
+          </p:cNvSpPr>
+          <p:nvPr>
+            <p:ph type="body" idx="1"/>
+          </p:nvPr>
+        </p:nvSpPr>
+        <p:spPr/>
+        <p:txBody>
+          <a:bodyPr/>
+          <a:lstStyle/>
+          <a:p>
+            <a:r>
+              <a:rPr lang="sv-SE" dirty="0" smtClean="0"/>
+              <a:t>Tack för</a:t>
+            </a:r>
+            <a:r>
+              <a:rPr lang="sv-SE" baseline="0" dirty="0" smtClean="0"/>
+              <a:t> er tid, och o</a:t>
+            </a:r>
+            <a:r>
+              <a:rPr lang="sv-SE" dirty="0" smtClean="0"/>
+              <a:t>m ni nu haft några funderingar under presentationen skulle vi vilja använda den kvarvarande tiden till en frågestund. Någon?</a:t>
+            </a:r>
+            <a:endParaRPr lang="en-US" dirty="0"/>
+          </a:p>
+        </p:txBody>
+      </p:sp>
+      <p:sp>
+        <p:nvSpPr>
+          <p:cNvPr id="4" name="Slide Number Placeholder 3"/>
+          <p:cNvSpPr>
+            <a:spLocks noGrp="1"/>
+          </p:cNvSpPr>
+          <p:nvPr>
+            <p:ph type="sldNum" sz="quarter" idx="10"/>
+          </p:nvPr>
+        </p:nvSpPr>
+        <p:spPr/>
+        <p:txBody>
+          <a:bodyPr/>
+          <a:lstStyle/>
+          <a:p>
+            <a:pPr lvl="0"/>
+            <a:fld id="{D0FC86B6-5EBF-43A2-AF19-9B4C147144EF}" type="slidenum">
+              <a:rPr lang="en-US" smtClean="0"/>
+              <a:t>16</a:t>
+            </a:fld>
+            <a:endParaRPr lang="en-US"/>
+          </a:p>
+        </p:txBody>
+      </p:sp>
+    </p:spTree>
+    <p:extLst>
+      <p:ext uri="{BB962C8B-B14F-4D97-AF65-F5344CB8AC3E}">
+        <p14:creationId xmlns:p14="http://schemas.microsoft.com/office/powerpoint/2010/main" val="249875799"/>
+      </p:ext>
+    </p:extLst>
+  </p:cSld>
+  <p:clrMapOvr>
+    <a:masterClrMapping/>
+  </p:clrMapOvr>
+</p:notes>
+</file>
+
 <file path=ppt/notesSlides/notesSlide2.xml><?xml version="1.0" encoding="utf-8"?>
 <p:notes xmlns:a="http://schemas.openxmlformats.org/drawingml/2006/main" xmlns:r="http://schemas.openxmlformats.org/officeDocument/2006/relationships" xmlns:p="http://schemas.openxmlformats.org/presentationml/2006/main">
   <p:cSld>
@@ -4170,12 +4362,7 @@
             <p:ph type="sldImg"/>
           </p:nvPr>
         </p:nvSpPr>
-        <p:spPr>
-          <a:xfrm>
-            <a:off x="1106488" y="812800"/>
-            <a:ext cx="5345112" cy="4008438"/>
-          </a:xfrm>
-        </p:spPr>
+        <p:spPr/>
       </p:sp>
       <p:sp>
         <p:nvSpPr>
@@ -4193,82 +4380,79 @@
           <a:lstStyle/>
           <a:p>
             <a:r>
-              <a:rPr lang="sv-SE" dirty="0" smtClean="0"/>
-              <a:t>Tangentbordsmotorn</a:t>
-            </a:r>
-            <a:r>
-              <a:rPr lang="sv-SE" baseline="0" dirty="0" smtClean="0"/>
-              <a:t> är i stort baserad på den vi använde tidigare i denna kurs, men med vissa förändringar specifikt för det här projektet.</a:t>
-            </a:r>
-          </a:p>
-          <a:p>
-            <a:endParaRPr lang="sv-SE" baseline="0" dirty="0" smtClean="0"/>
-          </a:p>
-          <a:p>
-            <a:r>
-              <a:rPr lang="sv-SE" baseline="0" dirty="0" smtClean="0"/>
-              <a:t>Den skriver inte någon data direkt till något minne, utan lägger helt enkelt </a:t>
-            </a:r>
-            <a:r>
-              <a:rPr lang="sv-SE" baseline="0" dirty="0" err="1" smtClean="0"/>
-              <a:t>tilekoderna</a:t>
-            </a:r>
-            <a:r>
-              <a:rPr lang="sv-SE" baseline="0" dirty="0" smtClean="0"/>
-              <a:t> för nedtryckta tangenter på datautgången, som kan läggas på bussen med RC-instruktionen</a:t>
-            </a:r>
-          </a:p>
-          <a:p>
-            <a:endParaRPr lang="sv-SE" baseline="0" dirty="0" smtClean="0"/>
-          </a:p>
-          <a:p>
-            <a:r>
-              <a:rPr lang="sv-SE" baseline="0" dirty="0" smtClean="0"/>
-              <a:t>Tangentbordsmotorn har inte heller någon cursorlogik, utan allt det sköts på </a:t>
-            </a:r>
-            <a:r>
-              <a:rPr lang="sv-SE" baseline="0" dirty="0" err="1" smtClean="0"/>
-              <a:t>assemblynivån</a:t>
-            </a:r>
-            <a:r>
-              <a:rPr lang="sv-SE" baseline="0" dirty="0" smtClean="0"/>
-              <a:t>. </a:t>
-            </a:r>
-          </a:p>
-          <a:p>
-            <a:endParaRPr lang="sv-SE" baseline="0" dirty="0" smtClean="0"/>
-          </a:p>
-          <a:p>
-            <a:r>
-              <a:rPr lang="sv-SE" baseline="0" dirty="0" smtClean="0"/>
-              <a:t>Allt detta motiveras av att en och samma tangent kan ha olika betydelser beroende på sammanhanget, t.ex. kan en siffra tolkas som en del av ett matematiskt uttryck, eller som en skalningsparameter.</a:t>
-            </a:r>
-          </a:p>
-          <a:p>
-            <a:endParaRPr lang="sv-SE" baseline="0" dirty="0" smtClean="0"/>
-          </a:p>
-          <a:p>
-            <a:r>
-              <a:rPr lang="sv-SE" baseline="0" dirty="0" smtClean="0"/>
-              <a:t>Tangentbordsmotorn är därför mycket fokuserad på en enda uppgift: att hålla den senaste nedtrycka tangenten tillgänglig för processorn.</a:t>
-            </a:r>
-          </a:p>
-          <a:p>
-            <a:endParaRPr lang="sv-SE" baseline="0" dirty="0" smtClean="0"/>
-          </a:p>
-          <a:p>
-            <a:r>
-              <a:rPr lang="sv-SE" baseline="0" dirty="0" smtClean="0"/>
-              <a:t>Och den håller det värdet tills en av två saker sker: att processorn läser av värdet och då skickar en </a:t>
-            </a:r>
-            <a:r>
-              <a:rPr lang="sv-SE" baseline="0" dirty="0" err="1" smtClean="0"/>
-              <a:t>read_confirm</a:t>
-            </a:r>
-            <a:r>
-              <a:rPr lang="sv-SE" baseline="0" dirty="0" smtClean="0"/>
-              <a:t> – signal, eller en ny tangent ersätter den föregående. </a:t>
-            </a:r>
+              <a:rPr lang="sv-SE" sz="2000" b="0" i="0" u="none" strike="noStrike" kern="1200" cap="none" dirty="0" smtClean="0">
+                <a:ln>
+                  <a:noFill/>
+                </a:ln>
+                <a:effectLst/>
+                <a:latin typeface="Liberation Sans" pitchFamily="18"/>
+              </a:rPr>
+              <a:t>CPU</a:t>
+            </a:r>
+            <a:r>
+              <a:rPr lang="sv-SE" sz="2000" b="0" i="0" u="none" strike="noStrike" kern="1200" cap="none" baseline="0" dirty="0" smtClean="0">
+                <a:ln>
+                  <a:noFill/>
+                </a:ln>
+                <a:effectLst/>
+                <a:latin typeface="Liberation Sans" pitchFamily="18"/>
+              </a:rPr>
+              <a:t>:n </a:t>
+            </a:r>
+            <a:r>
+              <a:rPr lang="sv-SE" sz="2000" b="0" i="0" u="none" strike="noStrike" kern="1200" cap="none" dirty="0" smtClean="0">
+                <a:ln>
+                  <a:noFill/>
+                </a:ln>
+                <a:effectLst/>
+                <a:latin typeface="Liberation Sans" pitchFamily="18"/>
+              </a:rPr>
+              <a:t>programmeras med maskinkod.</a:t>
+            </a:r>
+          </a:p>
+          <a:p>
+            <a:endParaRPr lang="sv-SE" sz="2000" b="0" i="0" u="none" strike="noStrike" kern="1200" cap="none" dirty="0" smtClean="0">
+              <a:ln>
+                <a:noFill/>
+              </a:ln>
+              <a:effectLst/>
+              <a:latin typeface="Liberation Sans" pitchFamily="18"/>
+            </a:endParaRPr>
+          </a:p>
+          <a:p>
+            <a:r>
+              <a:rPr lang="sv-SE" sz="2000" b="0" i="0" u="none" strike="noStrike" kern="1200" cap="none" dirty="0" smtClean="0">
+                <a:ln>
+                  <a:noFill/>
+                </a:ln>
+                <a:effectLst/>
+                <a:latin typeface="Liberation Sans" pitchFamily="18"/>
+              </a:rPr>
+              <a:t>Support för 27 instruktioner.</a:t>
+            </a:r>
+            <a:r>
+              <a:rPr lang="sv-SE" sz="2000" b="0" i="0" u="none" strike="noStrike" kern="1200" cap="none" baseline="0" dirty="0" smtClean="0">
+                <a:ln>
+                  <a:noFill/>
+                </a:ln>
+                <a:effectLst/>
+                <a:latin typeface="Liberation Sans" pitchFamily="18"/>
+              </a:rPr>
+              <a:t> ADD,LSL,BRA, plus special (grafik/tangentbord) (oanvända). K</a:t>
+            </a:r>
+            <a:r>
+              <a:rPr lang="sv-SE" sz="2000" b="0" i="0" u="none" strike="noStrike" kern="1200" cap="none" dirty="0" smtClean="0">
+                <a:ln>
+                  <a:noFill/>
+                </a:ln>
+                <a:effectLst/>
+                <a:latin typeface="Liberation Sans" pitchFamily="18"/>
+              </a:rPr>
+              <a:t>an kallas på med 3 moder. Åtta generella register (ej HR), och 5 olika flaggor för hopp.</a:t>
+            </a:r>
+          </a:p>
+          <a:p>
+            <a:endParaRPr lang="sv-SE" dirty="0"/>
           </a:p>
         </p:txBody>
       </p:sp>
@@ -4289,17 +4473,17 @@
           <a:p>
             <a:pPr lvl="0"/>
             <a:fld id="{D0FC86B6-5EBF-43A2-AF19-9B4C147144EF}" type="slidenum">
-              <a:rPr lang="en-US" smtClean="0"/>
-              <a:t>13</a:t>
+              <a:rPr lang="sv-SE" smtClean="0"/>
+              <a:t>9</a:t>
             </a:fld>
-            <a:endParaRPr lang="en-US"/>
+            <a:endParaRPr lang="sv-SE"/>
           </a:p>
         </p:txBody>
       </p:sp>
     </p:spTree>
     <p:extLst>
       <p:ext uri="{BB962C8B-B14F-4D97-AF65-F5344CB8AC3E}">
-        <p14:creationId xmlns:p14="http://schemas.microsoft.com/office/powerpoint/2010/main" val="532189939"/>
+        <p14:creationId xmlns:p14="http://schemas.microsoft.com/office/powerpoint/2010/main" val="3737433917"/>
       </p:ext>
     </p:extLst>
   </p:cSld>
@@ -4359,82 +4543,54 @@
           <a:lstStyle/>
           <a:p>
             <a:r>
-              <a:rPr lang="sv-SE" dirty="0" smtClean="0"/>
-              <a:t>Med detta kan vi nu avslutningsvis sammanfatta det</a:t>
-            </a:r>
-            <a:r>
-              <a:rPr lang="sv-SE" baseline="0" dirty="0" smtClean="0"/>
-              <a:t> faktiska programflödet:</a:t>
-            </a:r>
-          </a:p>
-          <a:p>
-            <a:endParaRPr lang="sv-SE" baseline="0" dirty="0" smtClean="0"/>
-          </a:p>
-          <a:p>
-            <a:r>
-              <a:rPr lang="sv-SE" baseline="0" dirty="0" smtClean="0"/>
-              <a:t>Processorn står i en loop som hela tiden läser av värdet från tangentsbordmotorn med RC, och när en tangent äntligen registreras läser processorn av det värdet (alltså </a:t>
-            </a:r>
-            <a:r>
-              <a:rPr lang="sv-SE" baseline="0" dirty="0" err="1" smtClean="0"/>
-              <a:t>tilekoden</a:t>
-            </a:r>
-            <a:r>
-              <a:rPr lang="sv-SE" baseline="0" dirty="0" smtClean="0"/>
-              <a:t>), och går vidare med programlogiken.</a:t>
-            </a:r>
-          </a:p>
-          <a:p>
-            <a:endParaRPr lang="sv-SE" baseline="0" dirty="0" smtClean="0"/>
-          </a:p>
-          <a:p>
-            <a:r>
-              <a:rPr lang="sv-SE" baseline="0" dirty="0" smtClean="0"/>
-              <a:t>Vi bestämmer, beroende på sammanhanget vilken typ av input det rör sig: heltal, decimaltal, parameter, operator, osv.</a:t>
-            </a:r>
-          </a:p>
-          <a:p>
-            <a:endParaRPr lang="sv-SE" baseline="0" dirty="0" smtClean="0"/>
-          </a:p>
-          <a:p>
-            <a:r>
-              <a:rPr lang="sv-SE" baseline="0" dirty="0" smtClean="0"/>
-              <a:t>Sedan bestäms det vilken typ av handling som ska utföras på det inmatade värdet. Om det är en operator eller </a:t>
-            </a:r>
-            <a:r>
-              <a:rPr lang="sv-SE" baseline="0" dirty="0" err="1" smtClean="0"/>
-              <a:t>operand</a:t>
-            </a:r>
-            <a:r>
-              <a:rPr lang="sv-SE" baseline="0" dirty="0" smtClean="0"/>
-              <a:t> ska det läggas på evalueringsstacken, kanske ska det vara en modifierare på kommande inmatningar såsom ’N’ eller ’P’, eller om det är </a:t>
-            </a:r>
-            <a:r>
-              <a:rPr lang="sv-SE" baseline="0" dirty="0" err="1" smtClean="0"/>
-              <a:t>enter</a:t>
-            </a:r>
-            <a:r>
-              <a:rPr lang="sv-SE" baseline="0" dirty="0" smtClean="0"/>
-              <a:t> ska vi antingen evaluera uttrycket eller plotta funktionen.</a:t>
-            </a:r>
-          </a:p>
-          <a:p>
-            <a:endParaRPr lang="sv-SE" baseline="0" dirty="0" smtClean="0"/>
-          </a:p>
-          <a:p>
-            <a:r>
-              <a:rPr lang="sv-SE" baseline="0" dirty="0" smtClean="0"/>
-              <a:t>När det är klart väntar vi återigen på en ny inmatning och cykeln börjar om.</a:t>
-            </a:r>
-          </a:p>
-          <a:p>
-            <a:endParaRPr lang="sv-SE" baseline="0" dirty="0" smtClean="0"/>
-          </a:p>
-          <a:p>
-            <a:r>
-              <a:rPr lang="sv-SE" baseline="0" dirty="0" smtClean="0"/>
-              <a:t>Dessa övergripande steg innefattar alla koncept och komponenter som den här presentationen tagit upp, och bygger tillsammans upp en fullt fungerande hård-och mjukvaruplattform för en grafräknare.</a:t>
-            </a:r>
+              <a:rPr lang="en-US" baseline="0" dirty="0" err="1" smtClean="0"/>
+              <a:t>Instruktioner</a:t>
+            </a:r>
+            <a:r>
+              <a:rPr lang="en-US" baseline="0" dirty="0" smtClean="0"/>
+              <a:t>, register, </a:t>
+            </a:r>
+            <a:r>
+              <a:rPr lang="en-US" baseline="0" dirty="0" err="1" smtClean="0"/>
+              <a:t>minnesmod</a:t>
+            </a:r>
+            <a:r>
+              <a:rPr lang="en-US" baseline="0" dirty="0" smtClean="0"/>
+              <a:t> </a:t>
+            </a:r>
+            <a:r>
+              <a:rPr lang="en-US" baseline="0" dirty="0" err="1" smtClean="0"/>
+              <a:t>få</a:t>
+            </a:r>
+            <a:r>
+              <a:rPr lang="en-US" baseline="0" dirty="0" smtClean="0"/>
+              <a:t> </a:t>
+            </a:r>
+            <a:r>
+              <a:rPr lang="en-US" baseline="0" dirty="0" err="1" smtClean="0"/>
+              <a:t>bitar</a:t>
+            </a:r>
+            <a:r>
+              <a:rPr lang="en-US" baseline="0" dirty="0" smtClean="0"/>
+              <a:t>, </a:t>
+            </a:r>
+            <a:r>
+              <a:rPr lang="en-US" baseline="0" dirty="0" err="1" smtClean="0"/>
+              <a:t>adressdel</a:t>
+            </a:r>
+            <a:r>
+              <a:rPr lang="en-US" baseline="0" dirty="0" smtClean="0"/>
+              <a:t> </a:t>
+            </a:r>
+            <a:r>
+              <a:rPr lang="en-US" baseline="0" dirty="0" err="1" smtClean="0"/>
+              <a:t>resten</a:t>
+            </a:r>
+            <a:r>
+              <a:rPr lang="en-US" baseline="0" dirty="0" smtClean="0"/>
+              <a:t> (32)</a:t>
+            </a:r>
+            <a:endParaRPr lang="en-US" dirty="0"/>
           </a:p>
         </p:txBody>
       </p:sp>
@@ -4455,17 +4611,17 @@
           <a:p>
             <a:pPr lvl="0"/>
             <a:fld id="{D0FC86B6-5EBF-43A2-AF19-9B4C147144EF}" type="slidenum">
-              <a:rPr lang="en-US" smtClean="0"/>
-              <a:t>14</a:t>
+              <a:rPr lang="sv-SE" smtClean="0"/>
+              <a:t>10</a:t>
             </a:fld>
-            <a:endParaRPr lang="en-US"/>
+            <a:endParaRPr lang="sv-SE"/>
           </a:p>
         </p:txBody>
       </p:sp>
     </p:spTree>
     <p:extLst>
       <p:ext uri="{BB962C8B-B14F-4D97-AF65-F5344CB8AC3E}">
-        <p14:creationId xmlns:p14="http://schemas.microsoft.com/office/powerpoint/2010/main" val="1130169636"/>
+        <p14:creationId xmlns:p14="http://schemas.microsoft.com/office/powerpoint/2010/main" val="2345692999"/>
       </p:ext>
     </p:extLst>
   </p:cSld>
@@ -4502,12 +4658,7 @@
             <p:ph type="sldImg"/>
           </p:nvPr>
         </p:nvSpPr>
-        <p:spPr>
-          <a:xfrm>
-            <a:off x="1106488" y="812800"/>
-            <a:ext cx="5345112" cy="4008438"/>
-          </a:xfrm>
-        </p:spPr>
+        <p:spPr/>
       </p:sp>
       <p:sp>
         <p:nvSpPr>
@@ -4524,7 +4675,23 @@
           <a:bodyPr/>
           <a:lstStyle/>
           <a:p>
-            <a:endParaRPr lang="en-US" dirty="0"/>
+            <a:r>
+              <a:rPr lang="sv-SE" noProof="0" dirty="0" smtClean="0"/>
+              <a:t>Moder, har de vanliga, ej indexerad (labels). Direkt , indirekt </a:t>
+            </a:r>
+            <a:r>
+              <a:rPr lang="sv-SE" baseline="0" noProof="0" dirty="0" smtClean="0"/>
+              <a:t>som förväntat. </a:t>
+            </a:r>
+            <a:r>
+              <a:rPr lang="sv-SE" noProof="0" dirty="0" smtClean="0"/>
+              <a:t>Omedelbar, 32 bitar,</a:t>
+            </a:r>
+            <a:r>
+              <a:rPr lang="sv-SE" baseline="0" noProof="0" dirty="0" smtClean="0"/>
+              <a:t> nästa rad. Sillescript: direktaddr default, hakas $~ instr.</a:t>
+            </a:r>
+            <a:endParaRPr lang="sv-SE" noProof="0" dirty="0"/>
           </a:p>
         </p:txBody>
       </p:sp>
@@ -4545,17 +4712,17 @@
           <a:p>
             <a:pPr lvl="0"/>
             <a:fld id="{D0FC86B6-5EBF-43A2-AF19-9B4C147144EF}" type="slidenum">
-              <a:rPr lang="en-US" smtClean="0"/>
-              <a:t>15</a:t>
+              <a:rPr lang="sv-SE" smtClean="0"/>
+              <a:t>11</a:t>
             </a:fld>
-            <a:endParaRPr lang="en-US"/>
+            <a:endParaRPr lang="sv-SE"/>
           </a:p>
         </p:txBody>
       </p:sp>
     </p:spTree>
     <p:extLst>
       <p:ext uri="{BB962C8B-B14F-4D97-AF65-F5344CB8AC3E}">
-        <p14:creationId xmlns:p14="http://schemas.microsoft.com/office/powerpoint/2010/main" val="3343875108"/>
+        <p14:creationId xmlns:p14="http://schemas.microsoft.com/office/powerpoint/2010/main" val="3100289925"/>
       </p:ext>
     </p:extLst>
   </p:cSld>
@@ -4592,6 +4759,191 @@
             <p:ph type="sldImg"/>
           </p:nvPr>
         </p:nvSpPr>
+        <p:spPr/>
+      </p:sp>
+      <p:sp>
+        <p:nvSpPr>
+          <p:cNvPr id="3" name="Notes Placeholder 2"/>
+          <p:cNvSpPr>
+            <a:spLocks noGrp="1"/>
+          </p:cNvSpPr>
+          <p:nvPr>
+            <p:ph type="body" idx="1"/>
+          </p:nvPr>
+        </p:nvSpPr>
+        <p:spPr/>
+        <p:txBody>
+          <a:bodyPr/>
+          <a:lstStyle/>
+          <a:p>
+            <a:pPr marL="216000" marR="0" indent="-216000" defTabSz="914400" rtl="0" eaLnBrk="1" fontAlgn="auto" latinLnBrk="0" hangingPunct="0">
+              <a:lnSpc>
+                <a:spcPct val="100000"/>
+              </a:lnSpc>
+              <a:spcBef>
+                <a:spcPts val="0"/>
+              </a:spcBef>
+              <a:spcAft>
+                <a:spcPts val="0"/>
+              </a:spcAft>
+              <a:buClrTx/>
+              <a:buSzTx/>
+              <a:buFontTx/>
+              <a:buNone/>
+              <a:tabLst/>
+              <a:defRPr/>
+            </a:pPr>
+            <a:r>
+              <a:rPr lang="en-US" dirty="0" err="1" smtClean="0"/>
+              <a:t>Disp</a:t>
+            </a:r>
+            <a:r>
+              <a:rPr lang="en-US" dirty="0" smtClean="0"/>
+              <a:t> 640x480px </a:t>
+            </a:r>
+            <a:r>
+              <a:rPr lang="en-US" dirty="0" err="1" smtClean="0"/>
+              <a:t>uppdelat</a:t>
+            </a:r>
+            <a:r>
+              <a:rPr lang="en-US" dirty="0" smtClean="0"/>
+              <a:t>. </a:t>
+            </a:r>
+            <a:r>
+              <a:rPr lang="en-US" dirty="0" err="1" smtClean="0"/>
+              <a:t>Svartvit</a:t>
+            </a:r>
+            <a:r>
+              <a:rPr lang="en-US" baseline="0" dirty="0" smtClean="0"/>
+              <a:t> bitmap </a:t>
+            </a:r>
+            <a:r>
+              <a:rPr lang="en-US" baseline="0" dirty="0" err="1" smtClean="0"/>
+              <a:t>på</a:t>
+            </a:r>
+            <a:r>
+              <a:rPr lang="en-US" baseline="0" dirty="0" smtClean="0"/>
+              <a:t> </a:t>
+            </a:r>
+            <a:r>
+              <a:rPr lang="en-US" baseline="0" dirty="0" err="1" smtClean="0"/>
+              <a:t>grafhalvan</a:t>
+            </a:r>
+            <a:r>
+              <a:rPr lang="en-US" baseline="0" dirty="0" smtClean="0"/>
+              <a:t>. </a:t>
+            </a:r>
+            <a:r>
+              <a:rPr lang="en-US" baseline="0" dirty="0" err="1" smtClean="0"/>
+              <a:t>Konsoll</a:t>
+            </a:r>
+            <a:r>
+              <a:rPr lang="en-US" baseline="0" dirty="0" smtClean="0"/>
+              <a:t> </a:t>
+            </a:r>
+            <a:r>
+              <a:rPr lang="en-GB" baseline="0" dirty="0" err="1" smtClean="0"/>
+              <a:t>minskad</a:t>
+            </a:r>
+            <a:r>
+              <a:rPr lang="en-GB" baseline="0" dirty="0" smtClean="0"/>
+              <a:t> tile 8x16px. Store </a:t>
+            </a:r>
+            <a:r>
+              <a:rPr lang="en-GB" baseline="0" dirty="0" err="1" smtClean="0"/>
+              <a:t>båda</a:t>
+            </a:r>
+            <a:r>
+              <a:rPr lang="en-GB" baseline="0" dirty="0" smtClean="0"/>
+              <a:t>. </a:t>
+            </a:r>
+            <a:r>
+              <a:rPr lang="en-GB" baseline="0" dirty="0" err="1" smtClean="0"/>
+              <a:t>Övrigt</a:t>
+            </a:r>
+            <a:r>
+              <a:rPr lang="en-GB" baseline="0" dirty="0" smtClean="0"/>
+              <a:t>, </a:t>
+            </a:r>
+            <a:r>
+              <a:rPr lang="en-GB" baseline="0" dirty="0" err="1" smtClean="0"/>
+              <a:t>labben</a:t>
+            </a:r>
+            <a:r>
+              <a:rPr lang="en-GB" baseline="0" dirty="0" smtClean="0"/>
+              <a:t>.</a:t>
+            </a:r>
+            <a:endParaRPr lang="en-US" dirty="0" smtClean="0"/>
+          </a:p>
+          <a:p>
+            <a:endParaRPr lang="sv-SE" dirty="0"/>
+          </a:p>
+        </p:txBody>
+      </p:sp>
+      <p:sp>
+        <p:nvSpPr>
+          <p:cNvPr id="4" name="Slide Number Placeholder 3"/>
+          <p:cNvSpPr>
+            <a:spLocks noGrp="1"/>
+          </p:cNvSpPr>
+          <p:nvPr>
+            <p:ph type="sldNum" sz="quarter" idx="10"/>
+          </p:nvPr>
+        </p:nvSpPr>
+        <p:spPr/>
+        <p:txBody>
+          <a:bodyPr/>
+          <a:lstStyle/>
+          <a:p>
+            <a:pPr lvl="0"/>
+            <a:fld id="{D0FC86B6-5EBF-43A2-AF19-9B4C147144EF}" type="slidenum">
+              <a:rPr lang="sv-SE" smtClean="0"/>
+              <a:t>12</a:t>
+            </a:fld>
+            <a:endParaRPr lang="sv-SE"/>
+          </a:p>
+        </p:txBody>
+      </p:sp>
+    </p:spTree>
+    <p:extLst>
+      <p:ext uri="{BB962C8B-B14F-4D97-AF65-F5344CB8AC3E}">
+        <p14:creationId xmlns:p14="http://schemas.microsoft.com/office/powerpoint/2010/main" val="2663983068"/>
+      </p:ext>
+    </p:extLst>
+  </p:cSld>
+  <p:clrMapOvr>
+    <a:masterClrMapping/>
+  </p:clrMapOvr>
+</p:notes>
+</file>
+
+<file path=ppt/notesSlides/notesSlide8.xml><?xml version="1.0" encoding="utf-8"?>
+<p:notes xmlns:a="http://schemas.openxmlformats.org/drawingml/2006/main" xmlns:r="http://schemas.openxmlformats.org/officeDocument/2006/relationships" xmlns:p="http://schemas.openxmlformats.org/presentationml/2006/main">
+  <p:cSld>
+    <p:spTree>
+      <p:nvGrpSpPr>
+        <p:cNvPr id="1" name=""/>
+        <p:cNvGrpSpPr/>
+        <p:nvPr/>
+      </p:nvGrpSpPr>
+      <p:grpSpPr>
+        <a:xfrm>
+          <a:off x="0" y="0"/>
+          <a:ext cx="0" cy="0"/>
+          <a:chOff x="0" y="0"/>
+          <a:chExt cx="0" cy="0"/>
+        </a:xfrm>
+      </p:grpSpPr>
+      <p:sp>
+        <p:nvSpPr>
+          <p:cNvPr id="2" name="Slide Image Placeholder 1"/>
+          <p:cNvSpPr>
+            <a:spLocks noGrp="1" noRot="1" noChangeAspect="1"/>
+          </p:cNvSpPr>
+          <p:nvPr>
+            <p:ph type="sldImg"/>
+          </p:nvPr>
+        </p:nvSpPr>
         <p:spPr>
           <a:xfrm>
             <a:off x="1106488" y="812800"/>
@@ -4616,17 +4968,81 @@
           <a:p>
             <a:r>
               <a:rPr lang="sv-SE" dirty="0" smtClean="0"/>
-              <a:t>Tack för</a:t>
+              <a:t>Tangentbordsmotorn</a:t>
             </a:r>
             <a:r>
               <a:rPr lang="sv-SE" baseline="0" dirty="0" smtClean="0"/>
-              <a:t> er tid, och o</a:t>
-            </a:r>
-            <a:r>
-              <a:rPr lang="sv-SE" dirty="0" smtClean="0"/>
-              <a:t>m ni nu haft några funderingar under presentationen skulle vi vilja använda den kvarvarande tiden till en frågestund. Någon?</a:t>
-            </a:r>
-            <a:endParaRPr lang="en-US" dirty="0"/>
+              <a:t> är i stort baserad på den vi använde tidigare i denna kurs, men med vissa förändringar specifikt för det här projektet.</a:t>
+            </a:r>
+          </a:p>
+          <a:p>
+            <a:endParaRPr lang="sv-SE" baseline="0" dirty="0" smtClean="0"/>
+          </a:p>
+          <a:p>
+            <a:r>
+              <a:rPr lang="sv-SE" baseline="0" dirty="0" smtClean="0"/>
+              <a:t>Den skriver inte någon data direkt till något minne, utan lägger helt enkelt </a:t>
+            </a:r>
+            <a:r>
+              <a:rPr lang="sv-SE" baseline="0" dirty="0" err="1" smtClean="0"/>
+              <a:t>tilekoderna</a:t>
+            </a:r>
+            <a:r>
+              <a:rPr lang="sv-SE" baseline="0" dirty="0" smtClean="0"/>
+              <a:t> för nedtryckta tangenter på datautgången, som kan läggas på bussen med RC-instruktionen</a:t>
+            </a:r>
+          </a:p>
+          <a:p>
+            <a:endParaRPr lang="sv-SE" baseline="0" dirty="0" smtClean="0"/>
+          </a:p>
+          <a:p>
+            <a:r>
+              <a:rPr lang="sv-SE" baseline="0" dirty="0" smtClean="0"/>
+              <a:t>Tangentbordsmotorn har inte heller någon cursorlogik, utan allt det sköts på </a:t>
+            </a:r>
+            <a:r>
+              <a:rPr lang="sv-SE" baseline="0" dirty="0" err="1" smtClean="0"/>
+              <a:t>assemblynivån</a:t>
+            </a:r>
+            <a:r>
+              <a:rPr lang="sv-SE" baseline="0" dirty="0" smtClean="0"/>
+              <a:t>. </a:t>
+            </a:r>
+          </a:p>
+          <a:p>
+            <a:endParaRPr lang="sv-SE" baseline="0" dirty="0" smtClean="0"/>
+          </a:p>
+          <a:p>
+            <a:r>
+              <a:rPr lang="sv-SE" baseline="0" dirty="0" smtClean="0"/>
+              <a:t>Allt detta motiveras av att en och samma tangent kan ha olika betydelser beroende på sammanhanget, t.ex. kan en siffra tolkas som en del av ett matematiskt uttryck, eller som en skalningsparameter.</a:t>
+            </a:r>
+          </a:p>
+          <a:p>
+            <a:endParaRPr lang="sv-SE" baseline="0" dirty="0" smtClean="0"/>
+          </a:p>
+          <a:p>
+            <a:r>
+              <a:rPr lang="sv-SE" baseline="0" dirty="0" smtClean="0"/>
+              <a:t>Tangentbordsmotorn är därför mycket fokuserad på en enda uppgift: att hålla den senaste nedtrycka tangenten tillgänglig för processorn.</a:t>
+            </a:r>
+          </a:p>
+          <a:p>
+            <a:endParaRPr lang="sv-SE" baseline="0" dirty="0" smtClean="0"/>
+          </a:p>
+          <a:p>
+            <a:r>
+              <a:rPr lang="sv-SE" baseline="0" dirty="0" smtClean="0"/>
+              <a:t>Och den håller det värdet tills en av två saker sker: att processorn läser av värdet och då skickar en </a:t>
+            </a:r>
+            <a:r>
+              <a:rPr lang="sv-SE" baseline="0" dirty="0" err="1" smtClean="0"/>
+              <a:t>read_confirm</a:t>
+            </a:r>
+            <a:r>
+              <a:rPr lang="sv-SE" baseline="0" dirty="0" smtClean="0"/>
+              <a:t> – signal, eller en ny tangent ersätter den föregående. </a:t>
+            </a:r>
           </a:p>
         </p:txBody>
       </p:sp>
@@ -4648,7 +5064,7 @@
             <a:pPr lvl="0"/>
             <a:fld id="{D0FC86B6-5EBF-43A2-AF19-9B4C147144EF}" type="slidenum">
               <a:rPr lang="en-US" smtClean="0"/>
-              <a:t>16</a:t>
+              <a:t>13</a:t>
             </a:fld>
             <a:endParaRPr lang="en-US"/>
           </a:p>
@@ -4657,7 +5073,173 @@
     </p:spTree>
     <p:extLst>
       <p:ext uri="{BB962C8B-B14F-4D97-AF65-F5344CB8AC3E}">
-        <p14:creationId xmlns:p14="http://schemas.microsoft.com/office/powerpoint/2010/main" val="249875799"/>
+        <p14:creationId xmlns:p14="http://schemas.microsoft.com/office/powerpoint/2010/main" val="532189939"/>
+      </p:ext>
+    </p:extLst>
+  </p:cSld>
+  <p:clrMapOvr>
+    <a:masterClrMapping/>
+  </p:clrMapOvr>
+</p:notes>
+</file>
+
+<file path=ppt/notesSlides/notesSlide9.xml><?xml version="1.0" encoding="utf-8"?>
+<p:notes xmlns:a="http://schemas.openxmlformats.org/drawingml/2006/main" xmlns:r="http://schemas.openxmlformats.org/officeDocument/2006/relationships" xmlns:p="http://schemas.openxmlformats.org/presentationml/2006/main">
+  <p:cSld>
+    <p:spTree>
+      <p:nvGrpSpPr>
+        <p:cNvPr id="1" name=""/>
+        <p:cNvGrpSpPr/>
+        <p:nvPr/>
+      </p:nvGrpSpPr>
+      <p:grpSpPr>
+        <a:xfrm>
+          <a:off x="0" y="0"/>
+          <a:ext cx="0" cy="0"/>
+          <a:chOff x="0" y="0"/>
+          <a:chExt cx="0" cy="0"/>
+        </a:xfrm>
+      </p:grpSpPr>
+      <p:sp>
+        <p:nvSpPr>
+          <p:cNvPr id="2" name="Slide Image Placeholder 1"/>
+          <p:cNvSpPr>
+            <a:spLocks noGrp="1" noRot="1" noChangeAspect="1"/>
+          </p:cNvSpPr>
+          <p:nvPr>
+            <p:ph type="sldImg"/>
+          </p:nvPr>
+        </p:nvSpPr>
+        <p:spPr>
+          <a:xfrm>
+            <a:off x="1106488" y="812800"/>
+            <a:ext cx="5345112" cy="4008438"/>
+          </a:xfrm>
+        </p:spPr>
+      </p:sp>
+      <p:sp>
+        <p:nvSpPr>
+          <p:cNvPr id="3" name="Notes Placeholder 2"/>
+          <p:cNvSpPr>
+            <a:spLocks noGrp="1"/>
+          </p:cNvSpPr>
+          <p:nvPr>
+            <p:ph type="body" idx="1"/>
+          </p:nvPr>
+        </p:nvSpPr>
+        <p:spPr/>
+        <p:txBody>
+          <a:bodyPr/>
+          <a:lstStyle/>
+          <a:p>
+            <a:r>
+              <a:rPr lang="sv-SE" dirty="0" smtClean="0"/>
+              <a:t>Med detta kan vi nu avslutningsvis sammanfatta det</a:t>
+            </a:r>
+            <a:r>
+              <a:rPr lang="sv-SE" baseline="0" dirty="0" smtClean="0"/>
+              <a:t> faktiska programflödet:</a:t>
+            </a:r>
+          </a:p>
+          <a:p>
+            <a:endParaRPr lang="sv-SE" baseline="0" dirty="0" smtClean="0"/>
+          </a:p>
+          <a:p>
+            <a:r>
+              <a:rPr lang="sv-SE" baseline="0" dirty="0" smtClean="0"/>
+              <a:t>Processorn står i en loop som hela tiden läser av värdet från tangentsbordmotorn med RC, och när en tangent äntligen registreras läser processorn av det värdet (alltså </a:t>
+            </a:r>
+            <a:r>
+              <a:rPr lang="sv-SE" baseline="0" dirty="0" err="1" smtClean="0"/>
+              <a:t>tilekoden</a:t>
+            </a:r>
+            <a:r>
+              <a:rPr lang="sv-SE" baseline="0" dirty="0" smtClean="0"/>
+              <a:t>), och går vidare med programlogiken.</a:t>
+            </a:r>
+          </a:p>
+          <a:p>
+            <a:endParaRPr lang="sv-SE" baseline="0" dirty="0" smtClean="0"/>
+          </a:p>
+          <a:p>
+            <a:r>
+              <a:rPr lang="sv-SE" baseline="0" dirty="0" smtClean="0"/>
+              <a:t>Vi bestämmer, beroende på sammanhanget vilken typ av input det rör sig: heltal, decimaltal, parameter, operator, osv.</a:t>
+            </a:r>
+          </a:p>
+          <a:p>
+            <a:endParaRPr lang="sv-SE" baseline="0" dirty="0" smtClean="0"/>
+          </a:p>
+          <a:p>
+            <a:r>
+              <a:rPr lang="sv-SE" baseline="0" dirty="0" smtClean="0"/>
+              <a:t>Sedan bestäms det vilken typ av handling som ska utföras på det inmatade värdet. Om det är en operator eller </a:t>
+            </a:r>
+            <a:r>
+              <a:rPr lang="sv-SE" baseline="0" dirty="0" err="1" smtClean="0"/>
+              <a:t>operand</a:t>
+            </a:r>
+            <a:r>
+              <a:rPr lang="sv-SE" baseline="0" dirty="0" smtClean="0"/>
+              <a:t> ska det läggas på evalueringsstacken, kanske ska det vara en modifierare på kommande inmatningar såsom ’N’ eller ’P’, eller om det är </a:t>
+            </a:r>
+            <a:r>
+              <a:rPr lang="sv-SE" baseline="0" dirty="0" err="1" smtClean="0"/>
+              <a:t>enter</a:t>
+            </a:r>
+            <a:r>
+              <a:rPr lang="sv-SE" baseline="0" dirty="0" smtClean="0"/>
+              <a:t> ska vi antingen evaluera uttrycket eller plotta funktionen.</a:t>
+            </a:r>
+          </a:p>
+          <a:p>
+            <a:endParaRPr lang="sv-SE" baseline="0" dirty="0" smtClean="0"/>
+          </a:p>
+          <a:p>
+            <a:r>
+              <a:rPr lang="sv-SE" baseline="0" dirty="0" smtClean="0"/>
+              <a:t>När det är klart väntar vi återigen på en ny inmatning och cykeln börjar om.</a:t>
+            </a:r>
+          </a:p>
+          <a:p>
+            <a:endParaRPr lang="sv-SE" baseline="0" dirty="0" smtClean="0"/>
+          </a:p>
+          <a:p>
+            <a:r>
+              <a:rPr lang="sv-SE" baseline="0" dirty="0" smtClean="0"/>
+              <a:t>Dessa övergripande steg innefattar alla koncept och komponenter som den här presentationen tagit upp, och bygger tillsammans upp en fullt fungerande hård-och mjukvaruplattform för en grafräknare.</a:t>
+            </a:r>
+          </a:p>
+        </p:txBody>
+      </p:sp>
+      <p:sp>
+        <p:nvSpPr>
+          <p:cNvPr id="4" name="Slide Number Placeholder 3"/>
+          <p:cNvSpPr>
+            <a:spLocks noGrp="1"/>
+          </p:cNvSpPr>
+          <p:nvPr>
+            <p:ph type="sldNum" sz="quarter" idx="10"/>
+          </p:nvPr>
+        </p:nvSpPr>
+        <p:spPr/>
+        <p:txBody>
+          <a:bodyPr/>
+          <a:lstStyle/>
+          <a:p>
+            <a:pPr lvl="0"/>
+            <a:fld id="{D0FC86B6-5EBF-43A2-AF19-9B4C147144EF}" type="slidenum">
+              <a:rPr lang="en-US" smtClean="0"/>
+              <a:t>14</a:t>
+            </a:fld>
+            <a:endParaRPr lang="en-US"/>
+          </a:p>
+        </p:txBody>
+      </p:sp>
+    </p:spTree>
+    <p:extLst>
+      <p:ext uri="{BB962C8B-B14F-4D97-AF65-F5344CB8AC3E}">
+        <p14:creationId xmlns:p14="http://schemas.microsoft.com/office/powerpoint/2010/main" val="1130169636"/>
       </p:ext>
     </p:extLst>
   </p:cSld>
@@ -7684,77 +8266,293 @@
       </p:sp>
       <p:sp>
         <p:nvSpPr>
-          <p:cNvPr id="3" name="Content Placeholder 2"/>
-          <p:cNvSpPr>
-            <a:spLocks noGrp="1"/>
-          </p:cNvSpPr>
-          <p:nvPr>
-            <p:ph idx="1"/>
-          </p:nvPr>
-        </p:nvSpPr>
-        <p:spPr/>
-        <p:txBody>
-          <a:bodyPr/>
-          <a:lstStyle/>
+          <p:cNvPr id="5" name="Subtitle 2"/>
+          <p:cNvSpPr txBox="1">
+            <a:spLocks/>
+          </p:cNvSpPr>
+          <p:nvPr/>
+        </p:nvSpPr>
+        <p:spPr>
+          <a:xfrm>
+            <a:off x="503999" y="3313903"/>
+            <a:ext cx="9071640" cy="1294713"/>
+          </a:xfrm>
+          <a:prstGeom prst="rect">
+            <a:avLst/>
+          </a:prstGeom>
+        </p:spPr>
+        <p:txBody>
+          <a:bodyPr vert="horz" lIns="91440" tIns="45720" rIns="91440" bIns="45720" rtlCol="0" anchor="ctr">
+            <a:spAutoFit/>
+          </a:bodyPr>
+          <a:lstStyle>
+            <a:lvl1pPr marL="189006" indent="-189006" algn="l" defTabSz="756026" rtl="0" eaLnBrk="1" latinLnBrk="0" hangingPunct="1">
+              <a:lnSpc>
+                <a:spcPct val="90000"/>
+              </a:lnSpc>
+              <a:spcBef>
+                <a:spcPts val="827"/>
+              </a:spcBef>
+              <a:buFont typeface="Arial" panose="020B0604020202020204" pitchFamily="34" charset="0"/>
+              <a:buChar char="•"/>
+              <a:defRPr sz="2800" kern="1200">
+                <a:solidFill>
+                  <a:schemeClr val="tx1"/>
+                </a:solidFill>
+                <a:latin typeface="+mn-lt"/>
+                <a:ea typeface="+mn-ea"/>
+                <a:cs typeface="+mn-cs"/>
+              </a:defRPr>
+            </a:lvl1pPr>
+            <a:lvl2pPr marL="567019" indent="-189006" algn="l" defTabSz="756026" rtl="0" eaLnBrk="1" latinLnBrk="0" hangingPunct="1">
+              <a:lnSpc>
+                <a:spcPct val="90000"/>
+              </a:lnSpc>
+              <a:spcBef>
+                <a:spcPts val="413"/>
+              </a:spcBef>
+              <a:buFont typeface="Arial" panose="020B0604020202020204" pitchFamily="34" charset="0"/>
+              <a:buChar char="•"/>
+              <a:defRPr sz="2400" kern="1200">
+                <a:solidFill>
+                  <a:schemeClr val="tx1"/>
+                </a:solidFill>
+                <a:latin typeface="+mn-lt"/>
+                <a:ea typeface="+mn-ea"/>
+                <a:cs typeface="+mn-cs"/>
+              </a:defRPr>
+            </a:lvl2pPr>
+            <a:lvl3pPr marL="945032" indent="-189006" algn="l" defTabSz="756026" rtl="0" eaLnBrk="1" latinLnBrk="0" hangingPunct="1">
+              <a:lnSpc>
+                <a:spcPct val="90000"/>
+              </a:lnSpc>
+              <a:spcBef>
+                <a:spcPts val="413"/>
+              </a:spcBef>
+              <a:buFont typeface="Arial" panose="020B0604020202020204" pitchFamily="34" charset="0"/>
+              <a:buChar char="•"/>
+              <a:defRPr sz="2000" kern="1200">
+                <a:solidFill>
+                  <a:schemeClr val="tx1"/>
+                </a:solidFill>
+                <a:latin typeface="+mn-lt"/>
+                <a:ea typeface="+mn-ea"/>
+                <a:cs typeface="+mn-cs"/>
+              </a:defRPr>
+            </a:lvl3pPr>
+            <a:lvl4pPr marL="1323045" indent="-189006" algn="l" defTabSz="756026" rtl="0" eaLnBrk="1" latinLnBrk="0" hangingPunct="1">
+              <a:lnSpc>
+                <a:spcPct val="90000"/>
+              </a:lnSpc>
+              <a:spcBef>
+                <a:spcPts val="413"/>
+              </a:spcBef>
+              <a:buFont typeface="Arial" panose="020B0604020202020204" pitchFamily="34" charset="0"/>
+              <a:buChar char="•"/>
+              <a:defRPr sz="1488" kern="1200">
+                <a:solidFill>
+                  <a:schemeClr val="tx1"/>
+                </a:solidFill>
+                <a:latin typeface="+mn-lt"/>
+                <a:ea typeface="+mn-ea"/>
+                <a:cs typeface="+mn-cs"/>
+              </a:defRPr>
+            </a:lvl4pPr>
+            <a:lvl5pPr marL="1701058" indent="-189006" algn="l" defTabSz="756026" rtl="0" eaLnBrk="1" latinLnBrk="0" hangingPunct="1">
+              <a:lnSpc>
+                <a:spcPct val="90000"/>
+              </a:lnSpc>
+              <a:spcBef>
+                <a:spcPts val="413"/>
+              </a:spcBef>
+              <a:buFont typeface="Arial" panose="020B0604020202020204" pitchFamily="34" charset="0"/>
+              <a:buChar char="•"/>
+              <a:defRPr sz="1488" kern="1200">
+                <a:solidFill>
+                  <a:schemeClr val="tx1"/>
+                </a:solidFill>
+                <a:latin typeface="+mn-lt"/>
+                <a:ea typeface="+mn-ea"/>
+                <a:cs typeface="+mn-cs"/>
+              </a:defRPr>
+            </a:lvl5pPr>
+            <a:lvl6pPr marL="2079071" indent="-189006" algn="l" defTabSz="756026" rtl="0" eaLnBrk="1" latinLnBrk="0" hangingPunct="1">
+              <a:lnSpc>
+                <a:spcPct val="90000"/>
+              </a:lnSpc>
+              <a:spcBef>
+                <a:spcPts val="413"/>
+              </a:spcBef>
+              <a:buFont typeface="Arial" panose="020B0604020202020204" pitchFamily="34" charset="0"/>
+              <a:buChar char="•"/>
+              <a:defRPr sz="1488" kern="1200">
+                <a:solidFill>
+                  <a:schemeClr val="tx1"/>
+                </a:solidFill>
+                <a:latin typeface="+mn-lt"/>
+                <a:ea typeface="+mn-ea"/>
+                <a:cs typeface="+mn-cs"/>
+              </a:defRPr>
+            </a:lvl6pPr>
+            <a:lvl7pPr marL="2457084" indent="-189006" algn="l" defTabSz="756026" rtl="0" eaLnBrk="1" latinLnBrk="0" hangingPunct="1">
+              <a:lnSpc>
+                <a:spcPct val="90000"/>
+              </a:lnSpc>
+              <a:spcBef>
+                <a:spcPts val="413"/>
+              </a:spcBef>
+              <a:buFont typeface="Arial" panose="020B0604020202020204" pitchFamily="34" charset="0"/>
+              <a:buChar char="•"/>
+              <a:defRPr sz="1488" kern="1200">
+                <a:solidFill>
+                  <a:schemeClr val="tx1"/>
+                </a:solidFill>
+                <a:latin typeface="+mn-lt"/>
+                <a:ea typeface="+mn-ea"/>
+                <a:cs typeface="+mn-cs"/>
+              </a:defRPr>
+            </a:lvl7pPr>
+            <a:lvl8pPr marL="2835097" indent="-189006" algn="l" defTabSz="756026" rtl="0" eaLnBrk="1" latinLnBrk="0" hangingPunct="1">
+              <a:lnSpc>
+                <a:spcPct val="90000"/>
+              </a:lnSpc>
+              <a:spcBef>
+                <a:spcPts val="413"/>
+              </a:spcBef>
+              <a:buFont typeface="Arial" panose="020B0604020202020204" pitchFamily="34" charset="0"/>
+              <a:buChar char="•"/>
+              <a:defRPr sz="1488" kern="1200">
+                <a:solidFill>
+                  <a:schemeClr val="tx1"/>
+                </a:solidFill>
+                <a:latin typeface="+mn-lt"/>
+                <a:ea typeface="+mn-ea"/>
+                <a:cs typeface="+mn-cs"/>
+              </a:defRPr>
+            </a:lvl8pPr>
+            <a:lvl9pPr marL="3213110" indent="-189006" algn="l" defTabSz="756026" rtl="0" eaLnBrk="1" latinLnBrk="0" hangingPunct="1">
+              <a:lnSpc>
+                <a:spcPct val="90000"/>
+              </a:lnSpc>
+              <a:spcBef>
+                <a:spcPts val="413"/>
+              </a:spcBef>
+              <a:buFont typeface="Arial" panose="020B0604020202020204" pitchFamily="34" charset="0"/>
+              <a:buChar char="•"/>
+              <a:defRPr sz="1488" kern="1200">
+                <a:solidFill>
+                  <a:schemeClr val="tx1"/>
+                </a:solidFill>
+                <a:latin typeface="+mn-lt"/>
+                <a:ea typeface="+mn-ea"/>
+                <a:cs typeface="+mn-cs"/>
+              </a:defRPr>
+            </a:lvl9pPr>
+          </a:lstStyle>
           <a:p>
             <a:pPr marL="0" indent="0">
               <a:buNone/>
             </a:pPr>
-            <a:endParaRPr lang="sv-SE" dirty="0" smtClean="0"/>
-          </a:p>
-          <a:p>
-            <a:endParaRPr lang="sv-SE" dirty="0"/>
-          </a:p>
-          <a:p>
-            <a:endParaRPr lang="sv-SE" dirty="0" smtClean="0"/>
+            <a:r>
+              <a:rPr lang="en-US" sz="2400" dirty="0" smtClean="0">
+                <a:solidFill>
+                  <a:srgbClr val="CC3300"/>
+                </a:solidFill>
+              </a:rPr>
+              <a:t>    OP            </a:t>
+            </a:r>
+            <a:r>
+              <a:rPr lang="en-US" sz="2400" dirty="0" err="1" smtClean="0">
+                <a:solidFill>
+                  <a:srgbClr val="00CC00"/>
+                </a:solidFill>
+              </a:rPr>
+              <a:t>GRx</a:t>
+            </a:r>
+            <a:r>
+              <a:rPr lang="en-US" sz="2400" dirty="0" smtClean="0">
+                <a:solidFill>
+                  <a:srgbClr val="CC3300"/>
+                </a:solidFill>
+              </a:rPr>
+              <a:t>   </a:t>
+            </a:r>
+            <a:r>
+              <a:rPr lang="en-US" sz="2400" dirty="0" smtClean="0">
+                <a:solidFill>
+                  <a:srgbClr val="0000FF"/>
+                </a:solidFill>
+              </a:rPr>
+              <a:t>MM</a:t>
+            </a:r>
+            <a:r>
+              <a:rPr lang="en-US" sz="2400" dirty="0" smtClean="0">
+                <a:solidFill>
+                  <a:srgbClr val="CC3300"/>
+                </a:solidFill>
+              </a:rPr>
+              <a:t> </a:t>
+            </a:r>
+            <a:r>
+              <a:rPr lang="en-US" sz="2400" dirty="0" smtClean="0">
+                <a:solidFill>
+                  <a:srgbClr val="FF00FF"/>
+                </a:solidFill>
+              </a:rPr>
+              <a:t>ADR</a:t>
+            </a:r>
           </a:p>
           <a:p>
             <a:pPr marL="0" indent="0">
               <a:buNone/>
             </a:pPr>
             <a:r>
-              <a:rPr lang="sv-SE" dirty="0" smtClean="0">
+              <a:rPr lang="en-US" sz="2400" dirty="0" smtClean="0">
                 <a:solidFill>
-                  <a:srgbClr val="FF0000"/>
+                  <a:srgbClr val="CC3300"/>
                 </a:solidFill>
               </a:rPr>
-              <a:t>OP </a:t>
-            </a:r>
-            <a:r>
-              <a:rPr lang="sv-SE" dirty="0" smtClean="0"/>
-              <a:t>                 </a:t>
-            </a:r>
-            <a:r>
-              <a:rPr lang="sv-SE" dirty="0" err="1" smtClean="0">
+              <a:t>    _ _ _ _ _  </a:t>
+            </a:r>
+            <a:r>
+              <a:rPr lang="en-US" sz="2400" dirty="0" smtClean="0">
                 <a:solidFill>
-                  <a:schemeClr val="accent5"/>
+                  <a:srgbClr val="00CC00"/>
                 </a:solidFill>
               </a:rPr>
-              <a:t>GRx</a:t>
-            </a:r>
-            <a:r>
-              <a:rPr lang="sv-SE" dirty="0" smtClean="0"/>
-              <a:t>         </a:t>
-            </a:r>
-            <a:r>
-              <a:rPr lang="sv-SE" dirty="0" smtClean="0">
+              <a:t>_ _ _</a:t>
+            </a:r>
+            <a:r>
+              <a:rPr lang="en-US" sz="2400" dirty="0" smtClean="0">
                 <a:solidFill>
-                  <a:schemeClr val="accent4"/>
+                  <a:srgbClr val="CC3300"/>
                 </a:solidFill>
               </a:rPr>
-              <a:t>MM</a:t>
-            </a:r>
-            <a:r>
-              <a:rPr lang="sv-SE" dirty="0" smtClean="0"/>
-              <a:t>      </a:t>
-            </a:r>
-            <a:r>
-              <a:rPr lang="sv-SE" dirty="0" smtClean="0">
+              <a:t>  </a:t>
+            </a:r>
+            <a:r>
+              <a:rPr lang="en-US" sz="2400" dirty="0" smtClean="0">
                 <a:solidFill>
-                  <a:schemeClr val="accent6"/>
+                  <a:srgbClr val="0000FF"/>
                 </a:solidFill>
               </a:rPr>
-              <a:t>ADR</a:t>
+              <a:t>_ _</a:t>
+            </a:r>
+            <a:r>
+              <a:rPr lang="en-US" sz="2400" dirty="0" smtClean="0">
+                <a:solidFill>
+                  <a:srgbClr val="CC3300"/>
+                </a:solidFill>
+              </a:rPr>
+              <a:t>  </a:t>
+            </a:r>
+            <a:r>
+              <a:rPr lang="en-US" sz="2400" dirty="0" smtClean="0">
+                <a:solidFill>
+                  <a:srgbClr val="FF00FF"/>
+                </a:solidFill>
+              </a:rPr>
+              <a:t>_ _ _ _ _ _ _ _ _ _ _ _ _ _ _ _ _ _ _ _ _ _</a:t>
             </a:r>
           </a:p>
           <a:p>
@@ -7762,89 +8560,64 @@
               <a:buNone/>
             </a:pPr>
             <a:r>
-              <a:rPr lang="sv-SE" dirty="0" smtClean="0">
+              <a:rPr lang="en-US" sz="2400" dirty="0" smtClean="0">
                 <a:solidFill>
-                  <a:srgbClr val="FF0000"/>
+                  <a:srgbClr val="FF00FF"/>
                 </a:solidFill>
               </a:rPr>
-              <a:t>_ _ _ _ _        </a:t>
-            </a:r>
-            <a:r>
-              <a:rPr lang="sv-SE" dirty="0" smtClean="0">
+              <a:t>    </a:t>
+            </a:r>
+            <a:r>
+              <a:rPr lang="en-US" sz="2400" dirty="0" smtClean="0">
                 <a:solidFill>
-                  <a:schemeClr val="accent5"/>
-                </a:solidFill>
-              </a:rPr>
-              <a:t>_ _ _        </a:t>
-            </a:r>
-            <a:r>
-              <a:rPr lang="sv-SE" dirty="0" smtClean="0">
-                <a:solidFill>
-                  <a:schemeClr val="accent4"/>
-                </a:solidFill>
-              </a:rPr>
-              <a:t>_ _        </a:t>
-            </a:r>
-            <a:r>
-              <a:rPr lang="sv-SE" dirty="0" smtClean="0">
-                <a:solidFill>
-                  <a:schemeClr val="accent6"/>
-                </a:solidFill>
-              </a:rPr>
-              <a:t>_ _ _ _ _ _ _ _ _ _ _ _ _ _ _ _ _ _ _ _ _ _</a:t>
-            </a:r>
-          </a:p>
-          <a:p>
-            <a:pPr marL="0" indent="0">
-              <a:buNone/>
-            </a:pPr>
-            <a:r>
-              <a:rPr lang="sv-SE" dirty="0" smtClean="0">
-                <a:solidFill>
-                  <a:srgbClr val="FF0000"/>
+                  <a:srgbClr val="CC3300"/>
                 </a:solidFill>
               </a:rPr>
               <a:t>5</a:t>
             </a:r>
             <a:r>
-              <a:rPr lang="sv-SE" dirty="0" smtClean="0"/>
-              <a:t>                     </a:t>
-            </a:r>
-            <a:r>
-              <a:rPr lang="sv-SE" dirty="0" smtClean="0">
+              <a:rPr lang="en-US" sz="2400" dirty="0" smtClean="0">
                 <a:solidFill>
-                  <a:schemeClr val="accent5"/>
+                  <a:srgbClr val="FF00FF"/>
+                </a:solidFill>
+              </a:rPr>
+              <a:t>               </a:t>
+            </a:r>
+            <a:r>
+              <a:rPr lang="en-US" sz="2400" dirty="0" smtClean="0">
+                <a:solidFill>
+                  <a:srgbClr val="00CC00"/>
                 </a:solidFill>
               </a:rPr>
               <a:t>3</a:t>
             </a:r>
             <a:r>
-              <a:rPr lang="sv-SE" dirty="0" smtClean="0"/>
-              <a:t>              </a:t>
-            </a:r>
-            <a:r>
-              <a:rPr lang="sv-SE" dirty="0" smtClean="0">
+              <a:rPr lang="en-US" sz="2400" dirty="0" smtClean="0">
                 <a:solidFill>
-                  <a:schemeClr val="accent4"/>
+                  <a:srgbClr val="FF00FF"/>
                 </a:solidFill>
               </a:rPr>
-              <a:t>2 </a:t>
-            </a:r>
-            <a:r>
-              <a:rPr lang="sv-SE" dirty="0" smtClean="0"/>
-              <a:t>           </a:t>
-            </a:r>
-            <a:r>
-              <a:rPr lang="sv-SE" dirty="0" smtClean="0">
+              <a:t>        </a:t>
+            </a:r>
+            <a:r>
+              <a:rPr lang="en-US" sz="2400" dirty="0" smtClean="0">
                 <a:solidFill>
-                  <a:schemeClr val="accent6"/>
+                  <a:srgbClr val="0000FF"/>
                 </a:solidFill>
               </a:rPr>
-              <a:t>22</a:t>
-            </a:r>
-            <a:endParaRPr lang="en-US" dirty="0">
+              <a:t>2</a:t>
+            </a:r>
+            <a:r>
+              <a:rPr lang="en-US" sz="2400" dirty="0" smtClean="0">
+                <a:solidFill>
+                  <a:srgbClr val="FF00FF"/>
+                </a:solidFill>
+              </a:rPr>
+              <a:t>      22</a:t>
+            </a:r>
+            <a:endParaRPr lang="en-US" sz="2400" dirty="0">
               <a:solidFill>
-                <a:schemeClr val="accent6"/>
+                <a:srgbClr val="FF00FF"/>
               </a:solidFill>
             </a:endParaRPr>
           </a:p>
@@ -8101,7 +8874,7 @@
           <p:nvPr/>
         </p:nvPicPr>
         <p:blipFill>
-          <a:blip r:embed="rId2" cstate="print">
+          <a:blip r:embed="rId3" cstate="print">
             <a:extLst>
               <a:ext uri="{28A0092B-C50C-407E-A947-70E740481C1C}">
                 <a14:useLocalDpi xmlns:a14="http://schemas.microsoft.com/office/drawing/2010/main" val="0"/>
@@ -9734,7 +10507,7 @@
           <p:nvPr/>
         </p:nvPicPr>
         <p:blipFill>
-          <a:blip r:embed="rId2">
+          <a:blip r:embed="rId3">
             <a:lum bright="-50000"/>
             <a:alphaModFix/>
           </a:blip>

</xml_diff>

<commit_message>
Add names to ppt and remove second flow slide
</commit_message>
<xml_diff>
--- a/presentation/presentation_powerpoint.pptx
+++ b/presentation/presentation_powerpoint.pptx
@@ -5,10 +5,10 @@
     <p:sldMasterId id="2147483672" r:id="rId1"/>
   </p:sldMasterIdLst>
   <p:notesMasterIdLst>
-    <p:notesMasterId r:id="rId18"/>
+    <p:notesMasterId r:id="rId17"/>
   </p:notesMasterIdLst>
   <p:handoutMasterIdLst>
-    <p:handoutMasterId r:id="rId19"/>
+    <p:handoutMasterId r:id="rId18"/>
   </p:handoutMasterIdLst>
   <p:sldIdLst>
     <p:sldId id="271" r:id="rId2"/>
@@ -25,8 +25,7 @@
     <p:sldId id="282" r:id="rId13"/>
     <p:sldId id="283" r:id="rId14"/>
     <p:sldId id="286" r:id="rId15"/>
-    <p:sldId id="285" r:id="rId16"/>
-    <p:sldId id="284" r:id="rId17"/>
+    <p:sldId id="284" r:id="rId16"/>
   </p:sldIdLst>
   <p:sldSz cx="10080625" cy="7559675"/>
   <p:notesSz cx="7559675" cy="10691813"/>
@@ -3724,12 +3723,7 @@
             <p:ph type="sldImg"/>
           </p:nvPr>
         </p:nvSpPr>
-        <p:spPr>
-          <a:xfrm>
-            <a:off x="1106488" y="812800"/>
-            <a:ext cx="5345112" cy="4008438"/>
-          </a:xfrm>
-        </p:spPr>
+        <p:spPr/>
       </p:sp>
       <p:sp>
         <p:nvSpPr>
@@ -3747,76 +3741,10 @@
           <a:lstStyle/>
           <a:p>
             <a:r>
-              <a:rPr lang="sv-SE" dirty="0" smtClean="0"/>
-              <a:t>Omvänd polsk notation, eller RPN för ’</a:t>
-            </a:r>
-            <a:r>
-              <a:rPr lang="sv-SE" dirty="0" err="1" smtClean="0"/>
-              <a:t>reverse</a:t>
-            </a:r>
-            <a:r>
-              <a:rPr lang="sv-SE" dirty="0" smtClean="0"/>
-              <a:t> polish notation’ är nämligen notationen som används när grafräknaren ges input. Att evaluera traditionella </a:t>
-            </a:r>
-            <a:r>
-              <a:rPr lang="sv-SE" dirty="0" err="1" smtClean="0"/>
-              <a:t>mattematiska</a:t>
-            </a:r>
-            <a:r>
-              <a:rPr lang="sv-SE" dirty="0" smtClean="0"/>
-              <a:t> uttryck kräver generellt både </a:t>
-            </a:r>
-            <a:r>
-              <a:rPr lang="sv-SE" dirty="0" err="1" smtClean="0"/>
-              <a:t>rekursion</a:t>
-            </a:r>
-            <a:r>
-              <a:rPr lang="sv-SE" dirty="0" smtClean="0"/>
-              <a:t>, vilket vi saknar support för, och</a:t>
-            </a:r>
-            <a:r>
-              <a:rPr lang="sv-SE" baseline="0" dirty="0" smtClean="0"/>
-              <a:t> </a:t>
-            </a:r>
-            <a:r>
-              <a:rPr lang="sv-SE" dirty="0" smtClean="0"/>
-              <a:t>mycket arbete.</a:t>
-            </a:r>
-          </a:p>
-          <a:p>
-            <a:endParaRPr lang="sv-SE" dirty="0" smtClean="0"/>
-          </a:p>
-          <a:p>
-            <a:r>
-              <a:rPr lang="sv-SE" dirty="0" smtClean="0"/>
-              <a:t>RPN tillåter användaren att skriva vilket uttryck som helst, men kan fortfarande enkelt evalueras iterativt med hjälp av en stack.</a:t>
-            </a:r>
-          </a:p>
-          <a:p>
-            <a:endParaRPr lang="sv-SE" dirty="0" smtClean="0"/>
-          </a:p>
-          <a:p>
-            <a:r>
-              <a:rPr lang="sv-SE" dirty="0" smtClean="0"/>
-              <a:t>I konsolen, som vi senare demonstrerar, så skrivs uttryck så här, med tokens separerade av mellanslag. </a:t>
-            </a:r>
-            <a:r>
-              <a:rPr lang="sv-SE" dirty="0" err="1" smtClean="0"/>
-              <a:t>Enter</a:t>
-            </a:r>
-            <a:r>
-              <a:rPr lang="sv-SE" dirty="0" smtClean="0"/>
-              <a:t> för att säga åt maskinen att evaluera uttrycket. Då minustecknet är reserverat för dess operator, så används 'N' för att göra </a:t>
-            </a:r>
-            <a:r>
-              <a:rPr lang="sv-SE" dirty="0" err="1" smtClean="0"/>
-              <a:t>operander</a:t>
-            </a:r>
-            <a:r>
-              <a:rPr lang="sv-SE" dirty="0" smtClean="0"/>
-              <a:t> negativa.</a:t>
-            </a:r>
-            <a:endParaRPr lang="en-US" dirty="0"/>
+              <a:rPr lang="en-GB" b="1" dirty="0" smtClean="0"/>
+              <a:t>Hannes:</a:t>
+            </a:r>
+            <a:endParaRPr lang="sv-SE" b="1" dirty="0"/>
           </a:p>
         </p:txBody>
       </p:sp>
@@ -3837,17 +3765,17 @@
           <a:p>
             <a:pPr lvl="0"/>
             <a:fld id="{D0FC86B6-5EBF-43A2-AF19-9B4C147144EF}" type="slidenum">
-              <a:rPr lang="en-US" smtClean="0"/>
-              <a:t>5</a:t>
+              <a:rPr lang="sv-SE" smtClean="0"/>
+              <a:t>1</a:t>
             </a:fld>
-            <a:endParaRPr lang="en-US"/>
+            <a:endParaRPr lang="sv-SE"/>
           </a:p>
         </p:txBody>
       </p:sp>
     </p:spTree>
     <p:extLst>
       <p:ext uri="{BB962C8B-B14F-4D97-AF65-F5344CB8AC3E}">
-        <p14:creationId xmlns:p14="http://schemas.microsoft.com/office/powerpoint/2010/main" val="1602485305"/>
+        <p14:creationId xmlns:p14="http://schemas.microsoft.com/office/powerpoint/2010/main" val="3328063094"/>
       </p:ext>
     </p:extLst>
   </p:cSld>
@@ -3906,6 +3834,74 @@
           <a:bodyPr/>
           <a:lstStyle/>
           <a:p>
+            <a:r>
+              <a:rPr lang="sv-SE" sz="2000" b="1" i="0" u="none" strike="noStrike" kern="1200" cap="none" dirty="0" smtClean="0">
+                <a:ln>
+                  <a:noFill/>
+                </a:ln>
+                <a:effectLst/>
+                <a:latin typeface="Liberation Sans" pitchFamily="18"/>
+              </a:rPr>
+              <a:t>Silas:</a:t>
+            </a:r>
+            <a:r>
+              <a:rPr lang="sv-SE" sz="2000" b="1" i="0" u="none" strike="noStrike" kern="1200" cap="none" baseline="0" dirty="0" smtClean="0">
+                <a:ln>
+                  <a:noFill/>
+                </a:ln>
+                <a:effectLst/>
+                <a:latin typeface="Liberation Sans" pitchFamily="18"/>
+              </a:rPr>
+              <a:t> </a:t>
+            </a:r>
+            <a:r>
+              <a:rPr lang="en-US" baseline="0" dirty="0" err="1" smtClean="0"/>
+              <a:t>Instruktioner</a:t>
+            </a:r>
+            <a:r>
+              <a:rPr lang="en-US" baseline="0" dirty="0" smtClean="0"/>
+              <a:t>, register, </a:t>
+            </a:r>
+            <a:r>
+              <a:rPr lang="en-US" baseline="0" dirty="0" err="1" smtClean="0"/>
+              <a:t>minnesmod</a:t>
+            </a:r>
+            <a:r>
+              <a:rPr lang="en-US" baseline="0" dirty="0" smtClean="0"/>
+              <a:t> </a:t>
+            </a:r>
+            <a:r>
+              <a:rPr lang="en-US" baseline="0" dirty="0" err="1" smtClean="0"/>
+              <a:t>få</a:t>
+            </a:r>
+            <a:r>
+              <a:rPr lang="en-US" baseline="0" dirty="0" smtClean="0"/>
+              <a:t> </a:t>
+            </a:r>
+            <a:r>
+              <a:rPr lang="en-US" baseline="0" dirty="0" err="1" smtClean="0"/>
+              <a:t>bitar</a:t>
+            </a:r>
+            <a:r>
+              <a:rPr lang="en-US" baseline="0" dirty="0" smtClean="0"/>
+              <a:t>, </a:t>
+            </a:r>
+            <a:r>
+              <a:rPr lang="en-US" baseline="0" dirty="0" err="1" smtClean="0"/>
+              <a:t>adressdel</a:t>
+            </a:r>
+            <a:r>
+              <a:rPr lang="en-US" baseline="0" dirty="0" smtClean="0"/>
+              <a:t> </a:t>
+            </a:r>
+            <a:r>
+              <a:rPr lang="en-US" baseline="0" dirty="0" err="1" smtClean="0"/>
+              <a:t>resten</a:t>
+            </a:r>
+            <a:r>
+              <a:rPr lang="en-US" baseline="0" dirty="0" smtClean="0"/>
+              <a:t> (32)</a:t>
+            </a:r>
             <a:endParaRPr lang="en-US" dirty="0"/>
           </a:p>
         </p:txBody>
@@ -3927,17 +3923,17 @@
           <a:p>
             <a:pPr lvl="0"/>
             <a:fld id="{D0FC86B6-5EBF-43A2-AF19-9B4C147144EF}" type="slidenum">
-              <a:rPr lang="en-US" smtClean="0"/>
-              <a:t>15</a:t>
+              <a:rPr lang="sv-SE" smtClean="0"/>
+              <a:t>10</a:t>
             </a:fld>
-            <a:endParaRPr lang="en-US"/>
+            <a:endParaRPr lang="sv-SE"/>
           </a:p>
         </p:txBody>
       </p:sp>
     </p:spTree>
     <p:extLst>
       <p:ext uri="{BB962C8B-B14F-4D97-AF65-F5344CB8AC3E}">
-        <p14:creationId xmlns:p14="http://schemas.microsoft.com/office/powerpoint/2010/main" val="3343875108"/>
+        <p14:creationId xmlns:p14="http://schemas.microsoft.com/office/powerpoint/2010/main" val="2345692999"/>
       </p:ext>
     </p:extLst>
   </p:cSld>
@@ -3974,6 +3970,340 @@
             <p:ph type="sldImg"/>
           </p:nvPr>
         </p:nvSpPr>
+        <p:spPr/>
+      </p:sp>
+      <p:sp>
+        <p:nvSpPr>
+          <p:cNvPr id="3" name="Notes Placeholder 2"/>
+          <p:cNvSpPr>
+            <a:spLocks noGrp="1"/>
+          </p:cNvSpPr>
+          <p:nvPr>
+            <p:ph type="body" idx="1"/>
+          </p:nvPr>
+        </p:nvSpPr>
+        <p:spPr/>
+        <p:txBody>
+          <a:bodyPr/>
+          <a:lstStyle/>
+          <a:p>
+            <a:r>
+              <a:rPr lang="sv-SE" sz="2000" b="1" i="0" u="none" strike="noStrike" kern="1200" cap="none" dirty="0" smtClean="0">
+                <a:ln>
+                  <a:noFill/>
+                </a:ln>
+                <a:effectLst/>
+                <a:latin typeface="Liberation Sans" pitchFamily="18"/>
+              </a:rPr>
+              <a:t>Silas:</a:t>
+            </a:r>
+            <a:r>
+              <a:rPr lang="sv-SE" sz="2000" b="1" i="0" u="none" strike="noStrike" kern="1200" cap="none" baseline="0" dirty="0" smtClean="0">
+                <a:ln>
+                  <a:noFill/>
+                </a:ln>
+                <a:effectLst/>
+                <a:latin typeface="Liberation Sans" pitchFamily="18"/>
+              </a:rPr>
+              <a:t> </a:t>
+            </a:r>
+            <a:r>
+              <a:rPr lang="sv-SE" noProof="0" dirty="0" smtClean="0"/>
+              <a:t>Moder</a:t>
+            </a:r>
+            <a:r>
+              <a:rPr lang="sv-SE" noProof="0" dirty="0" smtClean="0"/>
+              <a:t>, har de vanliga, ej indexerad (labels). Direkt , indirekt </a:t>
+            </a:r>
+            <a:r>
+              <a:rPr lang="sv-SE" baseline="0" noProof="0" dirty="0" smtClean="0"/>
+              <a:t>som förväntat. </a:t>
+            </a:r>
+            <a:r>
+              <a:rPr lang="sv-SE" noProof="0" dirty="0" smtClean="0"/>
+              <a:t>Omedelbar, 32 bitar,</a:t>
+            </a:r>
+            <a:r>
+              <a:rPr lang="sv-SE" baseline="0" noProof="0" dirty="0" smtClean="0"/>
+              <a:t> nästa rad. Sillescript: direktaddr default, hakas $~ instr.</a:t>
+            </a:r>
+            <a:endParaRPr lang="sv-SE" noProof="0" dirty="0"/>
+          </a:p>
+        </p:txBody>
+      </p:sp>
+      <p:sp>
+        <p:nvSpPr>
+          <p:cNvPr id="4" name="Slide Number Placeholder 3"/>
+          <p:cNvSpPr>
+            <a:spLocks noGrp="1"/>
+          </p:cNvSpPr>
+          <p:nvPr>
+            <p:ph type="sldNum" sz="quarter" idx="10"/>
+          </p:nvPr>
+        </p:nvSpPr>
+        <p:spPr/>
+        <p:txBody>
+          <a:bodyPr/>
+          <a:lstStyle/>
+          <a:p>
+            <a:pPr lvl="0"/>
+            <a:fld id="{D0FC86B6-5EBF-43A2-AF19-9B4C147144EF}" type="slidenum">
+              <a:rPr lang="sv-SE" smtClean="0"/>
+              <a:t>11</a:t>
+            </a:fld>
+            <a:endParaRPr lang="sv-SE"/>
+          </a:p>
+        </p:txBody>
+      </p:sp>
+    </p:spTree>
+    <p:extLst>
+      <p:ext uri="{BB962C8B-B14F-4D97-AF65-F5344CB8AC3E}">
+        <p14:creationId xmlns:p14="http://schemas.microsoft.com/office/powerpoint/2010/main" val="3100289925"/>
+      </p:ext>
+    </p:extLst>
+  </p:cSld>
+  <p:clrMapOvr>
+    <a:masterClrMapping/>
+  </p:clrMapOvr>
+</p:notes>
+</file>
+
+<file path=ppt/notesSlides/notesSlide12.xml><?xml version="1.0" encoding="utf-8"?>
+<p:notes xmlns:a="http://schemas.openxmlformats.org/drawingml/2006/main" xmlns:r="http://schemas.openxmlformats.org/officeDocument/2006/relationships" xmlns:p="http://schemas.openxmlformats.org/presentationml/2006/main">
+  <p:cSld>
+    <p:spTree>
+      <p:nvGrpSpPr>
+        <p:cNvPr id="1" name=""/>
+        <p:cNvGrpSpPr/>
+        <p:nvPr/>
+      </p:nvGrpSpPr>
+      <p:grpSpPr>
+        <a:xfrm>
+          <a:off x="0" y="0"/>
+          <a:ext cx="0" cy="0"/>
+          <a:chOff x="0" y="0"/>
+          <a:chExt cx="0" cy="0"/>
+        </a:xfrm>
+      </p:grpSpPr>
+      <p:sp>
+        <p:nvSpPr>
+          <p:cNvPr id="2" name="Slide Image Placeholder 1"/>
+          <p:cNvSpPr>
+            <a:spLocks noGrp="1" noRot="1" noChangeAspect="1"/>
+          </p:cNvSpPr>
+          <p:nvPr>
+            <p:ph type="sldImg"/>
+          </p:nvPr>
+        </p:nvSpPr>
+        <p:spPr/>
+      </p:sp>
+      <p:sp>
+        <p:nvSpPr>
+          <p:cNvPr id="3" name="Notes Placeholder 2"/>
+          <p:cNvSpPr>
+            <a:spLocks noGrp="1"/>
+          </p:cNvSpPr>
+          <p:nvPr>
+            <p:ph type="body" idx="1"/>
+          </p:nvPr>
+        </p:nvSpPr>
+        <p:spPr/>
+        <p:txBody>
+          <a:bodyPr/>
+          <a:lstStyle/>
+          <a:p>
+            <a:pPr marL="216000" marR="0" indent="-216000" defTabSz="914400" rtl="0" eaLnBrk="1" fontAlgn="auto" latinLnBrk="0" hangingPunct="0">
+              <a:lnSpc>
+                <a:spcPct val="100000"/>
+              </a:lnSpc>
+              <a:spcBef>
+                <a:spcPts val="0"/>
+              </a:spcBef>
+              <a:spcAft>
+                <a:spcPts val="0"/>
+              </a:spcAft>
+              <a:buClrTx/>
+              <a:buSzTx/>
+              <a:buFontTx/>
+              <a:buNone/>
+              <a:tabLst/>
+              <a:defRPr/>
+            </a:pPr>
+            <a:r>
+              <a:rPr lang="sv-SE" sz="2000" b="1" i="0" u="none" strike="noStrike" kern="1200" cap="none" dirty="0" smtClean="0">
+                <a:ln>
+                  <a:noFill/>
+                </a:ln>
+                <a:effectLst/>
+                <a:latin typeface="Liberation Sans" pitchFamily="18"/>
+              </a:rPr>
+              <a:t>Silas:</a:t>
+            </a:r>
+            <a:r>
+              <a:rPr lang="sv-SE" sz="2000" b="1" i="0" u="none" strike="noStrike" kern="1200" cap="none" baseline="0" dirty="0" smtClean="0">
+                <a:ln>
+                  <a:noFill/>
+                </a:ln>
+                <a:effectLst/>
+                <a:latin typeface="Liberation Sans" pitchFamily="18"/>
+              </a:rPr>
+              <a:t> </a:t>
+            </a:r>
+            <a:r>
+              <a:rPr lang="en-US" dirty="0" err="1" smtClean="0"/>
+              <a:t>Disp</a:t>
+            </a:r>
+            <a:r>
+              <a:rPr lang="en-US" dirty="0" smtClean="0"/>
+              <a:t> </a:t>
+            </a:r>
+            <a:r>
+              <a:rPr lang="en-US" dirty="0" smtClean="0"/>
+              <a:t>640x480px </a:t>
+            </a:r>
+            <a:r>
+              <a:rPr lang="en-US" dirty="0" err="1" smtClean="0"/>
+              <a:t>uppdelat</a:t>
+            </a:r>
+            <a:r>
+              <a:rPr lang="en-US" dirty="0" smtClean="0"/>
+              <a:t>. </a:t>
+            </a:r>
+            <a:r>
+              <a:rPr lang="en-US" dirty="0" err="1" smtClean="0"/>
+              <a:t>Svartvit</a:t>
+            </a:r>
+            <a:r>
+              <a:rPr lang="en-US" baseline="0" dirty="0" smtClean="0"/>
+              <a:t> bitmap </a:t>
+            </a:r>
+            <a:r>
+              <a:rPr lang="en-US" baseline="0" dirty="0" err="1" smtClean="0"/>
+              <a:t>på</a:t>
+            </a:r>
+            <a:r>
+              <a:rPr lang="en-US" baseline="0" dirty="0" smtClean="0"/>
+              <a:t> </a:t>
+            </a:r>
+            <a:r>
+              <a:rPr lang="en-US" baseline="0" dirty="0" err="1" smtClean="0"/>
+              <a:t>grafhalvan</a:t>
+            </a:r>
+            <a:r>
+              <a:rPr lang="en-US" baseline="0" dirty="0" smtClean="0"/>
+              <a:t>. </a:t>
+            </a:r>
+            <a:r>
+              <a:rPr lang="en-US" baseline="0" dirty="0" err="1" smtClean="0"/>
+              <a:t>Konsoll</a:t>
+            </a:r>
+            <a:r>
+              <a:rPr lang="en-US" baseline="0" dirty="0" smtClean="0"/>
+              <a:t> </a:t>
+            </a:r>
+            <a:r>
+              <a:rPr lang="en-GB" baseline="0" dirty="0" err="1" smtClean="0"/>
+              <a:t>minskad</a:t>
+            </a:r>
+            <a:r>
+              <a:rPr lang="en-GB" baseline="0" dirty="0" smtClean="0"/>
+              <a:t> tile 8x16px. Store </a:t>
+            </a:r>
+            <a:r>
+              <a:rPr lang="en-GB" baseline="0" dirty="0" err="1" smtClean="0"/>
+              <a:t>båda</a:t>
+            </a:r>
+            <a:r>
+              <a:rPr lang="en-GB" baseline="0" dirty="0" smtClean="0"/>
+              <a:t>. </a:t>
+            </a:r>
+            <a:r>
+              <a:rPr lang="en-GB" baseline="0" dirty="0" err="1" smtClean="0"/>
+              <a:t>Övrigt</a:t>
+            </a:r>
+            <a:r>
+              <a:rPr lang="en-GB" baseline="0" dirty="0" smtClean="0"/>
+              <a:t>, </a:t>
+            </a:r>
+            <a:r>
+              <a:rPr lang="en-GB" baseline="0" dirty="0" err="1" smtClean="0"/>
+              <a:t>labben</a:t>
+            </a:r>
+            <a:r>
+              <a:rPr lang="en-GB" baseline="0" dirty="0" smtClean="0"/>
+              <a:t>.</a:t>
+            </a:r>
+            <a:endParaRPr lang="en-US" dirty="0" smtClean="0"/>
+          </a:p>
+          <a:p>
+            <a:endParaRPr lang="sv-SE" dirty="0"/>
+          </a:p>
+        </p:txBody>
+      </p:sp>
+      <p:sp>
+        <p:nvSpPr>
+          <p:cNvPr id="4" name="Slide Number Placeholder 3"/>
+          <p:cNvSpPr>
+            <a:spLocks noGrp="1"/>
+          </p:cNvSpPr>
+          <p:nvPr>
+            <p:ph type="sldNum" sz="quarter" idx="10"/>
+          </p:nvPr>
+        </p:nvSpPr>
+        <p:spPr/>
+        <p:txBody>
+          <a:bodyPr/>
+          <a:lstStyle/>
+          <a:p>
+            <a:pPr lvl="0"/>
+            <a:fld id="{D0FC86B6-5EBF-43A2-AF19-9B4C147144EF}" type="slidenum">
+              <a:rPr lang="sv-SE" smtClean="0"/>
+              <a:t>12</a:t>
+            </a:fld>
+            <a:endParaRPr lang="sv-SE"/>
+          </a:p>
+        </p:txBody>
+      </p:sp>
+    </p:spTree>
+    <p:extLst>
+      <p:ext uri="{BB962C8B-B14F-4D97-AF65-F5344CB8AC3E}">
+        <p14:creationId xmlns:p14="http://schemas.microsoft.com/office/powerpoint/2010/main" val="2663983068"/>
+      </p:ext>
+    </p:extLst>
+  </p:cSld>
+  <p:clrMapOvr>
+    <a:masterClrMapping/>
+  </p:clrMapOvr>
+</p:notes>
+</file>
+
+<file path=ppt/notesSlides/notesSlide13.xml><?xml version="1.0" encoding="utf-8"?>
+<p:notes xmlns:a="http://schemas.openxmlformats.org/drawingml/2006/main" xmlns:r="http://schemas.openxmlformats.org/officeDocument/2006/relationships" xmlns:p="http://schemas.openxmlformats.org/presentationml/2006/main">
+  <p:cSld>
+    <p:spTree>
+      <p:nvGrpSpPr>
+        <p:cNvPr id="1" name=""/>
+        <p:cNvGrpSpPr/>
+        <p:nvPr/>
+      </p:nvGrpSpPr>
+      <p:grpSpPr>
+        <a:xfrm>
+          <a:off x="0" y="0"/>
+          <a:ext cx="0" cy="0"/>
+          <a:chOff x="0" y="0"/>
+          <a:chExt cx="0" cy="0"/>
+        </a:xfrm>
+      </p:grpSpPr>
+      <p:sp>
+        <p:nvSpPr>
+          <p:cNvPr id="2" name="Slide Image Placeholder 1"/>
+          <p:cNvSpPr>
+            <a:spLocks noGrp="1" noRot="1" noChangeAspect="1"/>
+          </p:cNvSpPr>
+          <p:nvPr>
+            <p:ph type="sldImg"/>
+          </p:nvPr>
+        </p:nvSpPr>
         <p:spPr>
           <a:xfrm>
             <a:off x="1106488" y="812800"/>
@@ -3997,18 +4327,94 @@
           <a:lstStyle/>
           <a:p>
             <a:r>
+              <a:rPr lang="sv-SE" b="1" dirty="0" smtClean="0"/>
+              <a:t>Felix</a:t>
+            </a:r>
+            <a:r>
+              <a:rPr lang="sv-SE" b="1" baseline="0" dirty="0" smtClean="0"/>
+              <a:t>: </a:t>
+            </a:r>
+            <a:r>
               <a:rPr lang="sv-SE" dirty="0" smtClean="0"/>
-              <a:t>Tack för</a:t>
+              <a:t>Tangentbordsmotorn</a:t>
             </a:r>
             <a:r>
               <a:rPr lang="sv-SE" baseline="0" dirty="0" smtClean="0"/>
-              <a:t> er tid, och o</a:t>
-            </a:r>
-            <a:r>
-              <a:rPr lang="sv-SE" dirty="0" smtClean="0"/>
-              <a:t>m ni nu haft några funderingar under presentationen skulle vi vilja använda den kvarvarande tiden till en frågestund. Någon?</a:t>
-            </a:r>
-            <a:endParaRPr lang="en-US" dirty="0"/>
+              <a:t> </a:t>
+            </a:r>
+            <a:r>
+              <a:rPr lang="sv-SE" baseline="0" dirty="0" smtClean="0"/>
+              <a:t>är i stort baserad på den vi använde tidigare i denna kurs, men med vissa förändringar specifikt för det här projektet.</a:t>
+            </a:r>
+          </a:p>
+          <a:p>
+            <a:endParaRPr lang="sv-SE" baseline="0" dirty="0" smtClean="0"/>
+          </a:p>
+          <a:p>
+            <a:r>
+              <a:rPr lang="sv-SE" baseline="0" dirty="0" smtClean="0"/>
+              <a:t>Den skriver inte någon data direkt till något minne, utan lägger helt enkelt </a:t>
+            </a:r>
+            <a:r>
+              <a:rPr lang="sv-SE" baseline="0" dirty="0" err="1" smtClean="0"/>
+              <a:t>tilekoderna</a:t>
+            </a:r>
+            <a:r>
+              <a:rPr lang="sv-SE" baseline="0" dirty="0" smtClean="0"/>
+              <a:t> för nedtryckta tangenter på datautgången, som kan läggas på bussen med RC-instruktionen</a:t>
+            </a:r>
+          </a:p>
+          <a:p>
+            <a:endParaRPr lang="sv-SE" baseline="0" dirty="0" smtClean="0"/>
+          </a:p>
+          <a:p>
+            <a:r>
+              <a:rPr lang="sv-SE" baseline="0" dirty="0" smtClean="0"/>
+              <a:t>Tangentbordsmotorn har inte heller någon cursorlogik, utan allt det sköts på </a:t>
+            </a:r>
+            <a:r>
+              <a:rPr lang="sv-SE" baseline="0" dirty="0" err="1" smtClean="0"/>
+              <a:t>assemblynivån</a:t>
+            </a:r>
+            <a:r>
+              <a:rPr lang="sv-SE" baseline="0" dirty="0" smtClean="0"/>
+              <a:t>. </a:t>
+            </a:r>
+          </a:p>
+          <a:p>
+            <a:endParaRPr lang="sv-SE" baseline="0" dirty="0" smtClean="0"/>
+          </a:p>
+          <a:p>
+            <a:r>
+              <a:rPr lang="sv-SE" baseline="0" dirty="0" smtClean="0"/>
+              <a:t>Allt detta motiveras av att en och samma tangent kan ha olika betydelser beroende på sammanhanget, t.ex. kan en siffra tolkas som en del av ett matematiskt uttryck, eller som en skalningsparameter.</a:t>
+            </a:r>
+          </a:p>
+          <a:p>
+            <a:endParaRPr lang="sv-SE" baseline="0" dirty="0" smtClean="0"/>
+          </a:p>
+          <a:p>
+            <a:r>
+              <a:rPr lang="sv-SE" baseline="0" dirty="0" smtClean="0"/>
+              <a:t>Tangentbordsmotorn är därför mycket fokuserad på en enda uppgift: att hålla den senaste nedtrycka tangenten tillgänglig för processorn.</a:t>
+            </a:r>
+          </a:p>
+          <a:p>
+            <a:endParaRPr lang="sv-SE" baseline="0" dirty="0" smtClean="0"/>
+          </a:p>
+          <a:p>
+            <a:r>
+              <a:rPr lang="sv-SE" baseline="0" dirty="0" smtClean="0"/>
+              <a:t>Och den håller det värdet tills en av två saker sker: att processorn läser av värdet och då skickar en </a:t>
+            </a:r>
+            <a:r>
+              <a:rPr lang="sv-SE" baseline="0" dirty="0" err="1" smtClean="0"/>
+              <a:t>read_confirm</a:t>
+            </a:r>
+            <a:r>
+              <a:rPr lang="sv-SE" baseline="0" dirty="0" smtClean="0"/>
+              <a:t> – signal, eller en ny tangent ersätter den föregående. </a:t>
+            </a:r>
           </a:p>
         </p:txBody>
       </p:sp>
@@ -4030,7 +4436,291 @@
             <a:pPr lvl="0"/>
             <a:fld id="{D0FC86B6-5EBF-43A2-AF19-9B4C147144EF}" type="slidenum">
               <a:rPr lang="en-US" smtClean="0"/>
-              <a:t>16</a:t>
+              <a:t>13</a:t>
+            </a:fld>
+            <a:endParaRPr lang="en-US"/>
+          </a:p>
+        </p:txBody>
+      </p:sp>
+    </p:spTree>
+    <p:extLst>
+      <p:ext uri="{BB962C8B-B14F-4D97-AF65-F5344CB8AC3E}">
+        <p14:creationId xmlns:p14="http://schemas.microsoft.com/office/powerpoint/2010/main" val="532189939"/>
+      </p:ext>
+    </p:extLst>
+  </p:cSld>
+  <p:clrMapOvr>
+    <a:masterClrMapping/>
+  </p:clrMapOvr>
+</p:notes>
+</file>
+
+<file path=ppt/notesSlides/notesSlide14.xml><?xml version="1.0" encoding="utf-8"?>
+<p:notes xmlns:a="http://schemas.openxmlformats.org/drawingml/2006/main" xmlns:r="http://schemas.openxmlformats.org/officeDocument/2006/relationships" xmlns:p="http://schemas.openxmlformats.org/presentationml/2006/main">
+  <p:cSld>
+    <p:spTree>
+      <p:nvGrpSpPr>
+        <p:cNvPr id="1" name=""/>
+        <p:cNvGrpSpPr/>
+        <p:nvPr/>
+      </p:nvGrpSpPr>
+      <p:grpSpPr>
+        <a:xfrm>
+          <a:off x="0" y="0"/>
+          <a:ext cx="0" cy="0"/>
+          <a:chOff x="0" y="0"/>
+          <a:chExt cx="0" cy="0"/>
+        </a:xfrm>
+      </p:grpSpPr>
+      <p:sp>
+        <p:nvSpPr>
+          <p:cNvPr id="2" name="Slide Image Placeholder 1"/>
+          <p:cNvSpPr>
+            <a:spLocks noGrp="1" noRot="1" noChangeAspect="1"/>
+          </p:cNvSpPr>
+          <p:nvPr>
+            <p:ph type="sldImg"/>
+          </p:nvPr>
+        </p:nvSpPr>
+        <p:spPr>
+          <a:xfrm>
+            <a:off x="1106488" y="812800"/>
+            <a:ext cx="5345112" cy="4008438"/>
+          </a:xfrm>
+        </p:spPr>
+      </p:sp>
+      <p:sp>
+        <p:nvSpPr>
+          <p:cNvPr id="3" name="Notes Placeholder 2"/>
+          <p:cNvSpPr>
+            <a:spLocks noGrp="1"/>
+          </p:cNvSpPr>
+          <p:nvPr>
+            <p:ph type="body" idx="1"/>
+          </p:nvPr>
+        </p:nvSpPr>
+        <p:spPr/>
+        <p:txBody>
+          <a:bodyPr/>
+          <a:lstStyle/>
+          <a:p>
+            <a:r>
+              <a:rPr lang="sv-SE" b="1" dirty="0" smtClean="0"/>
+              <a:t>Felix: </a:t>
+            </a:r>
+            <a:r>
+              <a:rPr lang="sv-SE" dirty="0" smtClean="0"/>
+              <a:t>Med </a:t>
+            </a:r>
+            <a:r>
+              <a:rPr lang="sv-SE" dirty="0" smtClean="0"/>
+              <a:t>detta kan vi nu avslutningsvis sammanfatta det</a:t>
+            </a:r>
+            <a:r>
+              <a:rPr lang="sv-SE" baseline="0" dirty="0" smtClean="0"/>
+              <a:t> faktiska programflödet:</a:t>
+            </a:r>
+          </a:p>
+          <a:p>
+            <a:endParaRPr lang="sv-SE" baseline="0" dirty="0" smtClean="0"/>
+          </a:p>
+          <a:p>
+            <a:r>
+              <a:rPr lang="sv-SE" baseline="0" dirty="0" smtClean="0"/>
+              <a:t>Processorn står i en loop som hela tiden läser av värdet från tangentsbordmotorn med RC, och när en tangent äntligen registreras läser processorn av det värdet (alltså </a:t>
+            </a:r>
+            <a:r>
+              <a:rPr lang="sv-SE" baseline="0" dirty="0" err="1" smtClean="0"/>
+              <a:t>tilekoden</a:t>
+            </a:r>
+            <a:r>
+              <a:rPr lang="sv-SE" baseline="0" dirty="0" smtClean="0"/>
+              <a:t>), och går vidare med programlogiken.</a:t>
+            </a:r>
+          </a:p>
+          <a:p>
+            <a:endParaRPr lang="sv-SE" baseline="0" dirty="0" smtClean="0"/>
+          </a:p>
+          <a:p>
+            <a:r>
+              <a:rPr lang="sv-SE" baseline="0" dirty="0" smtClean="0"/>
+              <a:t>Vi bestämmer, beroende på sammanhanget vilken typ av input det rör sig: heltal, decimaltal, parameter, operator, osv.</a:t>
+            </a:r>
+          </a:p>
+          <a:p>
+            <a:endParaRPr lang="sv-SE" baseline="0" dirty="0" smtClean="0"/>
+          </a:p>
+          <a:p>
+            <a:r>
+              <a:rPr lang="sv-SE" baseline="0" dirty="0" smtClean="0"/>
+              <a:t>Sedan bestäms det vilken typ av handling som ska utföras på det inmatade värdet. Om det är en operator eller </a:t>
+            </a:r>
+            <a:r>
+              <a:rPr lang="sv-SE" baseline="0" dirty="0" err="1" smtClean="0"/>
+              <a:t>operand</a:t>
+            </a:r>
+            <a:r>
+              <a:rPr lang="sv-SE" baseline="0" dirty="0" smtClean="0"/>
+              <a:t> ska det läggas på evalueringsstacken, kanske ska det vara en modifierare på kommande inmatningar såsom ’N’ eller ’P’, eller om det är </a:t>
+            </a:r>
+            <a:r>
+              <a:rPr lang="sv-SE" baseline="0" dirty="0" err="1" smtClean="0"/>
+              <a:t>enter</a:t>
+            </a:r>
+            <a:r>
+              <a:rPr lang="sv-SE" baseline="0" dirty="0" smtClean="0"/>
+              <a:t> ska vi antingen evaluera uttrycket eller plotta funktionen.</a:t>
+            </a:r>
+          </a:p>
+          <a:p>
+            <a:endParaRPr lang="sv-SE" baseline="0" dirty="0" smtClean="0"/>
+          </a:p>
+          <a:p>
+            <a:r>
+              <a:rPr lang="sv-SE" baseline="0" dirty="0" smtClean="0"/>
+              <a:t>När det är klart väntar vi återigen på en ny inmatning och cykeln börjar om.</a:t>
+            </a:r>
+          </a:p>
+          <a:p>
+            <a:endParaRPr lang="sv-SE" baseline="0" dirty="0" smtClean="0"/>
+          </a:p>
+          <a:p>
+            <a:r>
+              <a:rPr lang="sv-SE" baseline="0" dirty="0" smtClean="0"/>
+              <a:t>Dessa övergripande steg innefattar alla koncept och komponenter som den här presentationen tagit upp, och bygger tillsammans upp en fullt fungerande hård-och mjukvaruplattform för en grafräknare.</a:t>
+            </a:r>
+          </a:p>
+        </p:txBody>
+      </p:sp>
+      <p:sp>
+        <p:nvSpPr>
+          <p:cNvPr id="4" name="Slide Number Placeholder 3"/>
+          <p:cNvSpPr>
+            <a:spLocks noGrp="1"/>
+          </p:cNvSpPr>
+          <p:nvPr>
+            <p:ph type="sldNum" sz="quarter" idx="10"/>
+          </p:nvPr>
+        </p:nvSpPr>
+        <p:spPr/>
+        <p:txBody>
+          <a:bodyPr/>
+          <a:lstStyle/>
+          <a:p>
+            <a:pPr lvl="0"/>
+            <a:fld id="{D0FC86B6-5EBF-43A2-AF19-9B4C147144EF}" type="slidenum">
+              <a:rPr lang="en-US" smtClean="0"/>
+              <a:t>14</a:t>
+            </a:fld>
+            <a:endParaRPr lang="en-US"/>
+          </a:p>
+        </p:txBody>
+      </p:sp>
+    </p:spTree>
+    <p:extLst>
+      <p:ext uri="{BB962C8B-B14F-4D97-AF65-F5344CB8AC3E}">
+        <p14:creationId xmlns:p14="http://schemas.microsoft.com/office/powerpoint/2010/main" val="1130169636"/>
+      </p:ext>
+    </p:extLst>
+  </p:cSld>
+  <p:clrMapOvr>
+    <a:masterClrMapping/>
+  </p:clrMapOvr>
+</p:notes>
+</file>
+
+<file path=ppt/notesSlides/notesSlide15.xml><?xml version="1.0" encoding="utf-8"?>
+<p:notes xmlns:a="http://schemas.openxmlformats.org/drawingml/2006/main" xmlns:r="http://schemas.openxmlformats.org/officeDocument/2006/relationships" xmlns:p="http://schemas.openxmlformats.org/presentationml/2006/main">
+  <p:cSld>
+    <p:spTree>
+      <p:nvGrpSpPr>
+        <p:cNvPr id="1" name=""/>
+        <p:cNvGrpSpPr/>
+        <p:nvPr/>
+      </p:nvGrpSpPr>
+      <p:grpSpPr>
+        <a:xfrm>
+          <a:off x="0" y="0"/>
+          <a:ext cx="0" cy="0"/>
+          <a:chOff x="0" y="0"/>
+          <a:chExt cx="0" cy="0"/>
+        </a:xfrm>
+      </p:grpSpPr>
+      <p:sp>
+        <p:nvSpPr>
+          <p:cNvPr id="2" name="Slide Image Placeholder 1"/>
+          <p:cNvSpPr>
+            <a:spLocks noGrp="1" noRot="1" noChangeAspect="1"/>
+          </p:cNvSpPr>
+          <p:nvPr>
+            <p:ph type="sldImg"/>
+          </p:nvPr>
+        </p:nvSpPr>
+        <p:spPr>
+          <a:xfrm>
+            <a:off x="1106488" y="812800"/>
+            <a:ext cx="5345112" cy="4008438"/>
+          </a:xfrm>
+        </p:spPr>
+      </p:sp>
+      <p:sp>
+        <p:nvSpPr>
+          <p:cNvPr id="3" name="Notes Placeholder 2"/>
+          <p:cNvSpPr>
+            <a:spLocks noGrp="1"/>
+          </p:cNvSpPr>
+          <p:nvPr>
+            <p:ph type="body" idx="1"/>
+          </p:nvPr>
+        </p:nvSpPr>
+        <p:spPr/>
+        <p:txBody>
+          <a:bodyPr/>
+          <a:lstStyle/>
+          <a:p>
+            <a:r>
+              <a:rPr lang="sv-SE" b="1" dirty="0" smtClean="0"/>
+              <a:t>Felix: </a:t>
+            </a:r>
+            <a:r>
+              <a:rPr lang="sv-SE" dirty="0" smtClean="0"/>
+              <a:t>Tack </a:t>
+            </a:r>
+            <a:r>
+              <a:rPr lang="sv-SE" dirty="0" smtClean="0"/>
+              <a:t>för</a:t>
+            </a:r>
+            <a:r>
+              <a:rPr lang="sv-SE" baseline="0" dirty="0" smtClean="0"/>
+              <a:t> er tid, och o</a:t>
+            </a:r>
+            <a:r>
+              <a:rPr lang="sv-SE" dirty="0" smtClean="0"/>
+              <a:t>m ni nu haft några funderingar under presentationen skulle vi vilja använda den kvarvarande tiden till en frågestund. Någon?</a:t>
+            </a:r>
+            <a:endParaRPr lang="en-US" dirty="0"/>
+          </a:p>
+        </p:txBody>
+      </p:sp>
+      <p:sp>
+        <p:nvSpPr>
+          <p:cNvPr id="4" name="Slide Number Placeholder 3"/>
+          <p:cNvSpPr>
+            <a:spLocks noGrp="1"/>
+          </p:cNvSpPr>
+          <p:nvPr>
+            <p:ph type="sldNum" sz="quarter" idx="10"/>
+          </p:nvPr>
+        </p:nvSpPr>
+        <p:spPr/>
+        <p:txBody>
+          <a:bodyPr/>
+          <a:lstStyle/>
+          <a:p>
+            <a:pPr lvl="0"/>
+            <a:fld id="{D0FC86B6-5EBF-43A2-AF19-9B4C147144EF}" type="slidenum">
+              <a:rPr lang="en-US" smtClean="0"/>
+              <a:t>15</a:t>
             </a:fld>
             <a:endParaRPr lang="en-US"/>
           </a:p>
@@ -4076,12 +4766,7 @@
             <p:ph type="sldImg"/>
           </p:nvPr>
         </p:nvSpPr>
-        <p:spPr>
-          <a:xfrm>
-            <a:off x="1106488" y="812800"/>
-            <a:ext cx="5345112" cy="4008438"/>
-          </a:xfrm>
-        </p:spPr>
+        <p:spPr/>
       </p:sp>
       <p:sp>
         <p:nvSpPr>
@@ -4099,53 +4784,10 @@
           <a:lstStyle/>
           <a:p>
             <a:r>
-              <a:rPr lang="sv-SE" dirty="0" smtClean="0"/>
-              <a:t>Förutom att beräkna resultatet av uttryck kan vår räknare också rita ut funktioner.</a:t>
-            </a:r>
-          </a:p>
-          <a:p>
-            <a:endParaRPr lang="sv-SE" dirty="0" smtClean="0"/>
-          </a:p>
-          <a:p>
-            <a:r>
-              <a:rPr lang="sv-SE" dirty="0" smtClean="0"/>
-              <a:t>Om du har med ett "X" som en </a:t>
-            </a:r>
-            <a:r>
-              <a:rPr lang="sv-SE" dirty="0" err="1" smtClean="0"/>
-              <a:t>operand</a:t>
-            </a:r>
-            <a:r>
-              <a:rPr lang="sv-SE" dirty="0" smtClean="0"/>
-              <a:t> kommer uttrycket att tolkas som en funktion, och dess tillhörande graf kommer ritas upp på </a:t>
-            </a:r>
-            <a:r>
-              <a:rPr lang="sv-SE" dirty="0" err="1" smtClean="0"/>
-              <a:t>vänsta</a:t>
-            </a:r>
-            <a:r>
-              <a:rPr lang="sv-SE" dirty="0" smtClean="0"/>
-              <a:t> delen av skärmen vid evaluering.</a:t>
-            </a:r>
-          </a:p>
-          <a:p>
-            <a:endParaRPr lang="sv-SE" dirty="0" smtClean="0"/>
-          </a:p>
-          <a:p>
-            <a:r>
-              <a:rPr lang="sv-SE" dirty="0" smtClean="0"/>
-              <a:t>Detta görs genom att byta X:et mot varje pixels reella X-värde i tur och ordning, ta lite hänsyn till skalning, och sedan rita in motsvarande pixel.</a:t>
-            </a:r>
-          </a:p>
-          <a:p>
-            <a:endParaRPr lang="sv-SE" dirty="0" smtClean="0"/>
-          </a:p>
-          <a:p>
-            <a:r>
-              <a:rPr lang="sv-SE" dirty="0" smtClean="0"/>
-              <a:t>Naturligtvis kan ni skala om grafen. Detta görs genom att slå knappen p följt av gränser i x-led och y-led, respektive. Detta ger resultat då nästa funktion ritas ut.</a:t>
-            </a:r>
-            <a:endParaRPr lang="en-US" dirty="0"/>
+              <a:rPr lang="en-GB" b="1" dirty="0" smtClean="0"/>
+              <a:t>Hannes:</a:t>
+            </a:r>
+            <a:endParaRPr lang="sv-SE" dirty="0"/>
           </a:p>
         </p:txBody>
       </p:sp>
@@ -4166,17 +4808,17 @@
           <a:p>
             <a:pPr lvl="0"/>
             <a:fld id="{D0FC86B6-5EBF-43A2-AF19-9B4C147144EF}" type="slidenum">
-              <a:rPr lang="en-US" smtClean="0"/>
-              <a:t>6</a:t>
+              <a:rPr lang="sv-SE" smtClean="0"/>
+              <a:t>2</a:t>
             </a:fld>
-            <a:endParaRPr lang="en-US"/>
+            <a:endParaRPr lang="sv-SE"/>
           </a:p>
         </p:txBody>
       </p:sp>
     </p:spTree>
     <p:extLst>
       <p:ext uri="{BB962C8B-B14F-4D97-AF65-F5344CB8AC3E}">
-        <p14:creationId xmlns:p14="http://schemas.microsoft.com/office/powerpoint/2010/main" val="1207151148"/>
+        <p14:creationId xmlns:p14="http://schemas.microsoft.com/office/powerpoint/2010/main" val="3791953178"/>
       </p:ext>
     </p:extLst>
   </p:cSld>
@@ -4213,12 +4855,7 @@
             <p:ph type="sldImg"/>
           </p:nvPr>
         </p:nvSpPr>
-        <p:spPr>
-          <a:xfrm>
-            <a:off x="1106488" y="812800"/>
-            <a:ext cx="5345112" cy="4008438"/>
-          </a:xfrm>
-        </p:spPr>
+        <p:spPr/>
       </p:sp>
       <p:sp>
         <p:nvSpPr>
@@ -4236,65 +4873,10 @@
           <a:lstStyle/>
           <a:p>
             <a:r>
-              <a:rPr lang="sv-SE" dirty="0" smtClean="0"/>
-              <a:t>All denna programkod körs på en generell dator vi byggt från grunden.</a:t>
-            </a:r>
-          </a:p>
-          <a:p>
-            <a:endParaRPr lang="sv-SE" dirty="0" smtClean="0"/>
-          </a:p>
-          <a:p>
-            <a:r>
-              <a:rPr lang="sv-SE" dirty="0" smtClean="0"/>
-              <a:t>Vi kan bryta ner hårdvaran i tre distinkta moduler. En CPU, en tangentbordsmotor, och en VGA-motor. Som förväntat så sköter </a:t>
-            </a:r>
-            <a:r>
-              <a:rPr lang="sv-SE" dirty="0" err="1" smtClean="0"/>
-              <a:t>CPU:n</a:t>
-            </a:r>
-            <a:r>
-              <a:rPr lang="sv-SE" dirty="0" smtClean="0"/>
-              <a:t> </a:t>
-            </a:r>
-            <a:r>
-              <a:rPr lang="sv-SE" dirty="0" err="1" smtClean="0"/>
-              <a:t>parsning</a:t>
-            </a:r>
-            <a:r>
-              <a:rPr lang="sv-SE" dirty="0" smtClean="0"/>
-              <a:t> av maskinkod och beräkningar, tangentbordsmotorn läser tecken via USB, och VGA-motorn kan ge oss skärmutmatning baserat på givet minne.</a:t>
-            </a:r>
-          </a:p>
-          <a:p>
-            <a:endParaRPr lang="sv-SE" dirty="0" smtClean="0"/>
-          </a:p>
-          <a:p>
-            <a:r>
-              <a:rPr lang="sv-SE" dirty="0" err="1" smtClean="0"/>
-              <a:t>CPU:n</a:t>
-            </a:r>
-            <a:r>
-              <a:rPr lang="sv-SE" dirty="0" smtClean="0"/>
-              <a:t> sitter i "mitten", som ni ser på bilden, läser från tangentbordsmotorn, och skriver till VGA-motorn. Dessa två kommunicerar i sin tur med extern hårdvara: tangentbord och skärm.</a:t>
-            </a:r>
-          </a:p>
-          <a:p>
-            <a:endParaRPr lang="sv-SE" dirty="0" smtClean="0"/>
-          </a:p>
-          <a:p>
-            <a:r>
-              <a:rPr lang="sv-SE" dirty="0" smtClean="0"/>
-              <a:t>Vi redovisar dessa moduler i tur och ordning, med </a:t>
-            </a:r>
-            <a:r>
-              <a:rPr lang="sv-SE" dirty="0" err="1" smtClean="0"/>
-              <a:t>CPU:n</a:t>
-            </a:r>
-            <a:r>
-              <a:rPr lang="sv-SE" dirty="0" smtClean="0"/>
-              <a:t> först.</a:t>
-            </a:r>
-            <a:endParaRPr lang="en-US" dirty="0"/>
+              <a:rPr lang="en-GB" b="1" dirty="0" smtClean="0"/>
+              <a:t>Hannes:</a:t>
+            </a:r>
+            <a:endParaRPr lang="sv-SE" dirty="0"/>
           </a:p>
         </p:txBody>
       </p:sp>
@@ -4315,17 +4897,17 @@
           <a:p>
             <a:pPr lvl="0"/>
             <a:fld id="{D0FC86B6-5EBF-43A2-AF19-9B4C147144EF}" type="slidenum">
-              <a:rPr lang="en-US" smtClean="0"/>
-              <a:t>7</a:t>
+              <a:rPr lang="sv-SE" smtClean="0"/>
+              <a:t>3</a:t>
             </a:fld>
-            <a:endParaRPr lang="en-US"/>
+            <a:endParaRPr lang="sv-SE"/>
           </a:p>
         </p:txBody>
       </p:sp>
     </p:spTree>
     <p:extLst>
       <p:ext uri="{BB962C8B-B14F-4D97-AF65-F5344CB8AC3E}">
-        <p14:creationId xmlns:p14="http://schemas.microsoft.com/office/powerpoint/2010/main" val="2329279041"/>
+        <p14:creationId xmlns:p14="http://schemas.microsoft.com/office/powerpoint/2010/main" val="1559790045"/>
       </p:ext>
     </p:extLst>
   </p:cSld>
@@ -4380,78 +4962,9 @@
           <a:lstStyle/>
           <a:p>
             <a:r>
-              <a:rPr lang="sv-SE" sz="2000" b="0" i="0" u="none" strike="noStrike" kern="1200" cap="none" dirty="0" smtClean="0">
-                <a:ln>
-                  <a:noFill/>
-                </a:ln>
-                <a:effectLst/>
-                <a:latin typeface="Liberation Sans" pitchFamily="18"/>
-              </a:rPr>
-              <a:t>CPU</a:t>
-            </a:r>
-            <a:r>
-              <a:rPr lang="sv-SE" sz="2000" b="0" i="0" u="none" strike="noStrike" kern="1200" cap="none" baseline="0" dirty="0" smtClean="0">
-                <a:ln>
-                  <a:noFill/>
-                </a:ln>
-                <a:effectLst/>
-                <a:latin typeface="Liberation Sans" pitchFamily="18"/>
-              </a:rPr>
-              <a:t>:n </a:t>
-            </a:r>
-            <a:r>
-              <a:rPr lang="sv-SE" sz="2000" b="0" i="0" u="none" strike="noStrike" kern="1200" cap="none" dirty="0" smtClean="0">
-                <a:ln>
-                  <a:noFill/>
-                </a:ln>
-                <a:effectLst/>
-                <a:latin typeface="Liberation Sans" pitchFamily="18"/>
-              </a:rPr>
-              <a:t>programmeras med maskinkod.</a:t>
-            </a:r>
-          </a:p>
-          <a:p>
-            <a:endParaRPr lang="sv-SE" sz="2000" b="0" i="0" u="none" strike="noStrike" kern="1200" cap="none" dirty="0" smtClean="0">
-              <a:ln>
-                <a:noFill/>
-              </a:ln>
-              <a:effectLst/>
-              <a:latin typeface="Liberation Sans" pitchFamily="18"/>
-            </a:endParaRPr>
-          </a:p>
-          <a:p>
-            <a:r>
-              <a:rPr lang="sv-SE" sz="2000" b="0" i="0" u="none" strike="noStrike" kern="1200" cap="none" dirty="0" smtClean="0">
-                <a:ln>
-                  <a:noFill/>
-                </a:ln>
-                <a:effectLst/>
-                <a:latin typeface="Liberation Sans" pitchFamily="18"/>
-              </a:rPr>
-              <a:t>Support för 27 instruktioner.</a:t>
-            </a:r>
-            <a:r>
-              <a:rPr lang="sv-SE" sz="2000" b="0" i="0" u="none" strike="noStrike" kern="1200" cap="none" baseline="0" dirty="0" smtClean="0">
-                <a:ln>
-                  <a:noFill/>
-                </a:ln>
-                <a:effectLst/>
-                <a:latin typeface="Liberation Sans" pitchFamily="18"/>
-              </a:rPr>
-              <a:t> ADD,LSL,BRA, plus special (grafik/tangentbord) (oanvända). K</a:t>
-            </a:r>
-            <a:r>
-              <a:rPr lang="sv-SE" sz="2000" b="0" i="0" u="none" strike="noStrike" kern="1200" cap="none" dirty="0" smtClean="0">
-                <a:ln>
-                  <a:noFill/>
-                </a:ln>
-                <a:effectLst/>
-                <a:latin typeface="Liberation Sans" pitchFamily="18"/>
-              </a:rPr>
-              <a:t>an kallas på med 3 moder. Åtta generella register (ej HR), och 5 olika flaggor för hopp.</a:t>
-            </a:r>
-          </a:p>
-          <a:p>
+              <a:rPr lang="en-GB" b="1" dirty="0" smtClean="0"/>
+              <a:t>Hannes:</a:t>
+            </a:r>
             <a:endParaRPr lang="sv-SE" dirty="0"/>
           </a:p>
         </p:txBody>
@@ -4474,7 +4987,7 @@
             <a:pPr lvl="0"/>
             <a:fld id="{D0FC86B6-5EBF-43A2-AF19-9B4C147144EF}" type="slidenum">
               <a:rPr lang="sv-SE" smtClean="0"/>
-              <a:t>9</a:t>
+              <a:t>4</a:t>
             </a:fld>
             <a:endParaRPr lang="sv-SE"/>
           </a:p>
@@ -4483,7 +4996,7 @@
     </p:spTree>
     <p:extLst>
       <p:ext uri="{BB962C8B-B14F-4D97-AF65-F5344CB8AC3E}">
-        <p14:creationId xmlns:p14="http://schemas.microsoft.com/office/powerpoint/2010/main" val="3737433917"/>
+        <p14:creationId xmlns:p14="http://schemas.microsoft.com/office/powerpoint/2010/main" val="3673925456"/>
       </p:ext>
     </p:extLst>
   </p:cSld>
@@ -4543,52 +5056,74 @@
           <a:lstStyle/>
           <a:p>
             <a:r>
-              <a:rPr lang="en-US" baseline="0" dirty="0" err="1" smtClean="0"/>
-              <a:t>Instruktioner</a:t>
-            </a:r>
-            <a:r>
-              <a:rPr lang="en-US" baseline="0" dirty="0" smtClean="0"/>
-              <a:t>, register, </a:t>
-            </a:r>
-            <a:r>
-              <a:rPr lang="en-US" baseline="0" dirty="0" err="1" smtClean="0"/>
-              <a:t>minnesmod</a:t>
-            </a:r>
-            <a:r>
-              <a:rPr lang="en-US" baseline="0" dirty="0" smtClean="0"/>
+              <a:rPr lang="sv-SE" b="1" dirty="0" smtClean="0"/>
+              <a:t>Felix: </a:t>
+            </a:r>
+            <a:r>
+              <a:rPr lang="sv-SE" dirty="0" smtClean="0"/>
+              <a:t>Omvänd </a:t>
+            </a:r>
+            <a:r>
+              <a:rPr lang="sv-SE" dirty="0" smtClean="0"/>
+              <a:t>polsk notation, eller RPN för ’reverse polish notation’ är nämligen notationen som används när grafräknaren ges input. Att evaluera traditionella </a:t>
+            </a:r>
+            <a:r>
+              <a:rPr lang="sv-SE" dirty="0" err="1" smtClean="0"/>
+              <a:t>mattematiska</a:t>
+            </a:r>
+            <a:r>
+              <a:rPr lang="sv-SE" dirty="0" smtClean="0"/>
+              <a:t> uttryck kräver generellt både </a:t>
+            </a:r>
+            <a:r>
+              <a:rPr lang="sv-SE" dirty="0" err="1" smtClean="0"/>
+              <a:t>rekursion</a:t>
+            </a:r>
+            <a:r>
+              <a:rPr lang="sv-SE" dirty="0" smtClean="0"/>
+              <a:t>, vilket vi saknar support för, och</a:t>
+            </a:r>
+            <a:r>
+              <a:rPr lang="sv-SE" baseline="0" dirty="0" smtClean="0"/>
               <a:t> </a:t>
             </a:r>
             <a:r>
-              <a:rPr lang="en-US" baseline="0" dirty="0" err="1" smtClean="0"/>
-              <a:t>få</a:t>
-            </a:r>
-            <a:r>
-              <a:rPr lang="en-US" baseline="0" dirty="0" smtClean="0"/>
-              <a:t> </a:t>
-            </a:r>
-            <a:r>
-              <a:rPr lang="en-US" baseline="0" dirty="0" err="1" smtClean="0"/>
-              <a:t>bitar</a:t>
-            </a:r>
-            <a:r>
-              <a:rPr lang="en-US" baseline="0" dirty="0" smtClean="0"/>
-              <a:t>, </a:t>
-            </a:r>
-            <a:r>
-              <a:rPr lang="en-US" baseline="0" dirty="0" err="1" smtClean="0"/>
-              <a:t>adressdel</a:t>
-            </a:r>
-            <a:r>
-              <a:rPr lang="en-US" baseline="0" dirty="0" smtClean="0"/>
-              <a:t> </a:t>
-            </a:r>
-            <a:r>
-              <a:rPr lang="en-US" baseline="0" dirty="0" err="1" smtClean="0"/>
-              <a:t>resten</a:t>
-            </a:r>
-            <a:r>
-              <a:rPr lang="en-US" baseline="0" dirty="0" smtClean="0"/>
-              <a:t> (32)</a:t>
+              <a:rPr lang="sv-SE" dirty="0" smtClean="0"/>
+              <a:t>mycket arbete.</a:t>
+            </a:r>
+          </a:p>
+          <a:p>
+            <a:endParaRPr lang="sv-SE" dirty="0" smtClean="0"/>
+          </a:p>
+          <a:p>
+            <a:r>
+              <a:rPr lang="sv-SE" dirty="0" smtClean="0"/>
+              <a:t>RPN tillåter användaren att skriva vilket uttryck som helst, men kan fortfarande enkelt evalueras iterativt med hjälp av en stack.</a:t>
+            </a:r>
+          </a:p>
+          <a:p>
+            <a:endParaRPr lang="sv-SE" dirty="0" smtClean="0"/>
+          </a:p>
+          <a:p>
+            <a:r>
+              <a:rPr lang="sv-SE" dirty="0" smtClean="0"/>
+              <a:t>I konsolen, som vi senare demonstrerar, så skrivs uttryck så här, med tokens separerade av mellanslag. </a:t>
+            </a:r>
+            <a:r>
+              <a:rPr lang="sv-SE" dirty="0" err="1" smtClean="0"/>
+              <a:t>Enter</a:t>
+            </a:r>
+            <a:r>
+              <a:rPr lang="sv-SE" dirty="0" smtClean="0"/>
+              <a:t> för att säga åt maskinen att evaluera uttrycket. Då minustecknet är reserverat för dess operator, så används 'N' för att göra </a:t>
+            </a:r>
+            <a:r>
+              <a:rPr lang="sv-SE" dirty="0" err="1" smtClean="0"/>
+              <a:t>operander</a:t>
+            </a:r>
+            <a:r>
+              <a:rPr lang="sv-SE" dirty="0" smtClean="0"/>
+              <a:t> negativa.</a:t>
             </a:r>
             <a:endParaRPr lang="en-US" dirty="0"/>
           </a:p>
@@ -4611,17 +5146,17 @@
           <a:p>
             <a:pPr lvl="0"/>
             <a:fld id="{D0FC86B6-5EBF-43A2-AF19-9B4C147144EF}" type="slidenum">
-              <a:rPr lang="sv-SE" smtClean="0"/>
-              <a:t>10</a:t>
+              <a:rPr lang="en-US" smtClean="0"/>
+              <a:t>5</a:t>
             </a:fld>
-            <a:endParaRPr lang="sv-SE"/>
+            <a:endParaRPr lang="en-US"/>
           </a:p>
         </p:txBody>
       </p:sp>
     </p:spTree>
     <p:extLst>
       <p:ext uri="{BB962C8B-B14F-4D97-AF65-F5344CB8AC3E}">
-        <p14:creationId xmlns:p14="http://schemas.microsoft.com/office/powerpoint/2010/main" val="2345692999"/>
+        <p14:creationId xmlns:p14="http://schemas.microsoft.com/office/powerpoint/2010/main" val="1602485305"/>
       </p:ext>
     </p:extLst>
   </p:cSld>
@@ -4658,7 +5193,12 @@
             <p:ph type="sldImg"/>
           </p:nvPr>
         </p:nvSpPr>
-        <p:spPr/>
+        <p:spPr>
+          <a:xfrm>
+            <a:off x="1106488" y="812800"/>
+            <a:ext cx="5345112" cy="4008438"/>
+          </a:xfrm>
+        </p:spPr>
       </p:sp>
       <p:sp>
         <p:nvSpPr>
@@ -4676,22 +5216,65 @@
           <a:lstStyle/>
           <a:p>
             <a:r>
-              <a:rPr lang="sv-SE" noProof="0" dirty="0" smtClean="0"/>
-              <a:t>Moder, har de vanliga, ej indexerad (labels). Direkt , indirekt </a:t>
-            </a:r>
-            <a:r>
-              <a:rPr lang="sv-SE" baseline="0" noProof="0" dirty="0" smtClean="0"/>
-              <a:t>som förväntat. </a:t>
-            </a:r>
-            <a:r>
-              <a:rPr lang="sv-SE" noProof="0" dirty="0" smtClean="0"/>
-              <a:t>Omedelbar, 32 bitar,</a:t>
-            </a:r>
-            <a:r>
-              <a:rPr lang="sv-SE" baseline="0" noProof="0" dirty="0" smtClean="0"/>
-              <a:t> nästa rad. Sillescript: direktaddr default, hakas $~ instr.</a:t>
-            </a:r>
-            <a:endParaRPr lang="sv-SE" noProof="0" dirty="0"/>
+              <a:rPr lang="sv-SE" b="1" dirty="0" smtClean="0"/>
+              <a:t>Felix:</a:t>
+            </a:r>
+            <a:r>
+              <a:rPr lang="sv-SE" b="1" baseline="0" dirty="0" smtClean="0"/>
+              <a:t> </a:t>
+            </a:r>
+            <a:r>
+              <a:rPr lang="sv-SE" dirty="0" smtClean="0"/>
+              <a:t>Förutom </a:t>
+            </a:r>
+            <a:r>
+              <a:rPr lang="sv-SE" dirty="0" smtClean="0"/>
+              <a:t>att beräkna resultatet av uttryck kan vår räknare också rita ut funktioner.</a:t>
+            </a:r>
+          </a:p>
+          <a:p>
+            <a:endParaRPr lang="sv-SE" dirty="0" smtClean="0"/>
+          </a:p>
+          <a:p>
+            <a:r>
+              <a:rPr lang="sv-SE" dirty="0" smtClean="0"/>
+              <a:t>Om du har med ett "X" som en </a:t>
+            </a:r>
+            <a:r>
+              <a:rPr lang="sv-SE" dirty="0" err="1" smtClean="0"/>
+              <a:t>operand</a:t>
+            </a:r>
+            <a:r>
+              <a:rPr lang="sv-SE" dirty="0" smtClean="0"/>
+              <a:t> kommer uttrycket att tolkas som en funktion, och dess tillhörande graf kommer ritas upp på </a:t>
+            </a:r>
+            <a:r>
+              <a:rPr lang="sv-SE" dirty="0" err="1" smtClean="0"/>
+              <a:t>vänsta</a:t>
+            </a:r>
+            <a:r>
+              <a:rPr lang="sv-SE" dirty="0" smtClean="0"/>
+              <a:t> delen av skärmen vid evaluering.</a:t>
+            </a:r>
+          </a:p>
+          <a:p>
+            <a:endParaRPr lang="sv-SE" dirty="0" smtClean="0"/>
+          </a:p>
+          <a:p>
+            <a:r>
+              <a:rPr lang="sv-SE" dirty="0" smtClean="0"/>
+              <a:t>Detta görs genom att byta X:et mot varje pixels reella X-värde i tur och ordning, ta lite hänsyn till skalning, och sedan rita in motsvarande pixel.</a:t>
+            </a:r>
+          </a:p>
+          <a:p>
+            <a:endParaRPr lang="sv-SE" dirty="0" smtClean="0"/>
+          </a:p>
+          <a:p>
+            <a:r>
+              <a:rPr lang="sv-SE" dirty="0" smtClean="0"/>
+              <a:t>Naturligtvis kan ni skala om grafen. Detta görs genom att slå knappen p följt av gränser i x-led och y-led, respektive. Detta ger resultat då nästa funktion ritas ut.</a:t>
+            </a:r>
+            <a:endParaRPr lang="en-US" dirty="0"/>
           </a:p>
         </p:txBody>
       </p:sp>
@@ -4712,17 +5295,17 @@
           <a:p>
             <a:pPr lvl="0"/>
             <a:fld id="{D0FC86B6-5EBF-43A2-AF19-9B4C147144EF}" type="slidenum">
-              <a:rPr lang="sv-SE" smtClean="0"/>
-              <a:t>11</a:t>
+              <a:rPr lang="en-US" smtClean="0"/>
+              <a:t>6</a:t>
             </a:fld>
-            <a:endParaRPr lang="sv-SE"/>
+            <a:endParaRPr lang="en-US"/>
           </a:p>
         </p:txBody>
       </p:sp>
     </p:spTree>
     <p:extLst>
       <p:ext uri="{BB962C8B-B14F-4D97-AF65-F5344CB8AC3E}">
-        <p14:creationId xmlns:p14="http://schemas.microsoft.com/office/powerpoint/2010/main" val="3100289925"/>
+        <p14:creationId xmlns:p14="http://schemas.microsoft.com/office/powerpoint/2010/main" val="1207151148"/>
       </p:ext>
     </p:extLst>
   </p:cSld>
@@ -4759,7 +5342,12 @@
             <p:ph type="sldImg"/>
           </p:nvPr>
         </p:nvSpPr>
-        <p:spPr/>
+        <p:spPr>
+          <a:xfrm>
+            <a:off x="1106488" y="812800"/>
+            <a:ext cx="5345112" cy="4008438"/>
+          </a:xfrm>
+        </p:spPr>
       </p:sp>
       <p:sp>
         <p:nvSpPr>
@@ -4776,107 +5364,74 @@
           <a:bodyPr/>
           <a:lstStyle/>
           <a:p>
-            <a:pPr marL="216000" marR="0" indent="-216000" defTabSz="914400" rtl="0" eaLnBrk="1" fontAlgn="auto" latinLnBrk="0" hangingPunct="0">
-              <a:lnSpc>
-                <a:spcPct val="100000"/>
-              </a:lnSpc>
-              <a:spcBef>
-                <a:spcPts val="0"/>
-              </a:spcBef>
-              <a:spcAft>
-                <a:spcPts val="0"/>
-              </a:spcAft>
-              <a:buClrTx/>
-              <a:buSzTx/>
-              <a:buFontTx/>
-              <a:buNone/>
-              <a:tabLst/>
-              <a:defRPr/>
-            </a:pPr>
-            <a:r>
-              <a:rPr lang="en-US" dirty="0" err="1" smtClean="0"/>
-              <a:t>Disp</a:t>
-            </a:r>
-            <a:r>
-              <a:rPr lang="en-US" dirty="0" smtClean="0"/>
-              <a:t> 640x480px </a:t>
-            </a:r>
-            <a:r>
-              <a:rPr lang="en-US" dirty="0" err="1" smtClean="0"/>
-              <a:t>uppdelat</a:t>
-            </a:r>
-            <a:r>
-              <a:rPr lang="en-US" dirty="0" smtClean="0"/>
-              <a:t>. </a:t>
-            </a:r>
-            <a:r>
-              <a:rPr lang="en-US" dirty="0" err="1" smtClean="0"/>
-              <a:t>Svartvit</a:t>
-            </a:r>
-            <a:r>
-              <a:rPr lang="en-US" baseline="0" dirty="0" smtClean="0"/>
-              <a:t> bitmap </a:t>
-            </a:r>
-            <a:r>
-              <a:rPr lang="en-US" baseline="0" dirty="0" err="1" smtClean="0"/>
-              <a:t>på</a:t>
-            </a:r>
-            <a:r>
-              <a:rPr lang="en-US" baseline="0" dirty="0" smtClean="0"/>
+            <a:r>
+              <a:rPr lang="sv-SE" b="1" dirty="0" smtClean="0"/>
+              <a:t>Felix: </a:t>
+            </a:r>
+            <a:r>
+              <a:rPr lang="sv-SE" dirty="0" smtClean="0"/>
+              <a:t>All </a:t>
+            </a:r>
+            <a:r>
+              <a:rPr lang="sv-SE" dirty="0" smtClean="0"/>
+              <a:t>denna programkod körs på en generell dator vi byggt från grunden.</a:t>
+            </a:r>
+          </a:p>
+          <a:p>
+            <a:endParaRPr lang="sv-SE" dirty="0" smtClean="0"/>
+          </a:p>
+          <a:p>
+            <a:r>
+              <a:rPr lang="sv-SE" dirty="0" smtClean="0"/>
+              <a:t>Vi kan bryta ner hårdvaran i tre distinkta moduler. En CPU, en tangentbordsmotor, och en VGA-motor. Som förväntat så sköter </a:t>
+            </a:r>
+            <a:r>
+              <a:rPr lang="sv-SE" dirty="0" err="1" smtClean="0"/>
+              <a:t>CPU:n</a:t>
+            </a:r>
+            <a:r>
+              <a:rPr lang="sv-SE" dirty="0" smtClean="0"/>
               <a:t> </a:t>
             </a:r>
             <a:r>
-              <a:rPr lang="en-US" baseline="0" dirty="0" err="1" smtClean="0"/>
-              <a:t>grafhalvan</a:t>
-            </a:r>
-            <a:r>
-              <a:rPr lang="en-US" baseline="0" dirty="0" smtClean="0"/>
-              <a:t>. </a:t>
-            </a:r>
-            <a:r>
-              <a:rPr lang="en-US" baseline="0" dirty="0" err="1" smtClean="0"/>
-              <a:t>Konsoll</a:t>
-            </a:r>
-            <a:r>
-              <a:rPr lang="en-US" baseline="0" dirty="0" smtClean="0"/>
-              <a:t> </a:t>
-            </a:r>
-            <a:r>
-              <a:rPr lang="en-GB" baseline="0" dirty="0" err="1" smtClean="0"/>
-              <a:t>minskad</a:t>
-            </a:r>
-            <a:r>
-              <a:rPr lang="en-GB" baseline="0" dirty="0" smtClean="0"/>
-              <a:t> tile 8x16px. Store </a:t>
-            </a:r>
-            <a:r>
-              <a:rPr lang="en-GB" baseline="0" dirty="0" err="1" smtClean="0"/>
-              <a:t>båda</a:t>
-            </a:r>
-            <a:r>
-              <a:rPr lang="en-GB" baseline="0" dirty="0" smtClean="0"/>
-              <a:t>. </a:t>
-            </a:r>
-            <a:r>
-              <a:rPr lang="en-GB" baseline="0" dirty="0" err="1" smtClean="0"/>
-              <a:t>Övrigt</a:t>
-            </a:r>
-            <a:r>
-              <a:rPr lang="en-GB" baseline="0" dirty="0" smtClean="0"/>
-              <a:t>, </a:t>
-            </a:r>
-            <a:r>
-              <a:rPr lang="en-GB" baseline="0" dirty="0" err="1" smtClean="0"/>
-              <a:t>labben</a:t>
-            </a:r>
-            <a:r>
-              <a:rPr lang="en-GB" baseline="0" dirty="0" smtClean="0"/>
-              <a:t>.</a:t>
-            </a:r>
-            <a:endParaRPr lang="en-US" dirty="0" smtClean="0"/>
-          </a:p>
-          <a:p>
-            <a:endParaRPr lang="sv-SE" dirty="0"/>
+              <a:rPr lang="sv-SE" dirty="0" err="1" smtClean="0"/>
+              <a:t>parsning</a:t>
+            </a:r>
+            <a:r>
+              <a:rPr lang="sv-SE" dirty="0" smtClean="0"/>
+              <a:t> av maskinkod och beräkningar, tangentbordsmotorn läser tecken via USB, och VGA-motorn kan ge oss skärmutmatning baserat på givet minne.</a:t>
+            </a:r>
+          </a:p>
+          <a:p>
+            <a:endParaRPr lang="sv-SE" dirty="0" smtClean="0"/>
+          </a:p>
+          <a:p>
+            <a:r>
+              <a:rPr lang="sv-SE" dirty="0" err="1" smtClean="0"/>
+              <a:t>CPU:n</a:t>
+            </a:r>
+            <a:r>
+              <a:rPr lang="sv-SE" dirty="0" smtClean="0"/>
+              <a:t> sitter i "mitten", som ni ser på bilden, läser från tangentbordsmotorn, och skriver till VGA-motorn. Dessa två kommunicerar i sin tur med extern hårdvara: tangentbord och skärm.</a:t>
+            </a:r>
+          </a:p>
+          <a:p>
+            <a:endParaRPr lang="sv-SE" dirty="0" smtClean="0"/>
+          </a:p>
+          <a:p>
+            <a:r>
+              <a:rPr lang="sv-SE" dirty="0" smtClean="0"/>
+              <a:t>Vi redovisar dessa moduler i tur och ordning, med </a:t>
+            </a:r>
+            <a:r>
+              <a:rPr lang="sv-SE" dirty="0" err="1" smtClean="0"/>
+              <a:t>CPU:n</a:t>
+            </a:r>
+            <a:r>
+              <a:rPr lang="sv-SE" dirty="0" smtClean="0"/>
+              <a:t> först.</a:t>
+            </a:r>
+            <a:endParaRPr lang="en-US" dirty="0"/>
           </a:p>
         </p:txBody>
       </p:sp>
@@ -4897,17 +5452,17 @@
           <a:p>
             <a:pPr lvl="0"/>
             <a:fld id="{D0FC86B6-5EBF-43A2-AF19-9B4C147144EF}" type="slidenum">
-              <a:rPr lang="sv-SE" smtClean="0"/>
-              <a:t>12</a:t>
+              <a:rPr lang="en-US" smtClean="0"/>
+              <a:t>7</a:t>
             </a:fld>
-            <a:endParaRPr lang="sv-SE"/>
+            <a:endParaRPr lang="en-US"/>
           </a:p>
         </p:txBody>
       </p:sp>
     </p:spTree>
     <p:extLst>
       <p:ext uri="{BB962C8B-B14F-4D97-AF65-F5344CB8AC3E}">
-        <p14:creationId xmlns:p14="http://schemas.microsoft.com/office/powerpoint/2010/main" val="2663983068"/>
+        <p14:creationId xmlns:p14="http://schemas.microsoft.com/office/powerpoint/2010/main" val="2329279041"/>
       </p:ext>
     </p:extLst>
   </p:cSld>
@@ -4944,12 +5499,7 @@
             <p:ph type="sldImg"/>
           </p:nvPr>
         </p:nvSpPr>
-        <p:spPr>
-          <a:xfrm>
-            <a:off x="1106488" y="812800"/>
-            <a:ext cx="5345112" cy="4008438"/>
-          </a:xfrm>
-        </p:spPr>
+        <p:spPr/>
       </p:sp>
       <p:sp>
         <p:nvSpPr>
@@ -4967,82 +5517,10 @@
           <a:lstStyle/>
           <a:p>
             <a:r>
-              <a:rPr lang="sv-SE" dirty="0" smtClean="0"/>
-              <a:t>Tangentbordsmotorn</a:t>
-            </a:r>
-            <a:r>
-              <a:rPr lang="sv-SE" baseline="0" dirty="0" smtClean="0"/>
-              <a:t> är i stort baserad på den vi använde tidigare i denna kurs, men med vissa förändringar specifikt för det här projektet.</a:t>
-            </a:r>
-          </a:p>
-          <a:p>
-            <a:endParaRPr lang="sv-SE" baseline="0" dirty="0" smtClean="0"/>
-          </a:p>
-          <a:p>
-            <a:r>
-              <a:rPr lang="sv-SE" baseline="0" dirty="0" smtClean="0"/>
-              <a:t>Den skriver inte någon data direkt till något minne, utan lägger helt enkelt </a:t>
-            </a:r>
-            <a:r>
-              <a:rPr lang="sv-SE" baseline="0" dirty="0" err="1" smtClean="0"/>
-              <a:t>tilekoderna</a:t>
-            </a:r>
-            <a:r>
-              <a:rPr lang="sv-SE" baseline="0" dirty="0" smtClean="0"/>
-              <a:t> för nedtryckta tangenter på datautgången, som kan läggas på bussen med RC-instruktionen</a:t>
-            </a:r>
-          </a:p>
-          <a:p>
-            <a:endParaRPr lang="sv-SE" baseline="0" dirty="0" smtClean="0"/>
-          </a:p>
-          <a:p>
-            <a:r>
-              <a:rPr lang="sv-SE" baseline="0" dirty="0" smtClean="0"/>
-              <a:t>Tangentbordsmotorn har inte heller någon cursorlogik, utan allt det sköts på </a:t>
-            </a:r>
-            <a:r>
-              <a:rPr lang="sv-SE" baseline="0" dirty="0" err="1" smtClean="0"/>
-              <a:t>assemblynivån</a:t>
-            </a:r>
-            <a:r>
-              <a:rPr lang="sv-SE" baseline="0" dirty="0" smtClean="0"/>
-              <a:t>. </a:t>
-            </a:r>
-          </a:p>
-          <a:p>
-            <a:endParaRPr lang="sv-SE" baseline="0" dirty="0" smtClean="0"/>
-          </a:p>
-          <a:p>
-            <a:r>
-              <a:rPr lang="sv-SE" baseline="0" dirty="0" smtClean="0"/>
-              <a:t>Allt detta motiveras av att en och samma tangent kan ha olika betydelser beroende på sammanhanget, t.ex. kan en siffra tolkas som en del av ett matematiskt uttryck, eller som en skalningsparameter.</a:t>
-            </a:r>
-          </a:p>
-          <a:p>
-            <a:endParaRPr lang="sv-SE" baseline="0" dirty="0" smtClean="0"/>
-          </a:p>
-          <a:p>
-            <a:r>
-              <a:rPr lang="sv-SE" baseline="0" dirty="0" smtClean="0"/>
-              <a:t>Tangentbordsmotorn är därför mycket fokuserad på en enda uppgift: att hålla den senaste nedtrycka tangenten tillgänglig för processorn.</a:t>
-            </a:r>
-          </a:p>
-          <a:p>
-            <a:endParaRPr lang="sv-SE" baseline="0" dirty="0" smtClean="0"/>
-          </a:p>
-          <a:p>
-            <a:r>
-              <a:rPr lang="sv-SE" baseline="0" dirty="0" smtClean="0"/>
-              <a:t>Och den håller det värdet tills en av två saker sker: att processorn läser av värdet och då skickar en </a:t>
-            </a:r>
-            <a:r>
-              <a:rPr lang="sv-SE" baseline="0" dirty="0" err="1" smtClean="0"/>
-              <a:t>read_confirm</a:t>
-            </a:r>
-            <a:r>
-              <a:rPr lang="sv-SE" baseline="0" dirty="0" smtClean="0"/>
-              <a:t> – signal, eller en ny tangent ersätter den föregående. </a:t>
-            </a:r>
+              <a:rPr lang="en-GB" b="1" dirty="0" smtClean="0"/>
+              <a:t>Hannes: </a:t>
+            </a:r>
+            <a:endParaRPr lang="sv-SE" b="1" dirty="0"/>
           </a:p>
         </p:txBody>
       </p:sp>
@@ -5063,17 +5541,17 @@
           <a:p>
             <a:pPr lvl="0"/>
             <a:fld id="{D0FC86B6-5EBF-43A2-AF19-9B4C147144EF}" type="slidenum">
-              <a:rPr lang="en-US" smtClean="0"/>
-              <a:t>13</a:t>
+              <a:rPr lang="sv-SE" smtClean="0"/>
+              <a:t>8</a:t>
             </a:fld>
-            <a:endParaRPr lang="en-US"/>
+            <a:endParaRPr lang="sv-SE"/>
           </a:p>
         </p:txBody>
       </p:sp>
     </p:spTree>
     <p:extLst>
       <p:ext uri="{BB962C8B-B14F-4D97-AF65-F5344CB8AC3E}">
-        <p14:creationId xmlns:p14="http://schemas.microsoft.com/office/powerpoint/2010/main" val="532189939"/>
+        <p14:creationId xmlns:p14="http://schemas.microsoft.com/office/powerpoint/2010/main" val="3234618575"/>
       </p:ext>
     </p:extLst>
   </p:cSld>
@@ -5110,12 +5588,7 @@
             <p:ph type="sldImg"/>
           </p:nvPr>
         </p:nvSpPr>
-        <p:spPr>
-          <a:xfrm>
-            <a:off x="1106488" y="812800"/>
-            <a:ext cx="5345112" cy="4008438"/>
-          </a:xfrm>
-        </p:spPr>
+        <p:spPr/>
       </p:sp>
       <p:sp>
         <p:nvSpPr>
@@ -5133,82 +5606,99 @@
           <a:lstStyle/>
           <a:p>
             <a:r>
-              <a:rPr lang="sv-SE" dirty="0" smtClean="0"/>
-              <a:t>Med detta kan vi nu avslutningsvis sammanfatta det</a:t>
-            </a:r>
-            <a:r>
-              <a:rPr lang="sv-SE" baseline="0" dirty="0" smtClean="0"/>
-              <a:t> faktiska programflödet:</a:t>
-            </a:r>
-          </a:p>
-          <a:p>
-            <a:endParaRPr lang="sv-SE" baseline="0" dirty="0" smtClean="0"/>
-          </a:p>
-          <a:p>
-            <a:r>
-              <a:rPr lang="sv-SE" baseline="0" dirty="0" smtClean="0"/>
-              <a:t>Processorn står i en loop som hela tiden läser av värdet från tangentsbordmotorn med RC, och när en tangent äntligen registreras läser processorn av det värdet (alltså </a:t>
-            </a:r>
-            <a:r>
-              <a:rPr lang="sv-SE" baseline="0" dirty="0" err="1" smtClean="0"/>
-              <a:t>tilekoden</a:t>
-            </a:r>
-            <a:r>
-              <a:rPr lang="sv-SE" baseline="0" dirty="0" smtClean="0"/>
-              <a:t>), och går vidare med programlogiken.</a:t>
-            </a:r>
-          </a:p>
-          <a:p>
-            <a:endParaRPr lang="sv-SE" baseline="0" dirty="0" smtClean="0"/>
-          </a:p>
-          <a:p>
-            <a:r>
-              <a:rPr lang="sv-SE" baseline="0" dirty="0" smtClean="0"/>
-              <a:t>Vi bestämmer, beroende på sammanhanget vilken typ av input det rör sig: heltal, decimaltal, parameter, operator, osv.</a:t>
-            </a:r>
-          </a:p>
-          <a:p>
-            <a:endParaRPr lang="sv-SE" baseline="0" dirty="0" smtClean="0"/>
-          </a:p>
-          <a:p>
-            <a:r>
-              <a:rPr lang="sv-SE" baseline="0" dirty="0" smtClean="0"/>
-              <a:t>Sedan bestäms det vilken typ av handling som ska utföras på det inmatade värdet. Om det är en operator eller </a:t>
-            </a:r>
-            <a:r>
-              <a:rPr lang="sv-SE" baseline="0" dirty="0" err="1" smtClean="0"/>
-              <a:t>operand</a:t>
-            </a:r>
-            <a:r>
-              <a:rPr lang="sv-SE" baseline="0" dirty="0" smtClean="0"/>
-              <a:t> ska det läggas på evalueringsstacken, kanske ska det vara en modifierare på kommande inmatningar såsom ’N’ eller ’P’, eller om det är </a:t>
-            </a:r>
-            <a:r>
-              <a:rPr lang="sv-SE" baseline="0" dirty="0" err="1" smtClean="0"/>
-              <a:t>enter</a:t>
-            </a:r>
-            <a:r>
-              <a:rPr lang="sv-SE" baseline="0" dirty="0" smtClean="0"/>
-              <a:t> ska vi antingen evaluera uttrycket eller plotta funktionen.</a:t>
-            </a:r>
-          </a:p>
-          <a:p>
-            <a:endParaRPr lang="sv-SE" baseline="0" dirty="0" smtClean="0"/>
-          </a:p>
-          <a:p>
-            <a:r>
-              <a:rPr lang="sv-SE" baseline="0" dirty="0" smtClean="0"/>
-              <a:t>När det är klart väntar vi återigen på en ny inmatning och cykeln börjar om.</a:t>
-            </a:r>
-          </a:p>
-          <a:p>
-            <a:endParaRPr lang="sv-SE" baseline="0" dirty="0" smtClean="0"/>
-          </a:p>
-          <a:p>
-            <a:r>
-              <a:rPr lang="sv-SE" baseline="0" dirty="0" smtClean="0"/>
-              <a:t>Dessa övergripande steg innefattar alla koncept och komponenter som den här presentationen tagit upp, och bygger tillsammans upp en fullt fungerande hård-och mjukvaruplattform för en grafräknare.</a:t>
-            </a:r>
+              <a:rPr lang="sv-SE" sz="2000" b="1" i="0" u="none" strike="noStrike" kern="1200" cap="none" dirty="0" smtClean="0">
+                <a:ln>
+                  <a:noFill/>
+                </a:ln>
+                <a:effectLst/>
+                <a:latin typeface="Liberation Sans" pitchFamily="18"/>
+              </a:rPr>
+              <a:t>Silas:</a:t>
+            </a:r>
+            <a:r>
+              <a:rPr lang="sv-SE" sz="2000" b="1" i="0" u="none" strike="noStrike" kern="1200" cap="none" baseline="0" dirty="0" smtClean="0">
+                <a:ln>
+                  <a:noFill/>
+                </a:ln>
+                <a:effectLst/>
+                <a:latin typeface="Liberation Sans" pitchFamily="18"/>
+              </a:rPr>
+              <a:t> </a:t>
+            </a:r>
+            <a:r>
+              <a:rPr lang="sv-SE" sz="2000" b="0" i="0" u="none" strike="noStrike" kern="1200" cap="none" dirty="0" smtClean="0">
+                <a:ln>
+                  <a:noFill/>
+                </a:ln>
+                <a:effectLst/>
+                <a:latin typeface="Liberation Sans" pitchFamily="18"/>
+              </a:rPr>
+              <a:t>CPU</a:t>
+            </a:r>
+            <a:r>
+              <a:rPr lang="sv-SE" sz="2000" b="0" i="0" u="none" strike="noStrike" kern="1200" cap="none" baseline="0" dirty="0" smtClean="0">
+                <a:ln>
+                  <a:noFill/>
+                </a:ln>
+                <a:effectLst/>
+                <a:latin typeface="Liberation Sans" pitchFamily="18"/>
+              </a:rPr>
+              <a:t>:n </a:t>
+            </a:r>
+            <a:r>
+              <a:rPr lang="sv-SE" sz="2000" b="0" i="0" u="none" strike="noStrike" kern="1200" cap="none" dirty="0" smtClean="0">
+                <a:ln>
+                  <a:noFill/>
+                </a:ln>
+                <a:effectLst/>
+                <a:latin typeface="Liberation Sans" pitchFamily="18"/>
+              </a:rPr>
+              <a:t>programmeras med maskinkod.</a:t>
+            </a:r>
+          </a:p>
+          <a:p>
+            <a:endParaRPr lang="sv-SE" sz="2000" b="0" i="0" u="none" strike="noStrike" kern="1200" cap="none" dirty="0" smtClean="0">
+              <a:ln>
+                <a:noFill/>
+              </a:ln>
+              <a:effectLst/>
+              <a:latin typeface="Liberation Sans" pitchFamily="18"/>
+            </a:endParaRPr>
+          </a:p>
+          <a:p>
+            <a:r>
+              <a:rPr lang="sv-SE" sz="2000" b="0" i="0" u="none" strike="noStrike" kern="1200" cap="none" dirty="0" smtClean="0">
+                <a:ln>
+                  <a:noFill/>
+                </a:ln>
+                <a:effectLst/>
+                <a:latin typeface="Liberation Sans" pitchFamily="18"/>
+              </a:rPr>
+              <a:t>Support för 27 instruktioner.</a:t>
+            </a:r>
+            <a:r>
+              <a:rPr lang="sv-SE" sz="2000" b="0" i="0" u="none" strike="noStrike" kern="1200" cap="none" baseline="0" dirty="0" smtClean="0">
+                <a:ln>
+                  <a:noFill/>
+                </a:ln>
+                <a:effectLst/>
+                <a:latin typeface="Liberation Sans" pitchFamily="18"/>
+              </a:rPr>
+              <a:t> ADD,LSL,BRA, plus special (grafik/tangentbord) (oanvända). K</a:t>
+            </a:r>
+            <a:r>
+              <a:rPr lang="sv-SE" sz="2000" b="0" i="0" u="none" strike="noStrike" kern="1200" cap="none" dirty="0" smtClean="0">
+                <a:ln>
+                  <a:noFill/>
+                </a:ln>
+                <a:effectLst/>
+                <a:latin typeface="Liberation Sans" pitchFamily="18"/>
+              </a:rPr>
+              <a:t>an kallas på med 3 moder. Åtta generella register (ej HR), och 5 olika flaggor för hopp.</a:t>
+            </a:r>
+          </a:p>
+          <a:p>
+            <a:endParaRPr lang="sv-SE" dirty="0"/>
           </a:p>
         </p:txBody>
       </p:sp>
@@ -5229,17 +5719,17 @@
           <a:p>
             <a:pPr lvl="0"/>
             <a:fld id="{D0FC86B6-5EBF-43A2-AF19-9B4C147144EF}" type="slidenum">
-              <a:rPr lang="en-US" smtClean="0"/>
-              <a:t>14</a:t>
+              <a:rPr lang="sv-SE" smtClean="0"/>
+              <a:t>9</a:t>
             </a:fld>
-            <a:endParaRPr lang="en-US"/>
+            <a:endParaRPr lang="sv-SE"/>
           </a:p>
         </p:txBody>
       </p:sp>
     </p:spTree>
     <p:extLst>
       <p:ext uri="{BB962C8B-B14F-4D97-AF65-F5344CB8AC3E}">
-        <p14:creationId xmlns:p14="http://schemas.microsoft.com/office/powerpoint/2010/main" val="1130169636"/>
+        <p14:creationId xmlns:p14="http://schemas.microsoft.com/office/powerpoint/2010/main" val="3737433917"/>
       </p:ext>
     </p:extLst>
   </p:cSld>
@@ -9168,143 +9658,6 @@
             <a:spLocks noGrp="1"/>
           </p:cNvSpPr>
           <p:nvPr>
-            <p:ph type="title"/>
-          </p:nvPr>
-        </p:nvSpPr>
-        <p:spPr/>
-        <p:txBody>
-          <a:bodyPr/>
-          <a:lstStyle/>
-          <a:p>
-            <a:r>
-              <a:rPr lang="sv-SE" dirty="0" err="1" smtClean="0"/>
-              <a:t>Programflöde</a:t>
-            </a:r>
-            <a:endParaRPr lang="en-US" dirty="0"/>
-          </a:p>
-        </p:txBody>
-      </p:sp>
-      <p:sp>
-        <p:nvSpPr>
-          <p:cNvPr id="5" name="Content Placeholder 4"/>
-          <p:cNvSpPr>
-            <a:spLocks noGrp="1"/>
-          </p:cNvSpPr>
-          <p:nvPr>
-            <p:ph idx="1"/>
-          </p:nvPr>
-        </p:nvSpPr>
-        <p:spPr/>
-        <p:txBody>
-          <a:bodyPr/>
-          <a:lstStyle/>
-          <a:p>
-            <a:pPr marL="457200" indent="-457200">
-              <a:buFont typeface="+mj-lt"/>
-              <a:buAutoNum type="arabicPeriod"/>
-            </a:pPr>
-            <a:r>
-              <a:rPr lang="sv-SE" dirty="0" smtClean="0"/>
-              <a:t>Tangentbordsmotor läser av tangent</a:t>
-            </a:r>
-          </a:p>
-          <a:p>
-            <a:pPr marL="457200" indent="-457200">
-              <a:buFont typeface="+mj-lt"/>
-              <a:buAutoNum type="arabicPeriod"/>
-            </a:pPr>
-            <a:r>
-              <a:rPr lang="sv-SE" dirty="0" smtClean="0"/>
-              <a:t>CPU läser input med </a:t>
-            </a:r>
-            <a:r>
-              <a:rPr lang="sv-SE" dirty="0" smtClean="0">
-                <a:latin typeface="Courier New" panose="02070309020205020404" pitchFamily="49" charset="0"/>
-                <a:cs typeface="Courier New" panose="02070309020205020404" pitchFamily="49" charset="0"/>
-              </a:rPr>
-              <a:t>RC</a:t>
-            </a:r>
-            <a:endParaRPr lang="en-US" dirty="0" smtClean="0"/>
-          </a:p>
-          <a:p>
-            <a:pPr marL="457200" indent="-457200">
-              <a:buFont typeface="+mj-lt"/>
-              <a:buAutoNum type="arabicPeriod"/>
-            </a:pPr>
-            <a:r>
-              <a:rPr lang="sv-SE" dirty="0" smtClean="0">
-                <a:cs typeface="Courier New" panose="02070309020205020404" pitchFamily="49" charset="0"/>
-              </a:rPr>
-              <a:t>Bestämmer typ av input</a:t>
-            </a:r>
-          </a:p>
-          <a:p>
-            <a:pPr marL="457200" indent="-457200">
-              <a:buFont typeface="+mj-lt"/>
-              <a:buAutoNum type="arabicPeriod"/>
-            </a:pPr>
-            <a:r>
-              <a:rPr lang="sv-SE" dirty="0" smtClean="0">
-                <a:cs typeface="Courier New" panose="02070309020205020404" pitchFamily="49" charset="0"/>
-              </a:rPr>
-              <a:t>Utför lämplig handling</a:t>
-            </a:r>
-          </a:p>
-          <a:p>
-            <a:pPr marL="457200" indent="-457200">
-              <a:buFont typeface="+mj-lt"/>
-              <a:buAutoNum type="arabicPeriod"/>
-            </a:pPr>
-            <a:endParaRPr lang="sv-SE" dirty="0" smtClean="0">
-              <a:cs typeface="Courier New" panose="02070309020205020404" pitchFamily="49" charset="0"/>
-            </a:endParaRPr>
-          </a:p>
-        </p:txBody>
-      </p:sp>
-    </p:spTree>
-    <p:extLst>
-      <p:ext uri="{BB962C8B-B14F-4D97-AF65-F5344CB8AC3E}">
-        <p14:creationId xmlns:p14="http://schemas.microsoft.com/office/powerpoint/2010/main" val="3984106354"/>
-      </p:ext>
-    </p:extLst>
-  </p:cSld>
-  <p:clrMapOvr>
-    <a:masterClrMapping/>
-  </p:clrMapOvr>
-  <p:timing>
-    <p:tnLst>
-      <p:par>
-        <p:cTn id="1" dur="indefinite" restart="never" nodeType="tmRoot"/>
-      </p:par>
-    </p:tnLst>
-  </p:timing>
-</p:sld>
-</file>
-
-<file path=ppt/slides/slide16.xml><?xml version="1.0" encoding="utf-8"?>
-<p:sld xmlns:a="http://schemas.openxmlformats.org/drawingml/2006/main" xmlns:r="http://schemas.openxmlformats.org/officeDocument/2006/relationships" xmlns:p="http://schemas.openxmlformats.org/presentationml/2006/main">
-  <p:cSld>
-    <p:spTree>
-      <p:nvGrpSpPr>
-        <p:cNvPr id="1" name=""/>
-        <p:cNvGrpSpPr/>
-        <p:nvPr/>
-      </p:nvGrpSpPr>
-      <p:grpSpPr>
-        <a:xfrm>
-          <a:off x="0" y="0"/>
-          <a:ext cx="0" cy="0"/>
-          <a:chOff x="0" y="0"/>
-          <a:chExt cx="0" cy="0"/>
-        </a:xfrm>
-      </p:grpSpPr>
-      <p:sp>
-        <p:nvSpPr>
-          <p:cNvPr id="2" name="Title 1"/>
-          <p:cNvSpPr>
-            <a:spLocks noGrp="1"/>
-          </p:cNvSpPr>
-          <p:nvPr>
             <p:ph type="ctrTitle"/>
           </p:nvPr>
         </p:nvSpPr>
@@ -9440,7 +9793,7 @@
           </p:nvPr>
         </p:nvPicPr>
         <p:blipFill>
-          <a:blip r:embed="rId2" cstate="print">
+          <a:blip r:embed="rId3" cstate="print">
             <a:extLst>
               <a:ext uri="{28A0092B-C50C-407E-A947-70E740481C1C}">
                 <a14:useLocalDpi xmlns:a14="http://schemas.microsoft.com/office/drawing/2010/main" val="0"/>
@@ -9535,11 +9888,7 @@
           <a:p>
             <a:r>
               <a:rPr lang="sv-SE" dirty="0" smtClean="0"/>
-              <a:t>1100</a:t>
-            </a:r>
-            <a:r>
-              <a:rPr lang="sv-SE" dirty="0" smtClean="0"/>
-              <a:t>+ rader maskinkod</a:t>
+              <a:t>1100+ rader maskinkod</a:t>
             </a:r>
           </a:p>
           <a:p>
@@ -10271,7 +10620,7 @@
           </p:nvPr>
         </p:nvPicPr>
         <p:blipFill>
-          <a:blip r:embed="rId2">
+          <a:blip r:embed="rId3">
             <a:extLst>
               <a:ext uri="{28A0092B-C50C-407E-A947-70E740481C1C}">
                 <a14:useLocalDpi xmlns:a14="http://schemas.microsoft.com/office/drawing/2010/main" val="0"/>
@@ -10325,7 +10674,7 @@
           </p:nvPr>
         </p:nvPicPr>
         <p:blipFill>
-          <a:blip r:embed="rId3">
+          <a:blip r:embed="rId4">
             <a:extLst>
               <a:ext uri="{28A0092B-C50C-407E-A947-70E740481C1C}">
                 <a14:useLocalDpi xmlns:a14="http://schemas.microsoft.com/office/drawing/2010/main" val="0"/>

</xml_diff>